<commit_message>
Revised slides per peer review
</commit_message>
<xml_diff>
--- a/asking_for_help/getting_help_curc.pptx
+++ b/asking_for_help/getting_help_curc.pptx
@@ -5,31 +5,30 @@
     <p:sldMasterId id="2147483660" r:id="rId4"/>
   </p:sldMasterIdLst>
   <p:notesMasterIdLst>
-    <p:notesMasterId r:id="rId27"/>
+    <p:notesMasterId r:id="rId26"/>
   </p:notesMasterIdLst>
   <p:sldIdLst>
     <p:sldId id="340" r:id="rId5"/>
-    <p:sldId id="349" r:id="rId6"/>
-    <p:sldId id="261" r:id="rId7"/>
-    <p:sldId id="262" r:id="rId8"/>
-    <p:sldId id="318" r:id="rId9"/>
-    <p:sldId id="339" r:id="rId10"/>
-    <p:sldId id="330" r:id="rId11"/>
-    <p:sldId id="336" r:id="rId12"/>
-    <p:sldId id="258" r:id="rId13"/>
-    <p:sldId id="325" r:id="rId14"/>
-    <p:sldId id="323" r:id="rId15"/>
-    <p:sldId id="326" r:id="rId16"/>
-    <p:sldId id="327" r:id="rId17"/>
-    <p:sldId id="328" r:id="rId18"/>
-    <p:sldId id="324" r:id="rId19"/>
-    <p:sldId id="331" r:id="rId20"/>
-    <p:sldId id="332" r:id="rId21"/>
-    <p:sldId id="333" r:id="rId22"/>
-    <p:sldId id="335" r:id="rId23"/>
-    <p:sldId id="337" r:id="rId24"/>
-    <p:sldId id="338" r:id="rId25"/>
-    <p:sldId id="350" r:id="rId26"/>
+    <p:sldId id="261" r:id="rId6"/>
+    <p:sldId id="262" r:id="rId7"/>
+    <p:sldId id="318" r:id="rId8"/>
+    <p:sldId id="339" r:id="rId9"/>
+    <p:sldId id="330" r:id="rId10"/>
+    <p:sldId id="336" r:id="rId11"/>
+    <p:sldId id="258" r:id="rId12"/>
+    <p:sldId id="325" r:id="rId13"/>
+    <p:sldId id="323" r:id="rId14"/>
+    <p:sldId id="326" r:id="rId15"/>
+    <p:sldId id="327" r:id="rId16"/>
+    <p:sldId id="328" r:id="rId17"/>
+    <p:sldId id="324" r:id="rId18"/>
+    <p:sldId id="331" r:id="rId19"/>
+    <p:sldId id="332" r:id="rId20"/>
+    <p:sldId id="333" r:id="rId21"/>
+    <p:sldId id="335" r:id="rId22"/>
+    <p:sldId id="337" r:id="rId23"/>
+    <p:sldId id="338" r:id="rId24"/>
+    <p:sldId id="350" r:id="rId25"/>
   </p:sldIdLst>
   <p:sldSz cx="12192000" cy="6858000"/>
   <p:notesSz cx="6858000" cy="9144000"/>
@@ -235,7 +234,7 @@
           <a:p>
             <a:fld id="{EFDA08D6-E137-3341-A5EE-84219A24203E}" type="datetimeFigureOut">
               <a:rPr lang="en-US" smtClean="0"/>
-              <a:t>8/11/24</a:t>
+              <a:t>8/12/24</a:t>
             </a:fld>
             <a:endParaRPr lang="en-US"/>
           </a:p>
@@ -587,6 +586,90 @@
 </file>
 
 <file path=ppt/notesSlides/notesSlide10.xml><?xml version="1.0" encoding="utf-8"?>
+<p:notes xmlns:a="http://schemas.openxmlformats.org/drawingml/2006/main" xmlns:r="http://schemas.openxmlformats.org/officeDocument/2006/relationships" xmlns:p="http://schemas.openxmlformats.org/presentationml/2006/main">
+  <p:cSld>
+    <p:spTree>
+      <p:nvGrpSpPr>
+        <p:cNvPr id="1" name=""/>
+        <p:cNvGrpSpPr/>
+        <p:nvPr/>
+      </p:nvGrpSpPr>
+      <p:grpSpPr>
+        <a:xfrm>
+          <a:off x="0" y="0"/>
+          <a:ext cx="0" cy="0"/>
+          <a:chOff x="0" y="0"/>
+          <a:chExt cx="0" cy="0"/>
+        </a:xfrm>
+      </p:grpSpPr>
+      <p:sp>
+        <p:nvSpPr>
+          <p:cNvPr id="2" name="Slide Image Placeholder 1"/>
+          <p:cNvSpPr>
+            <a:spLocks noGrp="1" noRot="1" noChangeAspect="1"/>
+          </p:cNvSpPr>
+          <p:nvPr>
+            <p:ph type="sldImg"/>
+          </p:nvPr>
+        </p:nvSpPr>
+        <p:spPr/>
+      </p:sp>
+      <p:sp>
+        <p:nvSpPr>
+          <p:cNvPr id="3" name="Notes Placeholder 2"/>
+          <p:cNvSpPr>
+            <a:spLocks noGrp="1"/>
+          </p:cNvSpPr>
+          <p:nvPr>
+            <p:ph type="body" idx="1"/>
+          </p:nvPr>
+        </p:nvSpPr>
+        <p:spPr/>
+        <p:txBody>
+          <a:bodyPr/>
+          <a:lstStyle/>
+          <a:p>
+            <a:endParaRPr lang="en-US" dirty="0"/>
+          </a:p>
+        </p:txBody>
+      </p:sp>
+      <p:sp>
+        <p:nvSpPr>
+          <p:cNvPr id="4" name="Slide Number Placeholder 3"/>
+          <p:cNvSpPr>
+            <a:spLocks noGrp="1"/>
+          </p:cNvSpPr>
+          <p:nvPr>
+            <p:ph type="sldNum" sz="quarter" idx="5"/>
+          </p:nvPr>
+        </p:nvSpPr>
+        <p:spPr/>
+        <p:txBody>
+          <a:bodyPr/>
+          <a:lstStyle/>
+          <a:p>
+            <a:fld id="{A926901F-C6C3-9E47-9843-744856EDDD7A}" type="slidenum">
+              <a:rPr lang="en-US" smtClean="0"/>
+              <a:t>10</a:t>
+            </a:fld>
+            <a:endParaRPr lang="en-US"/>
+          </a:p>
+        </p:txBody>
+      </p:sp>
+    </p:spTree>
+    <p:extLst>
+      <p:ext uri="{BB962C8B-B14F-4D97-AF65-F5344CB8AC3E}">
+        <p14:creationId xmlns:p14="http://schemas.microsoft.com/office/powerpoint/2010/main" val="2426652303"/>
+      </p:ext>
+    </p:extLst>
+  </p:cSld>
+  <p:clrMapOvr>
+    <a:masterClrMapping/>
+  </p:clrMapOvr>
+</p:notes>
+</file>
+
+<file path=ppt/notesSlides/notesSlide11.xml><?xml version="1.0" encoding="utf-8"?>
 <p:notes xmlns:a="http://schemas.openxmlformats.org/drawingml/2006/main" xmlns:r="http://schemas.openxmlformats.org/officeDocument/2006/relationships" xmlns:p="http://schemas.openxmlformats.org/presentationml/2006/main" showMasterSp="0" showMasterPhAnim="0">
   <p:cSld>
     <p:spTree>
@@ -723,7 +806,7 @@
             </a:pPr>
             <a:fld id="{00000000-1234-1234-1234-123412341234}" type="slidenum">
               <a:rPr lang="en-US"/>
-              <a:t>10</a:t>
+              <a:t>11</a:t>
             </a:fld>
             <a:endParaRPr/>
           </a:p>
@@ -732,91 +815,7 @@
     </p:spTree>
     <p:extLst>
       <p:ext uri="{BB962C8B-B14F-4D97-AF65-F5344CB8AC3E}">
-        <p14:creationId xmlns:p14="http://schemas.microsoft.com/office/powerpoint/2010/main" val="2166091548"/>
-      </p:ext>
-    </p:extLst>
-  </p:cSld>
-  <p:clrMapOvr>
-    <a:masterClrMapping/>
-  </p:clrMapOvr>
-</p:notes>
-</file>
-
-<file path=ppt/notesSlides/notesSlide11.xml><?xml version="1.0" encoding="utf-8"?>
-<p:notes xmlns:a="http://schemas.openxmlformats.org/drawingml/2006/main" xmlns:r="http://schemas.openxmlformats.org/officeDocument/2006/relationships" xmlns:p="http://schemas.openxmlformats.org/presentationml/2006/main">
-  <p:cSld>
-    <p:spTree>
-      <p:nvGrpSpPr>
-        <p:cNvPr id="1" name=""/>
-        <p:cNvGrpSpPr/>
-        <p:nvPr/>
-      </p:nvGrpSpPr>
-      <p:grpSpPr>
-        <a:xfrm>
-          <a:off x="0" y="0"/>
-          <a:ext cx="0" cy="0"/>
-          <a:chOff x="0" y="0"/>
-          <a:chExt cx="0" cy="0"/>
-        </a:xfrm>
-      </p:grpSpPr>
-      <p:sp>
-        <p:nvSpPr>
-          <p:cNvPr id="2" name="Slide Image Placeholder 1"/>
-          <p:cNvSpPr>
-            <a:spLocks noGrp="1" noRot="1" noChangeAspect="1"/>
-          </p:cNvSpPr>
-          <p:nvPr>
-            <p:ph type="sldImg"/>
-          </p:nvPr>
-        </p:nvSpPr>
-        <p:spPr/>
-      </p:sp>
-      <p:sp>
-        <p:nvSpPr>
-          <p:cNvPr id="3" name="Notes Placeholder 2"/>
-          <p:cNvSpPr>
-            <a:spLocks noGrp="1"/>
-          </p:cNvSpPr>
-          <p:nvPr>
-            <p:ph type="body" idx="1"/>
-          </p:nvPr>
-        </p:nvSpPr>
-        <p:spPr/>
-        <p:txBody>
-          <a:bodyPr/>
-          <a:lstStyle/>
-          <a:p>
-            <a:endParaRPr lang="en-US" dirty="0"/>
-          </a:p>
-        </p:txBody>
-      </p:sp>
-      <p:sp>
-        <p:nvSpPr>
-          <p:cNvPr id="4" name="Slide Number Placeholder 3"/>
-          <p:cNvSpPr>
-            <a:spLocks noGrp="1"/>
-          </p:cNvSpPr>
-          <p:nvPr>
-            <p:ph type="sldNum" sz="quarter" idx="5"/>
-          </p:nvPr>
-        </p:nvSpPr>
-        <p:spPr/>
-        <p:txBody>
-          <a:bodyPr/>
-          <a:lstStyle/>
-          <a:p>
-            <a:fld id="{A926901F-C6C3-9E47-9843-744856EDDD7A}" type="slidenum">
-              <a:rPr lang="en-US" smtClean="0"/>
-              <a:t>11</a:t>
-            </a:fld>
-            <a:endParaRPr lang="en-US"/>
-          </a:p>
-        </p:txBody>
-      </p:sp>
-    </p:spTree>
-    <p:extLst>
-      <p:ext uri="{BB962C8B-B14F-4D97-AF65-F5344CB8AC3E}">
-        <p14:creationId xmlns:p14="http://schemas.microsoft.com/office/powerpoint/2010/main" val="2426652303"/>
+        <p14:creationId xmlns:p14="http://schemas.microsoft.com/office/powerpoint/2010/main" val="2969807775"/>
       </p:ext>
     </p:extLst>
   </p:cSld>
@@ -963,7 +962,7 @@
             </a:pPr>
             <a:fld id="{00000000-1234-1234-1234-123412341234}" type="slidenum">
               <a:rPr lang="en-US"/>
-              <a:t>12</a:t>
+              <a:t>13</a:t>
             </a:fld>
             <a:endParaRPr/>
           </a:p>
@@ -972,7 +971,7 @@
     </p:spTree>
     <p:extLst>
       <p:ext uri="{BB962C8B-B14F-4D97-AF65-F5344CB8AC3E}">
-        <p14:creationId xmlns:p14="http://schemas.microsoft.com/office/powerpoint/2010/main" val="2969807775"/>
+        <p14:creationId xmlns:p14="http://schemas.microsoft.com/office/powerpoint/2010/main" val="3390546939"/>
       </p:ext>
     </p:extLst>
   </p:cSld>
@@ -1119,7 +1118,7 @@
             </a:pPr>
             <a:fld id="{00000000-1234-1234-1234-123412341234}" type="slidenum">
               <a:rPr lang="en-US"/>
-              <a:t>14</a:t>
+              <a:t>15</a:t>
             </a:fld>
             <a:endParaRPr/>
           </a:p>
@@ -1128,7 +1127,7 @@
     </p:spTree>
     <p:extLst>
       <p:ext uri="{BB962C8B-B14F-4D97-AF65-F5344CB8AC3E}">
-        <p14:creationId xmlns:p14="http://schemas.microsoft.com/office/powerpoint/2010/main" val="3390546939"/>
+        <p14:creationId xmlns:p14="http://schemas.microsoft.com/office/powerpoint/2010/main" val="3904221869"/>
       </p:ext>
     </p:extLst>
   </p:cSld>
@@ -1275,7 +1274,7 @@
             </a:pPr>
             <a:fld id="{00000000-1234-1234-1234-123412341234}" type="slidenum">
               <a:rPr lang="en-US"/>
-              <a:t>16</a:t>
+              <a:t>17</a:t>
             </a:fld>
             <a:endParaRPr/>
           </a:p>
@@ -1284,7 +1283,7 @@
     </p:spTree>
     <p:extLst>
       <p:ext uri="{BB962C8B-B14F-4D97-AF65-F5344CB8AC3E}">
-        <p14:creationId xmlns:p14="http://schemas.microsoft.com/office/powerpoint/2010/main" val="3904221869"/>
+        <p14:creationId xmlns:p14="http://schemas.microsoft.com/office/powerpoint/2010/main" val="2137950607"/>
       </p:ext>
     </p:extLst>
   </p:cSld>
@@ -1440,7 +1439,7 @@
     </p:spTree>
     <p:extLst>
       <p:ext uri="{BB962C8B-B14F-4D97-AF65-F5344CB8AC3E}">
-        <p14:creationId xmlns:p14="http://schemas.microsoft.com/office/powerpoint/2010/main" val="2137950607"/>
+        <p14:creationId xmlns:p14="http://schemas.microsoft.com/office/powerpoint/2010/main" val="2041768234"/>
       </p:ext>
     </p:extLst>
   </p:cSld>
@@ -1596,7 +1595,7 @@
     </p:spTree>
     <p:extLst>
       <p:ext uri="{BB962C8B-B14F-4D97-AF65-F5344CB8AC3E}">
-        <p14:creationId xmlns:p14="http://schemas.microsoft.com/office/powerpoint/2010/main" val="2041768234"/>
+        <p14:creationId xmlns:p14="http://schemas.microsoft.com/office/powerpoint/2010/main" val="1470596321"/>
       </p:ext>
     </p:extLst>
   </p:cSld>
@@ -1752,7 +1751,7 @@
     </p:spTree>
     <p:extLst>
       <p:ext uri="{BB962C8B-B14F-4D97-AF65-F5344CB8AC3E}">
-        <p14:creationId xmlns:p14="http://schemas.microsoft.com/office/powerpoint/2010/main" val="1470596321"/>
+        <p14:creationId xmlns:p14="http://schemas.microsoft.com/office/powerpoint/2010/main" val="1402618029"/>
       </p:ext>
     </p:extLst>
   </p:cSld>
@@ -1767,7 +1766,7 @@
   <p:cSld>
     <p:spTree>
       <p:nvGrpSpPr>
-        <p:cNvPr id="1" name="Shape 119"/>
+        <p:cNvPr id="1" name="Shape 908"/>
         <p:cNvGrpSpPr/>
         <p:nvPr/>
       </p:nvGrpSpPr>
@@ -1781,7 +1780,7 @@
       </p:grpSpPr>
       <p:sp>
         <p:nvSpPr>
-          <p:cNvPr id="120" name="Google Shape;120;g12316551eda_0_6:notes"/>
+          <p:cNvPr id="909" name="Google Shape;909;g12316551eda_0_874:notes"/>
           <p:cNvSpPr>
             <a:spLocks noGrp="1" noRot="1" noChangeAspect="1"/>
           </p:cNvSpPr>
@@ -1822,7 +1821,7 @@
       </p:sp>
       <p:sp>
         <p:nvSpPr>
-          <p:cNvPr id="121" name="Google Shape;121;g12316551eda_0_6:notes"/>
+          <p:cNvPr id="910" name="Google Shape;910;g12316551eda_0_874:notes"/>
           <p:cNvSpPr txBox="1">
             <a:spLocks noGrp="1"/>
           </p:cNvSpPr>
@@ -1860,7 +1859,7 @@
       </p:sp>
       <p:sp>
         <p:nvSpPr>
-          <p:cNvPr id="122" name="Google Shape;122;g12316551eda_0_6:notes"/>
+          <p:cNvPr id="911" name="Google Shape;911;g12316551eda_0_874:notes"/>
           <p:cNvSpPr txBox="1">
             <a:spLocks noGrp="1"/>
           </p:cNvSpPr>
@@ -1900,162 +1899,6 @@
             <a:fld id="{00000000-1234-1234-1234-123412341234}" type="slidenum">
               <a:rPr lang="en-US"/>
               <a:t>21</a:t>
-            </a:fld>
-            <a:endParaRPr/>
-          </a:p>
-        </p:txBody>
-      </p:sp>
-    </p:spTree>
-    <p:extLst>
-      <p:ext uri="{BB962C8B-B14F-4D97-AF65-F5344CB8AC3E}">
-        <p14:creationId xmlns:p14="http://schemas.microsoft.com/office/powerpoint/2010/main" val="1402618029"/>
-      </p:ext>
-    </p:extLst>
-  </p:cSld>
-  <p:clrMapOvr>
-    <a:masterClrMapping/>
-  </p:clrMapOvr>
-</p:notes>
-</file>
-
-<file path=ppt/notesSlides/notesSlide19.xml><?xml version="1.0" encoding="utf-8"?>
-<p:notes xmlns:a="http://schemas.openxmlformats.org/drawingml/2006/main" xmlns:r="http://schemas.openxmlformats.org/officeDocument/2006/relationships" xmlns:p="http://schemas.openxmlformats.org/presentationml/2006/main" showMasterSp="0" showMasterPhAnim="0">
-  <p:cSld>
-    <p:spTree>
-      <p:nvGrpSpPr>
-        <p:cNvPr id="1" name="Shape 908"/>
-        <p:cNvGrpSpPr/>
-        <p:nvPr/>
-      </p:nvGrpSpPr>
-      <p:grpSpPr>
-        <a:xfrm>
-          <a:off x="0" y="0"/>
-          <a:ext cx="0" cy="0"/>
-          <a:chOff x="0" y="0"/>
-          <a:chExt cx="0" cy="0"/>
-        </a:xfrm>
-      </p:grpSpPr>
-      <p:sp>
-        <p:nvSpPr>
-          <p:cNvPr id="909" name="Google Shape;909;g12316551eda_0_874:notes"/>
-          <p:cNvSpPr>
-            <a:spLocks noGrp="1" noRot="1" noChangeAspect="1"/>
-          </p:cNvSpPr>
-          <p:nvPr>
-            <p:ph type="sldImg" idx="2"/>
-          </p:nvPr>
-        </p:nvSpPr>
-        <p:spPr>
-          <a:xfrm>
-            <a:off x="685800" y="1143000"/>
-            <a:ext cx="5486400" cy="3086100"/>
-          </a:xfrm>
-          <a:custGeom>
-            <a:avLst/>
-            <a:gdLst/>
-            <a:ahLst/>
-            <a:cxnLst/>
-            <a:rect l="l" t="t" r="r" b="b"/>
-            <a:pathLst>
-              <a:path w="120000" h="120000" extrusionOk="0">
-                <a:moveTo>
-                  <a:pt x="0" y="0"/>
-                </a:moveTo>
-                <a:lnTo>
-                  <a:pt x="120000" y="0"/>
-                </a:lnTo>
-                <a:lnTo>
-                  <a:pt x="120000" y="120000"/>
-                </a:lnTo>
-                <a:lnTo>
-                  <a:pt x="0" y="120000"/>
-                </a:lnTo>
-                <a:close/>
-              </a:path>
-            </a:pathLst>
-          </a:custGeom>
-        </p:spPr>
-      </p:sp>
-      <p:sp>
-        <p:nvSpPr>
-          <p:cNvPr id="910" name="Google Shape;910;g12316551eda_0_874:notes"/>
-          <p:cNvSpPr txBox="1">
-            <a:spLocks noGrp="1"/>
-          </p:cNvSpPr>
-          <p:nvPr>
-            <p:ph type="body" idx="1"/>
-          </p:nvPr>
-        </p:nvSpPr>
-        <p:spPr>
-          <a:xfrm>
-            <a:off x="685800" y="4400550"/>
-            <a:ext cx="5486400" cy="3600600"/>
-          </a:xfrm>
-          <a:prstGeom prst="rect">
-            <a:avLst/>
-          </a:prstGeom>
-        </p:spPr>
-        <p:txBody>
-          <a:bodyPr spcFirstLastPara="1" wrap="square" lIns="91425" tIns="45700" rIns="91425" bIns="45700" anchor="t" anchorCtr="0">
-            <a:noAutofit/>
-          </a:bodyPr>
-          <a:lstStyle/>
-          <a:p>
-            <a:pPr marL="0" lvl="0" indent="0" algn="l" rtl="0">
-              <a:spcBef>
-                <a:spcPts val="0"/>
-              </a:spcBef>
-              <a:spcAft>
-                <a:spcPts val="0"/>
-              </a:spcAft>
-              <a:buNone/>
-            </a:pPr>
-            <a:endParaRPr/>
-          </a:p>
-        </p:txBody>
-      </p:sp>
-      <p:sp>
-        <p:nvSpPr>
-          <p:cNvPr id="911" name="Google Shape;911;g12316551eda_0_874:notes"/>
-          <p:cNvSpPr txBox="1">
-            <a:spLocks noGrp="1"/>
-          </p:cNvSpPr>
-          <p:nvPr>
-            <p:ph type="sldNum" idx="12"/>
-          </p:nvPr>
-        </p:nvSpPr>
-        <p:spPr>
-          <a:xfrm>
-            <a:off x="3884613" y="8685213"/>
-            <a:ext cx="2971800" cy="458700"/>
-          </a:xfrm>
-          <a:prstGeom prst="rect">
-            <a:avLst/>
-          </a:prstGeom>
-        </p:spPr>
-        <p:txBody>
-          <a:bodyPr spcFirstLastPara="1" wrap="square" lIns="91425" tIns="45700" rIns="91425" bIns="45700" anchor="b" anchorCtr="0">
-            <a:noAutofit/>
-          </a:bodyPr>
-          <a:lstStyle/>
-          <a:p>
-            <a:pPr marL="0" lvl="0" indent="0" algn="r" rtl="0">
-              <a:spcBef>
-                <a:spcPts val="0"/>
-              </a:spcBef>
-              <a:spcAft>
-                <a:spcPts val="0"/>
-              </a:spcAft>
-              <a:buClr>
-                <a:srgbClr val="000000"/>
-              </a:buClr>
-              <a:buSzPts val="1200"/>
-              <a:buFont typeface="Arial"/>
-              <a:buNone/>
-            </a:pPr>
-            <a:fld id="{00000000-1234-1234-1234-123412341234}" type="slidenum">
-              <a:rPr lang="en-US"/>
-              <a:t>22</a:t>
             </a:fld>
             <a:endParaRPr/>
           </a:p>
@@ -2213,11 +2056,6 @@
         </p:txBody>
       </p:sp>
     </p:spTree>
-    <p:extLst>
-      <p:ext uri="{BB962C8B-B14F-4D97-AF65-F5344CB8AC3E}">
-        <p14:creationId xmlns:p14="http://schemas.microsoft.com/office/powerpoint/2010/main" val="1540075850"/>
-      </p:ext>
-    </p:extLst>
   </p:cSld>
   <p:clrMapOvr>
     <a:masterClrMapping/>
@@ -2230,7 +2068,7 @@
   <p:cSld>
     <p:spTree>
       <p:nvGrpSpPr>
-        <p:cNvPr id="1" name="Shape 119"/>
+        <p:cNvPr id="1" name="Shape 127"/>
         <p:cNvGrpSpPr/>
         <p:nvPr/>
       </p:nvGrpSpPr>
@@ -2244,7 +2082,7 @@
       </p:grpSpPr>
       <p:sp>
         <p:nvSpPr>
-          <p:cNvPr id="120" name="Google Shape;120;g12316551eda_0_6:notes"/>
+          <p:cNvPr id="128" name="Google Shape;128;g12316551eda_0_13:notes"/>
           <p:cNvSpPr>
             <a:spLocks noGrp="1" noRot="1" noChangeAspect="1"/>
           </p:cNvSpPr>
@@ -2285,7 +2123,7 @@
       </p:sp>
       <p:sp>
         <p:nvSpPr>
-          <p:cNvPr id="121" name="Google Shape;121;g12316551eda_0_6:notes"/>
+          <p:cNvPr id="129" name="Google Shape;129;g12316551eda_0_13:notes"/>
           <p:cNvSpPr txBox="1">
             <a:spLocks noGrp="1"/>
           </p:cNvSpPr>
@@ -2317,13 +2155,13 @@
               </a:spcAft>
               <a:buNone/>
             </a:pPr>
-            <a:endParaRPr/>
-          </a:p>
-        </p:txBody>
-      </p:sp>
-      <p:sp>
-        <p:nvSpPr>
-          <p:cNvPr id="122" name="Google Shape;122;g12316551eda_0_6:notes"/>
+            <a:endParaRPr dirty="0"/>
+          </a:p>
+        </p:txBody>
+      </p:sp>
+      <p:sp>
+        <p:nvSpPr>
+          <p:cNvPr id="130" name="Google Shape;130;g12316551eda_0_13:notes"/>
           <p:cNvSpPr txBox="1">
             <a:spLocks noGrp="1"/>
           </p:cNvSpPr>
@@ -2381,7 +2219,7 @@
   <p:cSld>
     <p:spTree>
       <p:nvGrpSpPr>
-        <p:cNvPr id="1" name="Shape 127"/>
+        <p:cNvPr id="1" name="Shape 893"/>
         <p:cNvGrpSpPr/>
         <p:nvPr/>
       </p:nvGrpSpPr>
@@ -2395,7 +2233,7 @@
       </p:grpSpPr>
       <p:sp>
         <p:nvSpPr>
-          <p:cNvPr id="128" name="Google Shape;128;g12316551eda_0_13:notes"/>
+          <p:cNvPr id="894" name="Google Shape;894;g12316551eda_0_860:notes"/>
           <p:cNvSpPr>
             <a:spLocks noGrp="1" noRot="1" noChangeAspect="1"/>
           </p:cNvSpPr>
@@ -2436,7 +2274,7 @@
       </p:sp>
       <p:sp>
         <p:nvSpPr>
-          <p:cNvPr id="129" name="Google Shape;129;g12316551eda_0_13:notes"/>
+          <p:cNvPr id="895" name="Google Shape;895;g12316551eda_0_860:notes"/>
           <p:cNvSpPr txBox="1">
             <a:spLocks noGrp="1"/>
           </p:cNvSpPr>
@@ -2474,7 +2312,7 @@
       </p:sp>
       <p:sp>
         <p:nvSpPr>
-          <p:cNvPr id="130" name="Google Shape;130;g12316551eda_0_13:notes"/>
+          <p:cNvPr id="896" name="Google Shape;896;g12316551eda_0_860:notes"/>
           <p:cNvSpPr txBox="1">
             <a:spLocks noGrp="1"/>
           </p:cNvSpPr>
@@ -2671,6 +2509,11 @@
         </p:txBody>
       </p:sp>
     </p:spTree>
+    <p:extLst>
+      <p:ext uri="{BB962C8B-B14F-4D97-AF65-F5344CB8AC3E}">
+        <p14:creationId xmlns:p14="http://schemas.microsoft.com/office/powerpoint/2010/main" val="2047930893"/>
+      </p:ext>
+    </p:extLst>
   </p:cSld>
   <p:clrMapOvr>
     <a:masterClrMapping/>
@@ -2683,7 +2526,7 @@
   <p:cSld>
     <p:spTree>
       <p:nvGrpSpPr>
-        <p:cNvPr id="1" name="Shape 893"/>
+        <p:cNvPr id="1" name="Shape 119"/>
         <p:cNvGrpSpPr/>
         <p:nvPr/>
       </p:nvGrpSpPr>
@@ -2697,7 +2540,7 @@
       </p:grpSpPr>
       <p:sp>
         <p:nvSpPr>
-          <p:cNvPr id="894" name="Google Shape;894;g12316551eda_0_860:notes"/>
+          <p:cNvPr id="120" name="Google Shape;120;g12316551eda_0_6:notes"/>
           <p:cNvSpPr>
             <a:spLocks noGrp="1" noRot="1" noChangeAspect="1"/>
           </p:cNvSpPr>
@@ -2738,7 +2581,7 @@
       </p:sp>
       <p:sp>
         <p:nvSpPr>
-          <p:cNvPr id="895" name="Google Shape;895;g12316551eda_0_860:notes"/>
+          <p:cNvPr id="121" name="Google Shape;121;g12316551eda_0_6:notes"/>
           <p:cNvSpPr txBox="1">
             <a:spLocks noGrp="1"/>
           </p:cNvSpPr>
@@ -2770,13 +2613,13 @@
               </a:spcAft>
               <a:buNone/>
             </a:pPr>
-            <a:endParaRPr dirty="0"/>
-          </a:p>
-        </p:txBody>
-      </p:sp>
-      <p:sp>
-        <p:nvSpPr>
-          <p:cNvPr id="896" name="Google Shape;896;g12316551eda_0_860:notes"/>
+            <a:endParaRPr/>
+          </a:p>
+        </p:txBody>
+      </p:sp>
+      <p:sp>
+        <p:nvSpPr>
+          <p:cNvPr id="122" name="Google Shape;122;g12316551eda_0_6:notes"/>
           <p:cNvSpPr txBox="1">
             <a:spLocks noGrp="1"/>
           </p:cNvSpPr>
@@ -2824,7 +2667,7 @@
     </p:spTree>
     <p:extLst>
       <p:ext uri="{BB962C8B-B14F-4D97-AF65-F5344CB8AC3E}">
-        <p14:creationId xmlns:p14="http://schemas.microsoft.com/office/powerpoint/2010/main" val="2047930893"/>
+        <p14:creationId xmlns:p14="http://schemas.microsoft.com/office/powerpoint/2010/main" val="1886152002"/>
       </p:ext>
     </p:extLst>
   </p:cSld>
@@ -2980,7 +2823,7 @@
     </p:spTree>
     <p:extLst>
       <p:ext uri="{BB962C8B-B14F-4D97-AF65-F5344CB8AC3E}">
-        <p14:creationId xmlns:p14="http://schemas.microsoft.com/office/powerpoint/2010/main" val="1886152002"/>
+        <p14:creationId xmlns:p14="http://schemas.microsoft.com/office/powerpoint/2010/main" val="1030397016"/>
       </p:ext>
     </p:extLst>
   </p:cSld>
@@ -2995,7 +2838,7 @@
   <p:cSld>
     <p:spTree>
       <p:nvGrpSpPr>
-        <p:cNvPr id="1" name="Shape 119"/>
+        <p:cNvPr id="1" name="Shape 105"/>
         <p:cNvGrpSpPr/>
         <p:nvPr/>
       </p:nvGrpSpPr>
@@ -3009,7 +2852,49 @@
       </p:grpSpPr>
       <p:sp>
         <p:nvSpPr>
-          <p:cNvPr id="120" name="Google Shape;120;g12316551eda_0_6:notes"/>
+          <p:cNvPr id="106" name="Google Shape;106;g11c4bc19b72_1_0:notes"/>
+          <p:cNvSpPr txBox="1">
+            <a:spLocks noGrp="1"/>
+          </p:cNvSpPr>
+          <p:nvPr>
+            <p:ph type="body" idx="1"/>
+          </p:nvPr>
+        </p:nvSpPr>
+        <p:spPr>
+          <a:xfrm>
+            <a:off x="685800" y="4400550"/>
+            <a:ext cx="5486400" cy="3600600"/>
+          </a:xfrm>
+          <a:prstGeom prst="rect">
+            <a:avLst/>
+          </a:prstGeom>
+        </p:spPr>
+        <p:txBody>
+          <a:bodyPr spcFirstLastPara="1" wrap="square" lIns="91425" tIns="45700" rIns="91425" bIns="45700" anchor="t" anchorCtr="0">
+            <a:noAutofit/>
+          </a:bodyPr>
+          <a:lstStyle/>
+          <a:p>
+            <a:pPr marL="0" lvl="0" indent="0" algn="l" rtl="0">
+              <a:spcBef>
+                <a:spcPts val="0"/>
+              </a:spcBef>
+              <a:spcAft>
+                <a:spcPts val="0"/>
+              </a:spcAft>
+              <a:buNone/>
+            </a:pPr>
+            <a:r>
+              <a:rPr lang="en-US" dirty="0"/>
+              <a:t>Stack exchange but for RC specifically</a:t>
+            </a:r>
+            <a:endParaRPr dirty="0"/>
+          </a:p>
+        </p:txBody>
+      </p:sp>
+      <p:sp>
+        <p:nvSpPr>
+          <p:cNvPr id="107" name="Google Shape;107;g11c4bc19b72_1_0:notes"/>
           <p:cNvSpPr>
             <a:spLocks noGrp="1" noRot="1" noChangeAspect="1"/>
           </p:cNvSpPr>
@@ -3048,97 +2933,7 @@
           </a:custGeom>
         </p:spPr>
       </p:sp>
-      <p:sp>
-        <p:nvSpPr>
-          <p:cNvPr id="121" name="Google Shape;121;g12316551eda_0_6:notes"/>
-          <p:cNvSpPr txBox="1">
-            <a:spLocks noGrp="1"/>
-          </p:cNvSpPr>
-          <p:nvPr>
-            <p:ph type="body" idx="1"/>
-          </p:nvPr>
-        </p:nvSpPr>
-        <p:spPr>
-          <a:xfrm>
-            <a:off x="685800" y="4400550"/>
-            <a:ext cx="5486400" cy="3600600"/>
-          </a:xfrm>
-          <a:prstGeom prst="rect">
-            <a:avLst/>
-          </a:prstGeom>
-        </p:spPr>
-        <p:txBody>
-          <a:bodyPr spcFirstLastPara="1" wrap="square" lIns="91425" tIns="45700" rIns="91425" bIns="45700" anchor="t" anchorCtr="0">
-            <a:noAutofit/>
-          </a:bodyPr>
-          <a:lstStyle/>
-          <a:p>
-            <a:pPr marL="0" lvl="0" indent="0" algn="l" rtl="0">
-              <a:spcBef>
-                <a:spcPts val="0"/>
-              </a:spcBef>
-              <a:spcAft>
-                <a:spcPts val="0"/>
-              </a:spcAft>
-              <a:buNone/>
-            </a:pPr>
-            <a:endParaRPr/>
-          </a:p>
-        </p:txBody>
-      </p:sp>
-      <p:sp>
-        <p:nvSpPr>
-          <p:cNvPr id="122" name="Google Shape;122;g12316551eda_0_6:notes"/>
-          <p:cNvSpPr txBox="1">
-            <a:spLocks noGrp="1"/>
-          </p:cNvSpPr>
-          <p:nvPr>
-            <p:ph type="sldNum" idx="12"/>
-          </p:nvPr>
-        </p:nvSpPr>
-        <p:spPr>
-          <a:xfrm>
-            <a:off x="3884613" y="8685213"/>
-            <a:ext cx="2971800" cy="458700"/>
-          </a:xfrm>
-          <a:prstGeom prst="rect">
-            <a:avLst/>
-          </a:prstGeom>
-        </p:spPr>
-        <p:txBody>
-          <a:bodyPr spcFirstLastPara="1" wrap="square" lIns="91425" tIns="45700" rIns="91425" bIns="45700" anchor="b" anchorCtr="0">
-            <a:noAutofit/>
-          </a:bodyPr>
-          <a:lstStyle/>
-          <a:p>
-            <a:pPr marL="0" lvl="0" indent="0" algn="r" rtl="0">
-              <a:spcBef>
-                <a:spcPts val="0"/>
-              </a:spcBef>
-              <a:spcAft>
-                <a:spcPts val="0"/>
-              </a:spcAft>
-              <a:buClr>
-                <a:srgbClr val="000000"/>
-              </a:buClr>
-              <a:buSzPts val="1200"/>
-              <a:buFont typeface="Arial"/>
-              <a:buNone/>
-            </a:pPr>
-            <a:fld id="{00000000-1234-1234-1234-123412341234}" type="slidenum">
-              <a:rPr lang="en-US"/>
-              <a:t>8</a:t>
-            </a:fld>
-            <a:endParaRPr/>
-          </a:p>
-        </p:txBody>
-      </p:sp>
     </p:spTree>
-    <p:extLst>
-      <p:ext uri="{BB962C8B-B14F-4D97-AF65-F5344CB8AC3E}">
-        <p14:creationId xmlns:p14="http://schemas.microsoft.com/office/powerpoint/2010/main" val="1030397016"/>
-      </p:ext>
-    </p:extLst>
   </p:cSld>
   <p:clrMapOvr>
     <a:masterClrMapping/>
@@ -3151,7 +2946,7 @@
   <p:cSld>
     <p:spTree>
       <p:nvGrpSpPr>
-        <p:cNvPr id="1" name="Shape 105"/>
+        <p:cNvPr id="1" name="Shape 119"/>
         <p:cNvGrpSpPr/>
         <p:nvPr/>
       </p:nvGrpSpPr>
@@ -3165,49 +2960,7 @@
       </p:grpSpPr>
       <p:sp>
         <p:nvSpPr>
-          <p:cNvPr id="106" name="Google Shape;106;g11c4bc19b72_1_0:notes"/>
-          <p:cNvSpPr txBox="1">
-            <a:spLocks noGrp="1"/>
-          </p:cNvSpPr>
-          <p:nvPr>
-            <p:ph type="body" idx="1"/>
-          </p:nvPr>
-        </p:nvSpPr>
-        <p:spPr>
-          <a:xfrm>
-            <a:off x="685800" y="4400550"/>
-            <a:ext cx="5486400" cy="3600600"/>
-          </a:xfrm>
-          <a:prstGeom prst="rect">
-            <a:avLst/>
-          </a:prstGeom>
-        </p:spPr>
-        <p:txBody>
-          <a:bodyPr spcFirstLastPara="1" wrap="square" lIns="91425" tIns="45700" rIns="91425" bIns="45700" anchor="t" anchorCtr="0">
-            <a:noAutofit/>
-          </a:bodyPr>
-          <a:lstStyle/>
-          <a:p>
-            <a:pPr marL="0" lvl="0" indent="0" algn="l" rtl="0">
-              <a:spcBef>
-                <a:spcPts val="0"/>
-              </a:spcBef>
-              <a:spcAft>
-                <a:spcPts val="0"/>
-              </a:spcAft>
-              <a:buNone/>
-            </a:pPr>
-            <a:r>
-              <a:rPr lang="en-US" dirty="0"/>
-              <a:t>Stack exchange but for RC specifically</a:t>
-            </a:r>
-            <a:endParaRPr dirty="0"/>
-          </a:p>
-        </p:txBody>
-      </p:sp>
-      <p:sp>
-        <p:nvSpPr>
-          <p:cNvPr id="107" name="Google Shape;107;g11c4bc19b72_1_0:notes"/>
+          <p:cNvPr id="120" name="Google Shape;120;g12316551eda_0_6:notes"/>
           <p:cNvSpPr>
             <a:spLocks noGrp="1" noRot="1" noChangeAspect="1"/>
           </p:cNvSpPr>
@@ -3246,7 +2999,97 @@
           </a:custGeom>
         </p:spPr>
       </p:sp>
+      <p:sp>
+        <p:nvSpPr>
+          <p:cNvPr id="121" name="Google Shape;121;g12316551eda_0_6:notes"/>
+          <p:cNvSpPr txBox="1">
+            <a:spLocks noGrp="1"/>
+          </p:cNvSpPr>
+          <p:nvPr>
+            <p:ph type="body" idx="1"/>
+          </p:nvPr>
+        </p:nvSpPr>
+        <p:spPr>
+          <a:xfrm>
+            <a:off x="685800" y="4400550"/>
+            <a:ext cx="5486400" cy="3600600"/>
+          </a:xfrm>
+          <a:prstGeom prst="rect">
+            <a:avLst/>
+          </a:prstGeom>
+        </p:spPr>
+        <p:txBody>
+          <a:bodyPr spcFirstLastPara="1" wrap="square" lIns="91425" tIns="45700" rIns="91425" bIns="45700" anchor="t" anchorCtr="0">
+            <a:noAutofit/>
+          </a:bodyPr>
+          <a:lstStyle/>
+          <a:p>
+            <a:pPr marL="0" lvl="0" indent="0" algn="l" rtl="0">
+              <a:spcBef>
+                <a:spcPts val="0"/>
+              </a:spcBef>
+              <a:spcAft>
+                <a:spcPts val="0"/>
+              </a:spcAft>
+              <a:buNone/>
+            </a:pPr>
+            <a:endParaRPr/>
+          </a:p>
+        </p:txBody>
+      </p:sp>
+      <p:sp>
+        <p:nvSpPr>
+          <p:cNvPr id="122" name="Google Shape;122;g12316551eda_0_6:notes"/>
+          <p:cNvSpPr txBox="1">
+            <a:spLocks noGrp="1"/>
+          </p:cNvSpPr>
+          <p:nvPr>
+            <p:ph type="sldNum" idx="12"/>
+          </p:nvPr>
+        </p:nvSpPr>
+        <p:spPr>
+          <a:xfrm>
+            <a:off x="3884613" y="8685213"/>
+            <a:ext cx="2971800" cy="458700"/>
+          </a:xfrm>
+          <a:prstGeom prst="rect">
+            <a:avLst/>
+          </a:prstGeom>
+        </p:spPr>
+        <p:txBody>
+          <a:bodyPr spcFirstLastPara="1" wrap="square" lIns="91425" tIns="45700" rIns="91425" bIns="45700" anchor="b" anchorCtr="0">
+            <a:noAutofit/>
+          </a:bodyPr>
+          <a:lstStyle/>
+          <a:p>
+            <a:pPr marL="0" lvl="0" indent="0" algn="r" rtl="0">
+              <a:spcBef>
+                <a:spcPts val="0"/>
+              </a:spcBef>
+              <a:spcAft>
+                <a:spcPts val="0"/>
+              </a:spcAft>
+              <a:buClr>
+                <a:srgbClr val="000000"/>
+              </a:buClr>
+              <a:buSzPts val="1200"/>
+              <a:buFont typeface="Arial"/>
+              <a:buNone/>
+            </a:pPr>
+            <a:fld id="{00000000-1234-1234-1234-123412341234}" type="slidenum">
+              <a:rPr lang="en-US"/>
+              <a:t>9</a:t>
+            </a:fld>
+            <a:endParaRPr/>
+          </a:p>
+        </p:txBody>
+      </p:sp>
     </p:spTree>
+    <p:extLst>
+      <p:ext uri="{BB962C8B-B14F-4D97-AF65-F5344CB8AC3E}">
+        <p14:creationId xmlns:p14="http://schemas.microsoft.com/office/powerpoint/2010/main" val="2166091548"/>
+      </p:ext>
+    </p:extLst>
   </p:cSld>
   <p:clrMapOvr>
     <a:masterClrMapping/>
@@ -4356,154 +4199,6 @@
   <p:cSld>
     <p:spTree>
       <p:nvGrpSpPr>
-        <p:cNvPr id="1" name="Shape 123"/>
-        <p:cNvGrpSpPr/>
-        <p:nvPr/>
-      </p:nvGrpSpPr>
-      <p:grpSpPr>
-        <a:xfrm>
-          <a:off x="0" y="0"/>
-          <a:ext cx="0" cy="0"/>
-          <a:chOff x="0" y="0"/>
-          <a:chExt cx="0" cy="0"/>
-        </a:xfrm>
-      </p:grpSpPr>
-      <p:sp>
-        <p:nvSpPr>
-          <p:cNvPr id="124" name="Google Shape;124;p18"/>
-          <p:cNvSpPr txBox="1">
-            <a:spLocks noGrp="1"/>
-          </p:cNvSpPr>
-          <p:nvPr>
-            <p:ph type="title"/>
-          </p:nvPr>
-        </p:nvSpPr>
-        <p:spPr>
-          <a:xfrm>
-            <a:off x="838200" y="365125"/>
-            <a:ext cx="10515600" cy="1325700"/>
-          </a:xfrm>
-          <a:prstGeom prst="rect">
-            <a:avLst/>
-          </a:prstGeom>
-        </p:spPr>
-        <p:txBody>
-          <a:bodyPr spcFirstLastPara="1" wrap="square" lIns="91425" tIns="45700" rIns="91425" bIns="45700" anchor="ctr" anchorCtr="0">
-            <a:normAutofit/>
-          </a:bodyPr>
-          <a:lstStyle/>
-          <a:p>
-            <a:pPr marL="0" lvl="0" indent="0" algn="l" rtl="0">
-              <a:spcBef>
-                <a:spcPts val="0"/>
-              </a:spcBef>
-              <a:spcAft>
-                <a:spcPts val="0"/>
-              </a:spcAft>
-              <a:buNone/>
-            </a:pPr>
-            <a:r>
-              <a:rPr lang="en-US" dirty="0"/>
-              <a:t>Composing an effective ticket</a:t>
-            </a:r>
-            <a:endParaRPr dirty="0"/>
-          </a:p>
-        </p:txBody>
-      </p:sp>
-      <p:sp>
-        <p:nvSpPr>
-          <p:cNvPr id="126" name="Google Shape;126;p18"/>
-          <p:cNvSpPr txBox="1">
-            <a:spLocks noGrp="1"/>
-          </p:cNvSpPr>
-          <p:nvPr>
-            <p:ph type="sldNum" idx="12"/>
-          </p:nvPr>
-        </p:nvSpPr>
-        <p:spPr>
-          <a:xfrm>
-            <a:off x="8610600" y="6356350"/>
-            <a:ext cx="682800" cy="365100"/>
-          </a:xfrm>
-          <a:prstGeom prst="rect">
-            <a:avLst/>
-          </a:prstGeom>
-        </p:spPr>
-        <p:txBody>
-          <a:bodyPr spcFirstLastPara="1" wrap="square" lIns="91425" tIns="45700" rIns="91425" bIns="45700" anchor="ctr" anchorCtr="0">
-            <a:noAutofit/>
-          </a:bodyPr>
-          <a:lstStyle/>
-          <a:p>
-            <a:pPr marL="0" lvl="0" indent="0" algn="l" rtl="0">
-              <a:spcBef>
-                <a:spcPts val="0"/>
-              </a:spcBef>
-              <a:spcAft>
-                <a:spcPts val="0"/>
-              </a:spcAft>
-              <a:buClr>
-                <a:srgbClr val="000000"/>
-              </a:buClr>
-              <a:buSzPts val="1200"/>
-              <a:buFont typeface="Arial"/>
-              <a:buNone/>
-            </a:pPr>
-            <a:fld id="{00000000-1234-1234-1234-123412341234}" type="slidenum">
-              <a:rPr lang="en-US"/>
-              <a:t>10</a:t>
-            </a:fld>
-            <a:endParaRPr/>
-          </a:p>
-        </p:txBody>
-      </p:sp>
-      <p:sp>
-        <p:nvSpPr>
-          <p:cNvPr id="2" name="Date Placeholder 1">
-            <a:extLst>
-              <a:ext uri="{FF2B5EF4-FFF2-40B4-BE49-F238E27FC236}">
-                <a16:creationId xmlns:a16="http://schemas.microsoft.com/office/drawing/2014/main" id="{0DD02C7C-E9B8-5F77-97D9-27140B71DA76}"/>
-              </a:ext>
-            </a:extLst>
-          </p:cNvPr>
-          <p:cNvSpPr>
-            <a:spLocks noGrp="1"/>
-          </p:cNvSpPr>
-          <p:nvPr>
-            <p:ph type="dt" sz="half" idx="10"/>
-          </p:nvPr>
-        </p:nvSpPr>
-        <p:spPr/>
-        <p:txBody>
-          <a:bodyPr/>
-          <a:lstStyle/>
-          <a:p>
-            <a:pPr algn="ctr"/>
-            <a:r>
-              <a:rPr lang="en-US"/>
-              <a:t>8/12/2024</a:t>
-            </a:r>
-          </a:p>
-        </p:txBody>
-      </p:sp>
-    </p:spTree>
-    <p:extLst>
-      <p:ext uri="{BB962C8B-B14F-4D97-AF65-F5344CB8AC3E}">
-        <p14:creationId xmlns:p14="http://schemas.microsoft.com/office/powerpoint/2010/main" val="3375651352"/>
-      </p:ext>
-    </p:extLst>
-  </p:cSld>
-  <p:clrMapOvr>
-    <a:masterClrMapping/>
-  </p:clrMapOvr>
-</p:sld>
-</file>
-
-<file path=ppt/slides/slide11.xml><?xml version="1.0" encoding="utf-8"?>
-<p:sld xmlns:a="http://schemas.openxmlformats.org/drawingml/2006/main" xmlns:r="http://schemas.openxmlformats.org/officeDocument/2006/relationships" xmlns:p="http://schemas.openxmlformats.org/presentationml/2006/main">
-  <p:cSld>
-    <p:spTree>
-      <p:nvGrpSpPr>
         <p:cNvPr id="1" name=""/>
         <p:cNvGrpSpPr/>
         <p:nvPr/>
@@ -5117,7 +4812,7 @@
             </a:pPr>
             <a:fld id="{00000000-1234-1234-1234-123412341234}" type="slidenum">
               <a:rPr lang="en-US" smtClean="0"/>
-              <a:t>11</a:t>
+              <a:t>10</a:t>
             </a:fld>
             <a:endParaRPr lang="en-US" dirty="0"/>
           </a:p>
@@ -5165,7 +4860,7 @@
 </p:sld>
 </file>
 
-<file path=ppt/slides/slide12.xml><?xml version="1.0" encoding="utf-8"?>
+<file path=ppt/slides/slide11.xml><?xml version="1.0" encoding="utf-8"?>
 <p:sld xmlns:a="http://schemas.openxmlformats.org/drawingml/2006/main" xmlns:r="http://schemas.openxmlformats.org/officeDocument/2006/relationships" xmlns:p="http://schemas.openxmlformats.org/presentationml/2006/main">
   <p:cSld>
     <p:spTree>
@@ -5370,7 +5065,7 @@
             </a:pPr>
             <a:fld id="{00000000-1234-1234-1234-123412341234}" type="slidenum">
               <a:rPr lang="en-US"/>
-              <a:t>12</a:t>
+              <a:t>11</a:t>
             </a:fld>
             <a:endParaRPr/>
           </a:p>
@@ -5418,7 +5113,7 @@
 </p:sld>
 </file>
 
-<file path=ppt/slides/slide13.xml><?xml version="1.0" encoding="utf-8"?>
+<file path=ppt/slides/slide12.xml><?xml version="1.0" encoding="utf-8"?>
 <p:sld xmlns:a="http://schemas.openxmlformats.org/drawingml/2006/main" xmlns:r="http://schemas.openxmlformats.org/officeDocument/2006/relationships" xmlns:p="http://schemas.openxmlformats.org/presentationml/2006/main">
   <p:cSld>
     <p:spTree>
@@ -5978,7 +5673,7 @@
             </a:pPr>
             <a:fld id="{00000000-1234-1234-1234-123412341234}" type="slidenum">
               <a:rPr lang="en-US" smtClean="0"/>
-              <a:t>13</a:t>
+              <a:t>12</a:t>
             </a:fld>
             <a:endParaRPr lang="en-US"/>
           </a:p>
@@ -6026,7 +5721,7 @@
 </p:sld>
 </file>
 
-<file path=ppt/slides/slide14.xml><?xml version="1.0" encoding="utf-8"?>
+<file path=ppt/slides/slide13.xml><?xml version="1.0" encoding="utf-8"?>
 <p:sld xmlns:a="http://schemas.openxmlformats.org/drawingml/2006/main" xmlns:r="http://schemas.openxmlformats.org/officeDocument/2006/relationships" xmlns:p="http://schemas.openxmlformats.org/presentationml/2006/main">
   <p:cSld>
     <p:spTree>
@@ -6230,7 +5925,7 @@
             </a:pPr>
             <a:fld id="{00000000-1234-1234-1234-123412341234}" type="slidenum">
               <a:rPr lang="en-US"/>
-              <a:t>14</a:t>
+              <a:t>13</a:t>
             </a:fld>
             <a:endParaRPr/>
           </a:p>
@@ -6278,7 +5973,7 @@
 </p:sld>
 </file>
 
-<file path=ppt/slides/slide15.xml><?xml version="1.0" encoding="utf-8"?>
+<file path=ppt/slides/slide14.xml><?xml version="1.0" encoding="utf-8"?>
 <p:sld xmlns:a="http://schemas.openxmlformats.org/drawingml/2006/main" xmlns:r="http://schemas.openxmlformats.org/officeDocument/2006/relationships" xmlns:p="http://schemas.openxmlformats.org/presentationml/2006/main">
   <p:cSld>
     <p:spTree>
@@ -6921,7 +6616,7 @@
             </a:pPr>
             <a:fld id="{00000000-1234-1234-1234-123412341234}" type="slidenum">
               <a:rPr lang="en-US" smtClean="0"/>
-              <a:t>15</a:t>
+              <a:t>14</a:t>
             </a:fld>
             <a:endParaRPr lang="en-US"/>
           </a:p>
@@ -6969,7 +6664,7 @@
 </p:sld>
 </file>
 
-<file path=ppt/slides/slide16.xml><?xml version="1.0" encoding="utf-8"?>
+<file path=ppt/slides/slide15.xml><?xml version="1.0" encoding="utf-8"?>
 <p:sld xmlns:a="http://schemas.openxmlformats.org/drawingml/2006/main" xmlns:r="http://schemas.openxmlformats.org/officeDocument/2006/relationships" xmlns:p="http://schemas.openxmlformats.org/presentationml/2006/main">
   <p:cSld>
     <p:spTree>
@@ -7176,7 +6871,7 @@
             </a:pPr>
             <a:fld id="{00000000-1234-1234-1234-123412341234}" type="slidenum">
               <a:rPr lang="en-US"/>
-              <a:t>16</a:t>
+              <a:t>15</a:t>
             </a:fld>
             <a:endParaRPr/>
           </a:p>
@@ -7224,7 +6919,7 @@
 </p:sld>
 </file>
 
-<file path=ppt/slides/slide17.xml><?xml version="1.0" encoding="utf-8"?>
+<file path=ppt/slides/slide16.xml><?xml version="1.0" encoding="utf-8"?>
 <p:sld xmlns:a="http://schemas.openxmlformats.org/drawingml/2006/main" xmlns:r="http://schemas.openxmlformats.org/officeDocument/2006/relationships" xmlns:p="http://schemas.openxmlformats.org/presentationml/2006/main">
   <p:cSld>
     <p:spTree>
@@ -7806,7 +7501,7 @@
             </a:pPr>
             <a:fld id="{00000000-1234-1234-1234-123412341234}" type="slidenum">
               <a:rPr lang="en-US" smtClean="0"/>
-              <a:t>17</a:t>
+              <a:t>16</a:t>
             </a:fld>
             <a:endParaRPr lang="en-US"/>
           </a:p>
@@ -7845,6 +7540,276 @@
     <p:extLst>
       <p:ext uri="{BB962C8B-B14F-4D97-AF65-F5344CB8AC3E}">
         <p14:creationId xmlns:p14="http://schemas.microsoft.com/office/powerpoint/2010/main" val="1288203050"/>
+      </p:ext>
+    </p:extLst>
+  </p:cSld>
+  <p:clrMapOvr>
+    <a:masterClrMapping/>
+  </p:clrMapOvr>
+</p:sld>
+</file>
+
+<file path=ppt/slides/slide17.xml><?xml version="1.0" encoding="utf-8"?>
+<p:sld xmlns:a="http://schemas.openxmlformats.org/drawingml/2006/main" xmlns:r="http://schemas.openxmlformats.org/officeDocument/2006/relationships" xmlns:p="http://schemas.openxmlformats.org/presentationml/2006/main">
+  <p:cSld>
+    <p:spTree>
+      <p:nvGrpSpPr>
+        <p:cNvPr id="1" name="Shape 123"/>
+        <p:cNvGrpSpPr/>
+        <p:nvPr/>
+      </p:nvGrpSpPr>
+      <p:grpSpPr>
+        <a:xfrm>
+          <a:off x="0" y="0"/>
+          <a:ext cx="0" cy="0"/>
+          <a:chOff x="0" y="0"/>
+          <a:chExt cx="0" cy="0"/>
+        </a:xfrm>
+      </p:grpSpPr>
+      <p:sp>
+        <p:nvSpPr>
+          <p:cNvPr id="5" name="Google Shape;124;p18">
+            <a:extLst>
+              <a:ext uri="{FF2B5EF4-FFF2-40B4-BE49-F238E27FC236}">
+                <a16:creationId xmlns:a16="http://schemas.microsoft.com/office/drawing/2014/main" id="{E174B142-95AC-6A2A-AF57-F4A76620923B}"/>
+              </a:ext>
+            </a:extLst>
+          </p:cNvPr>
+          <p:cNvSpPr txBox="1">
+            <a:spLocks noGrp="1"/>
+          </p:cNvSpPr>
+          <p:nvPr>
+            <p:ph type="title"/>
+          </p:nvPr>
+        </p:nvSpPr>
+        <p:spPr>
+          <a:xfrm>
+            <a:off x="838199" y="365125"/>
+            <a:ext cx="11029545" cy="1325700"/>
+          </a:xfrm>
+          <a:prstGeom prst="rect">
+            <a:avLst/>
+          </a:prstGeom>
+        </p:spPr>
+        <p:txBody>
+          <a:bodyPr spcFirstLastPara="1" wrap="square" lIns="91425" tIns="45700" rIns="91425" bIns="45700" anchor="ctr" anchorCtr="0">
+            <a:normAutofit/>
+          </a:bodyPr>
+          <a:lstStyle/>
+          <a:p>
+            <a:pPr marL="0" lvl="0" indent="0" algn="l" rtl="0">
+              <a:spcBef>
+                <a:spcPts val="0"/>
+              </a:spcBef>
+              <a:spcAft>
+                <a:spcPts val="0"/>
+              </a:spcAft>
+              <a:buNone/>
+            </a:pPr>
+            <a:r>
+              <a:rPr lang="en-US" dirty="0"/>
+              <a:t>How can I compose an effective ticket? (4)</a:t>
+            </a:r>
+            <a:endParaRPr dirty="0"/>
+          </a:p>
+        </p:txBody>
+      </p:sp>
+      <p:sp>
+        <p:nvSpPr>
+          <p:cNvPr id="125" name="Google Shape;125;p18"/>
+          <p:cNvSpPr txBox="1">
+            <a:spLocks noGrp="1"/>
+          </p:cNvSpPr>
+          <p:nvPr>
+            <p:ph type="body" idx="1"/>
+          </p:nvPr>
+        </p:nvSpPr>
+        <p:spPr>
+          <a:xfrm>
+            <a:off x="838200" y="1825625"/>
+            <a:ext cx="10515600" cy="4163100"/>
+          </a:xfrm>
+          <a:prstGeom prst="rect">
+            <a:avLst/>
+          </a:prstGeom>
+        </p:spPr>
+        <p:txBody>
+          <a:bodyPr spcFirstLastPara="1" wrap="square" lIns="91425" tIns="45700" rIns="91425" bIns="45700" anchor="t" anchorCtr="0">
+            <a:noAutofit/>
+          </a:bodyPr>
+          <a:lstStyle/>
+          <a:p>
+            <a:pPr marL="508000" indent="-457200">
+              <a:lnSpc>
+                <a:spcPct val="115000"/>
+              </a:lnSpc>
+              <a:spcBef>
+                <a:spcPts val="800"/>
+              </a:spcBef>
+              <a:buSzPts val="2800"/>
+            </a:pPr>
+            <a:r>
+              <a:rPr lang="en-US" dirty="0"/>
+              <a:t>Provide detail!</a:t>
+            </a:r>
+          </a:p>
+          <a:p>
+            <a:pPr marL="508000" indent="-457200">
+              <a:lnSpc>
+                <a:spcPct val="115000"/>
+              </a:lnSpc>
+              <a:spcBef>
+                <a:spcPts val="800"/>
+              </a:spcBef>
+              <a:buSzPts val="2800"/>
+            </a:pPr>
+            <a:r>
+              <a:rPr lang="en-US" dirty="0"/>
+              <a:t>Scale down your workflows for testing!</a:t>
+            </a:r>
+          </a:p>
+          <a:p>
+            <a:pPr marL="508000" indent="-457200">
+              <a:lnSpc>
+                <a:spcPct val="115000"/>
+              </a:lnSpc>
+              <a:spcBef>
+                <a:spcPts val="800"/>
+              </a:spcBef>
+              <a:buSzPts val="2800"/>
+            </a:pPr>
+            <a:r>
+              <a:rPr lang="en-US" dirty="0"/>
+              <a:t>Email our helpdesk!</a:t>
+            </a:r>
+          </a:p>
+          <a:p>
+            <a:pPr marL="508000" indent="-457200">
+              <a:lnSpc>
+                <a:spcPct val="115000"/>
+              </a:lnSpc>
+              <a:spcBef>
+                <a:spcPts val="800"/>
+              </a:spcBef>
+              <a:buSzPts val="2800"/>
+            </a:pPr>
+            <a:r>
+              <a:rPr lang="en-US" dirty="0"/>
+              <a:t>Try a few things and let us know what you’ve tried!</a:t>
+            </a:r>
+          </a:p>
+          <a:p>
+            <a:pPr marL="965200" lvl="1" indent="-457200">
+              <a:lnSpc>
+                <a:spcPct val="115000"/>
+              </a:lnSpc>
+              <a:spcBef>
+                <a:spcPts val="800"/>
+              </a:spcBef>
+              <a:buSzPts val="2800"/>
+            </a:pPr>
+            <a:r>
+              <a:rPr lang="en-US" dirty="0"/>
+              <a:t>We are not just being lazy – it helps us contextualize the issue. </a:t>
+            </a:r>
+          </a:p>
+          <a:p>
+            <a:pPr marL="965200" lvl="1" indent="-457200">
+              <a:lnSpc>
+                <a:spcPct val="115000"/>
+              </a:lnSpc>
+              <a:spcBef>
+                <a:spcPts val="800"/>
+              </a:spcBef>
+              <a:buSzPts val="2800"/>
+            </a:pPr>
+            <a:r>
+              <a:rPr lang="en-US" dirty="0"/>
+              <a:t>We would likely try the same things as you – if you can eliminate potential solutions, it will help us get to a solution more quickly.</a:t>
+            </a:r>
+          </a:p>
+        </p:txBody>
+      </p:sp>
+      <p:sp>
+        <p:nvSpPr>
+          <p:cNvPr id="126" name="Google Shape;126;p18"/>
+          <p:cNvSpPr txBox="1">
+            <a:spLocks noGrp="1"/>
+          </p:cNvSpPr>
+          <p:nvPr>
+            <p:ph type="sldNum" idx="12"/>
+          </p:nvPr>
+        </p:nvSpPr>
+        <p:spPr>
+          <a:xfrm>
+            <a:off x="8610600" y="6356350"/>
+            <a:ext cx="682800" cy="365100"/>
+          </a:xfrm>
+          <a:prstGeom prst="rect">
+            <a:avLst/>
+          </a:prstGeom>
+        </p:spPr>
+        <p:txBody>
+          <a:bodyPr spcFirstLastPara="1" wrap="square" lIns="91425" tIns="45700" rIns="91425" bIns="45700" anchor="ctr" anchorCtr="0">
+            <a:noAutofit/>
+          </a:bodyPr>
+          <a:lstStyle/>
+          <a:p>
+            <a:pPr marL="0" lvl="0" indent="0" algn="l" rtl="0">
+              <a:spcBef>
+                <a:spcPts val="0"/>
+              </a:spcBef>
+              <a:spcAft>
+                <a:spcPts val="0"/>
+              </a:spcAft>
+              <a:buClr>
+                <a:srgbClr val="000000"/>
+              </a:buClr>
+              <a:buSzPts val="1200"/>
+              <a:buFont typeface="Arial"/>
+              <a:buNone/>
+            </a:pPr>
+            <a:fld id="{00000000-1234-1234-1234-123412341234}" type="slidenum">
+              <a:rPr lang="en-US"/>
+              <a:t>17</a:t>
+            </a:fld>
+            <a:endParaRPr/>
+          </a:p>
+        </p:txBody>
+      </p:sp>
+      <p:sp>
+        <p:nvSpPr>
+          <p:cNvPr id="2" name="Date Placeholder 1">
+            <a:extLst>
+              <a:ext uri="{FF2B5EF4-FFF2-40B4-BE49-F238E27FC236}">
+                <a16:creationId xmlns:a16="http://schemas.microsoft.com/office/drawing/2014/main" id="{F6A0EDE9-0DA8-CAC9-C4DB-516C719410E5}"/>
+              </a:ext>
+            </a:extLst>
+          </p:cNvPr>
+          <p:cNvSpPr>
+            <a:spLocks noGrp="1"/>
+          </p:cNvSpPr>
+          <p:nvPr>
+            <p:ph type="dt" sz="half" idx="10"/>
+          </p:nvPr>
+        </p:nvSpPr>
+        <p:spPr/>
+        <p:txBody>
+          <a:bodyPr/>
+          <a:lstStyle/>
+          <a:p>
+            <a:pPr algn="ctr"/>
+            <a:r>
+              <a:rPr lang="en-US"/>
+              <a:t>8/12/2024</a:t>
+            </a:r>
+          </a:p>
+        </p:txBody>
+      </p:sp>
+    </p:spTree>
+    <p:extLst>
+      <p:ext uri="{BB962C8B-B14F-4D97-AF65-F5344CB8AC3E}">
+        <p14:creationId xmlns:p14="http://schemas.microsoft.com/office/powerpoint/2010/main" val="126563876"/>
       </p:ext>
     </p:extLst>
   </p:cSld>
@@ -7873,13 +7838,7 @@
       </p:grpSpPr>
       <p:sp>
         <p:nvSpPr>
-          <p:cNvPr id="5" name="Google Shape;124;p18">
-            <a:extLst>
-              <a:ext uri="{FF2B5EF4-FFF2-40B4-BE49-F238E27FC236}">
-                <a16:creationId xmlns:a16="http://schemas.microsoft.com/office/drawing/2014/main" id="{E174B142-95AC-6A2A-AF57-F4A76620923B}"/>
-              </a:ext>
-            </a:extLst>
-          </p:cNvPr>
+          <p:cNvPr id="124" name="Google Shape;124;p18"/>
           <p:cNvSpPr txBox="1">
             <a:spLocks noGrp="1"/>
           </p:cNvSpPr>
@@ -7889,8 +7848,8 @@
         </p:nvSpPr>
         <p:spPr>
           <a:xfrm>
-            <a:off x="838199" y="365125"/>
-            <a:ext cx="11029545" cy="1325700"/>
+            <a:off x="838200" y="365125"/>
+            <a:ext cx="10515600" cy="1325700"/>
           </a:xfrm>
           <a:prstGeom prst="rect">
             <a:avLst/>
@@ -7913,7 +7872,7 @@
             </a:pPr>
             <a:r>
               <a:rPr lang="en-US" dirty="0"/>
-              <a:t>How can I compose an effective ticket? (4)</a:t>
+              <a:t>How can I compose an effective ticket? (summary)</a:t>
             </a:r>
             <a:endParaRPr dirty="0"/>
           </a:p>
@@ -8001,36 +7960,6 @@
             <a:r>
               <a:rPr lang="en-US" dirty="0"/>
               <a:t>Try a few things and let us know what you’ve tried!</a:t>
-            </a:r>
-          </a:p>
-          <a:p>
-            <a:pPr marL="965200" lvl="1" indent="-457200">
-              <a:lnSpc>
-                <a:spcPct val="115000"/>
-              </a:lnSpc>
-              <a:spcBef>
-                <a:spcPts val="800"/>
-              </a:spcBef>
-              <a:buSzPts val="2800"/>
-            </a:pPr>
-            <a:r>
-              <a:rPr lang="en-US" dirty="0"/>
-              <a:t>We are not just being lazy – it helps us contextualize the issue. </a:t>
-            </a:r>
-          </a:p>
-          <a:p>
-            <a:pPr marL="965200" lvl="1" indent="-457200">
-              <a:lnSpc>
-                <a:spcPct val="115000"/>
-              </a:lnSpc>
-              <a:spcBef>
-                <a:spcPts val="800"/>
-              </a:spcBef>
-              <a:buSzPts val="2800"/>
-            </a:pPr>
-            <a:r>
-              <a:rPr lang="en-US" dirty="0"/>
-              <a:t>We would likely try the same things as you – if you can eliminate potential solutions, it will help us get to a solution more quickly.</a:t>
             </a:r>
           </a:p>
         </p:txBody>
@@ -8087,7 +8016,7 @@
           <p:cNvPr id="2" name="Date Placeholder 1">
             <a:extLst>
               <a:ext uri="{FF2B5EF4-FFF2-40B4-BE49-F238E27FC236}">
-                <a16:creationId xmlns:a16="http://schemas.microsoft.com/office/drawing/2014/main" id="{F6A0EDE9-0DA8-CAC9-C4DB-516C719410E5}"/>
+                <a16:creationId xmlns:a16="http://schemas.microsoft.com/office/drawing/2014/main" id="{1968AC8A-F62A-9933-1989-7D14D99E9269}"/>
               </a:ext>
             </a:extLst>
           </p:cNvPr>
@@ -8114,7 +8043,7 @@
     </p:spTree>
     <p:extLst>
       <p:ext uri="{BB962C8B-B14F-4D97-AF65-F5344CB8AC3E}">
-        <p14:creationId xmlns:p14="http://schemas.microsoft.com/office/powerpoint/2010/main" val="126563876"/>
+        <p14:creationId xmlns:p14="http://schemas.microsoft.com/office/powerpoint/2010/main" val="2417832144"/>
       </p:ext>
     </p:extLst>
   </p:cSld>
@@ -8177,7 +8106,7 @@
             </a:pPr>
             <a:r>
               <a:rPr lang="en-US" dirty="0"/>
-              <a:t>How can I compose an effective ticket? (summary)</a:t>
+              <a:t>Items We’ve Covered</a:t>
             </a:r>
             <a:endParaRPr dirty="0"/>
           </a:p>
@@ -8208,64 +8137,81 @@
           </a:bodyPr>
           <a:lstStyle/>
           <a:p>
-            <a:pPr marL="508000" indent="-457200">
+            <a:pPr marL="457200" lvl="0" indent="-406400" algn="l" rtl="0">
               <a:lnSpc>
                 <a:spcPct val="115000"/>
               </a:lnSpc>
               <a:spcBef>
                 <a:spcPts val="800"/>
               </a:spcBef>
+              <a:spcAft>
+                <a:spcPts val="0"/>
+              </a:spcAft>
               <a:buSzPts val="2800"/>
+              <a:buFont typeface="Helvetica Neue"/>
+              <a:buAutoNum type="arabicPeriod"/>
             </a:pPr>
             <a:r>
               <a:rPr lang="en-US" dirty="0"/>
-              <a:t>Provide detail!</a:t>
-            </a:r>
-          </a:p>
-          <a:p>
-            <a:pPr marL="508000" indent="-457200">
+              <a:t>What resources do I have available? </a:t>
+            </a:r>
+          </a:p>
+          <a:p>
+            <a:pPr marL="457200" lvl="0" indent="-406400" algn="l" rtl="0">
               <a:lnSpc>
                 <a:spcPct val="115000"/>
               </a:lnSpc>
               <a:spcBef>
                 <a:spcPts val="800"/>
               </a:spcBef>
+              <a:spcAft>
+                <a:spcPts val="0"/>
+              </a:spcAft>
               <a:buSzPts val="2800"/>
+              <a:buFont typeface="Helvetica Neue"/>
+              <a:buAutoNum type="arabicPeriod"/>
             </a:pPr>
             <a:r>
               <a:rPr lang="en-US" dirty="0"/>
-              <a:t>Scale down your workflows for testing!</a:t>
-            </a:r>
-          </a:p>
-          <a:p>
-            <a:pPr marL="508000" indent="-457200">
+              <a:t>How do I choose which resource is best?</a:t>
+            </a:r>
+          </a:p>
+          <a:p>
+            <a:pPr marL="457200" lvl="0" indent="-406400" algn="l" rtl="0">
               <a:lnSpc>
                 <a:spcPct val="115000"/>
               </a:lnSpc>
               <a:spcBef>
                 <a:spcPts val="800"/>
               </a:spcBef>
+              <a:spcAft>
+                <a:spcPts val="0"/>
+              </a:spcAft>
               <a:buSzPts val="2800"/>
+              <a:buFont typeface="Helvetica Neue"/>
+              <a:buAutoNum type="arabicPeriod"/>
             </a:pPr>
             <a:r>
               <a:rPr lang="en-US" dirty="0"/>
-              <a:t>Email our helpdesk!</a:t>
-            </a:r>
-          </a:p>
-          <a:p>
-            <a:pPr marL="508000" indent="-457200">
+              <a:t>How can I compose an effective ticket?</a:t>
+            </a:r>
+          </a:p>
+          <a:p>
+            <a:pPr marL="457200" lvl="0" indent="-406400" algn="l" rtl="0">
               <a:lnSpc>
                 <a:spcPct val="115000"/>
               </a:lnSpc>
               <a:spcBef>
                 <a:spcPts val="800"/>
               </a:spcBef>
+              <a:spcAft>
+                <a:spcPts val="0"/>
+              </a:spcAft>
               <a:buSzPts val="2800"/>
-            </a:pPr>
-            <a:r>
-              <a:rPr lang="en-US" dirty="0"/>
-              <a:t>Try a few things and let us know what you’ve tried!</a:t>
-            </a:r>
+              <a:buFont typeface="Helvetica Neue"/>
+              <a:buAutoNum type="arabicPeriod"/>
+            </a:pPr>
+            <a:endParaRPr dirty="0"/>
           </a:p>
         </p:txBody>
       </p:sp>
@@ -8321,7 +8267,7 @@
           <p:cNvPr id="2" name="Date Placeholder 1">
             <a:extLst>
               <a:ext uri="{FF2B5EF4-FFF2-40B4-BE49-F238E27FC236}">
-                <a16:creationId xmlns:a16="http://schemas.microsoft.com/office/drawing/2014/main" id="{1968AC8A-F62A-9933-1989-7D14D99E9269}"/>
+                <a16:creationId xmlns:a16="http://schemas.microsoft.com/office/drawing/2014/main" id="{CB00A736-F82A-97BE-0D08-237520EE6D43}"/>
               </a:ext>
             </a:extLst>
           </p:cNvPr>
@@ -8348,7 +8294,7 @@
     </p:spTree>
     <p:extLst>
       <p:ext uri="{BB962C8B-B14F-4D97-AF65-F5344CB8AC3E}">
-        <p14:creationId xmlns:p14="http://schemas.microsoft.com/office/powerpoint/2010/main" val="2417832144"/>
+        <p14:creationId xmlns:p14="http://schemas.microsoft.com/office/powerpoint/2010/main" val="581952869"/>
       </p:ext>
     </p:extLst>
   </p:cSld>
@@ -8377,13 +8323,7 @@
       </p:grpSpPr>
       <p:sp>
         <p:nvSpPr>
-          <p:cNvPr id="3" name="Google Shape;124;p18">
-            <a:extLst>
-              <a:ext uri="{FF2B5EF4-FFF2-40B4-BE49-F238E27FC236}">
-                <a16:creationId xmlns:a16="http://schemas.microsoft.com/office/drawing/2014/main" id="{70DB5A00-F899-C324-77A1-D617398AE862}"/>
-              </a:ext>
-            </a:extLst>
-          </p:cNvPr>
+          <p:cNvPr id="124" name="Google Shape;124;p18"/>
           <p:cNvSpPr txBox="1">
             <a:spLocks noGrp="1"/>
           </p:cNvSpPr>
@@ -8417,7 +8357,7 @@
             </a:pPr>
             <a:r>
               <a:rPr lang="en-US" dirty="0"/>
-              <a:t>Slides</a:t>
+              <a:t>Learning Objectives</a:t>
             </a:r>
             <a:endParaRPr dirty="0"/>
           </a:p>
@@ -8425,109 +8365,107 @@
       </p:sp>
       <p:sp>
         <p:nvSpPr>
-          <p:cNvPr id="7" name="Content Placeholder 2">
-            <a:extLst>
-              <a:ext uri="{FF2B5EF4-FFF2-40B4-BE49-F238E27FC236}">
-                <a16:creationId xmlns:a16="http://schemas.microsoft.com/office/drawing/2014/main" id="{912D71F3-F134-EBE8-F6AB-0DAA0C6BE559}"/>
-              </a:ext>
-            </a:extLst>
-          </p:cNvPr>
-          <p:cNvSpPr>
-            <a:spLocks noGrp="1"/>
-          </p:cNvSpPr>
-          <p:nvPr>
-            <p:ph idx="1"/>
-          </p:nvPr>
-        </p:nvSpPr>
-        <p:spPr>
-          <a:xfrm>
-            <a:off x="561975" y="1661232"/>
-            <a:ext cx="6410325" cy="3920418"/>
-          </a:xfrm>
-        </p:spPr>
-        <p:txBody>
-          <a:bodyPr vert="horz" lIns="91440" tIns="45720" rIns="91440" bIns="45720" rtlCol="0" anchor="ctr">
-            <a:normAutofit/>
-          </a:bodyPr>
-          <a:lstStyle/>
-          <a:p>
-            <a:pPr marL="0" indent="0">
-              <a:buNone/>
-            </a:pPr>
-            <a:r>
-              <a:rPr lang="en-US" b="1" dirty="0">
-                <a:latin typeface="Century Gothic"/>
-                <a:hlinkClick r:id="rId3"/>
-              </a:rPr>
-              <a:t>https://github.com/ResearchComputing/hpc_fundamentals_micro_credential</a:t>
-            </a:r>
-            <a:r>
-              <a:rPr lang="en-US" b="1" dirty="0">
-                <a:latin typeface="Century Gothic"/>
-              </a:rPr>
-              <a:t> </a:t>
-            </a:r>
-          </a:p>
-          <a:p>
-            <a:pPr marL="0" indent="0">
-              <a:buNone/>
-            </a:pPr>
-            <a:endParaRPr lang="en-US" b="1" dirty="0">
-              <a:latin typeface="Century Gothic"/>
-            </a:endParaRPr>
-          </a:p>
-          <a:p>
-            <a:r>
-              <a:rPr lang="en-US" b="1" dirty="0">
-                <a:latin typeface="Century Gothic"/>
-              </a:rPr>
-              <a:t>In “</a:t>
-            </a:r>
-            <a:r>
-              <a:rPr lang="en-US" b="1" dirty="0" err="1">
-                <a:latin typeface="Century Gothic"/>
-              </a:rPr>
-              <a:t>asking_for_help</a:t>
-            </a:r>
-            <a:r>
-              <a:rPr lang="en-US" b="1" dirty="0">
-                <a:latin typeface="Century Gothic"/>
-              </a:rPr>
-              <a:t>” directory </a:t>
-            </a:r>
-          </a:p>
-        </p:txBody>
-      </p:sp>
-      <p:pic>
-        <p:nvPicPr>
-          <p:cNvPr id="8" name="Picture 7" descr="QR code for course slides">
-            <a:extLst>
-              <a:ext uri="{FF2B5EF4-FFF2-40B4-BE49-F238E27FC236}">
-                <a16:creationId xmlns:a16="http://schemas.microsoft.com/office/drawing/2014/main" id="{EF93D67B-E399-1039-3843-8CB5194C9F7A}"/>
-              </a:ext>
-            </a:extLst>
-          </p:cNvPr>
-          <p:cNvPicPr>
-            <a:picLocks noChangeAspect="1"/>
-          </p:cNvPicPr>
-          <p:nvPr/>
-        </p:nvPicPr>
-        <p:blipFill>
-          <a:blip r:embed="rId4"/>
-          <a:stretch>
-            <a:fillRect/>
-          </a:stretch>
-        </p:blipFill>
-        <p:spPr>
-          <a:xfrm>
-            <a:off x="7467600" y="1809748"/>
-            <a:ext cx="3326923" cy="3238500"/>
+          <p:cNvPr id="125" name="Google Shape;125;p18"/>
+          <p:cNvSpPr txBox="1">
+            <a:spLocks noGrp="1"/>
+          </p:cNvSpPr>
+          <p:nvPr>
+            <p:ph type="body" idx="1"/>
+          </p:nvPr>
+        </p:nvSpPr>
+        <p:spPr>
+          <a:xfrm>
+            <a:off x="838200" y="1825625"/>
+            <a:ext cx="10515600" cy="4163100"/>
           </a:xfrm>
           <a:prstGeom prst="rect">
             <a:avLst/>
           </a:prstGeom>
         </p:spPr>
-      </p:pic>
+        <p:txBody>
+          <a:bodyPr spcFirstLastPara="1" wrap="square" lIns="91425" tIns="45700" rIns="91425" bIns="45700" anchor="t" anchorCtr="0">
+            <a:noAutofit/>
+          </a:bodyPr>
+          <a:lstStyle/>
+          <a:p>
+            <a:pPr marL="457200" lvl="0" indent="-406400" algn="l" rtl="0">
+              <a:lnSpc>
+                <a:spcPct val="115000"/>
+              </a:lnSpc>
+              <a:spcBef>
+                <a:spcPts val="800"/>
+              </a:spcBef>
+              <a:spcAft>
+                <a:spcPts val="0"/>
+              </a:spcAft>
+              <a:buSzPts val="2800"/>
+              <a:buFont typeface="Helvetica Neue"/>
+              <a:buAutoNum type="arabicPeriod"/>
+            </a:pPr>
+            <a:r>
+              <a:rPr lang="en-US" dirty="0"/>
+              <a:t>What resources do I have available? </a:t>
+            </a:r>
+          </a:p>
+          <a:p>
+            <a:pPr marL="457200" lvl="0" indent="-406400" algn="l" rtl="0">
+              <a:lnSpc>
+                <a:spcPct val="115000"/>
+              </a:lnSpc>
+              <a:spcBef>
+                <a:spcPts val="800"/>
+              </a:spcBef>
+              <a:spcAft>
+                <a:spcPts val="0"/>
+              </a:spcAft>
+              <a:buSzPts val="2800"/>
+              <a:buFont typeface="Helvetica Neue"/>
+              <a:buAutoNum type="arabicPeriod"/>
+            </a:pPr>
+            <a:r>
+              <a:rPr lang="en-US" dirty="0"/>
+              <a:t>How do I choose which resource is best?</a:t>
+            </a:r>
+          </a:p>
+          <a:p>
+            <a:pPr marL="457200" lvl="0" indent="-406400" algn="l" rtl="0">
+              <a:lnSpc>
+                <a:spcPct val="115000"/>
+              </a:lnSpc>
+              <a:spcBef>
+                <a:spcPts val="800"/>
+              </a:spcBef>
+              <a:spcAft>
+                <a:spcPts val="0"/>
+              </a:spcAft>
+              <a:buSzPts val="2800"/>
+              <a:buFont typeface="Helvetica Neue"/>
+              <a:buAutoNum type="arabicPeriod"/>
+            </a:pPr>
+            <a:r>
+              <a:rPr lang="en-US" dirty="0"/>
+              <a:t>How can I compose an effective ticket?</a:t>
+            </a:r>
+          </a:p>
+          <a:p>
+            <a:pPr marL="457200" lvl="0" indent="-406400" algn="l" rtl="0">
+              <a:lnSpc>
+                <a:spcPct val="115000"/>
+              </a:lnSpc>
+              <a:spcBef>
+                <a:spcPts val="800"/>
+              </a:spcBef>
+              <a:spcAft>
+                <a:spcPts val="0"/>
+              </a:spcAft>
+              <a:buSzPts val="2800"/>
+              <a:buFont typeface="Helvetica Neue"/>
+              <a:buAutoNum type="arabicPeriod"/>
+            </a:pPr>
+            <a:endParaRPr dirty="0"/>
+          </a:p>
+        </p:txBody>
+      </p:sp>
       <p:sp>
         <p:nvSpPr>
           <p:cNvPr id="126" name="Google Shape;126;p18"/>
@@ -8606,11 +8544,6 @@
         </p:txBody>
       </p:sp>
     </p:spTree>
-    <p:extLst>
-      <p:ext uri="{BB962C8B-B14F-4D97-AF65-F5344CB8AC3E}">
-        <p14:creationId xmlns:p14="http://schemas.microsoft.com/office/powerpoint/2010/main" val="1015782673"/>
-      </p:ext>
-    </p:extLst>
   </p:cSld>
   <p:clrMapOvr>
     <a:masterClrMapping/>
@@ -8671,111 +8604,8 @@
             </a:pPr>
             <a:r>
               <a:rPr lang="en-US" dirty="0"/>
-              <a:t>Items We’ve Covered</a:t>
-            </a:r>
-            <a:endParaRPr dirty="0"/>
-          </a:p>
-        </p:txBody>
-      </p:sp>
-      <p:sp>
-        <p:nvSpPr>
-          <p:cNvPr id="125" name="Google Shape;125;p18"/>
-          <p:cNvSpPr txBox="1">
-            <a:spLocks noGrp="1"/>
-          </p:cNvSpPr>
-          <p:nvPr>
-            <p:ph type="body" idx="1"/>
-          </p:nvPr>
-        </p:nvSpPr>
-        <p:spPr>
-          <a:xfrm>
-            <a:off x="838200" y="1825625"/>
-            <a:ext cx="10515600" cy="4163100"/>
-          </a:xfrm>
-          <a:prstGeom prst="rect">
-            <a:avLst/>
-          </a:prstGeom>
-        </p:spPr>
-        <p:txBody>
-          <a:bodyPr spcFirstLastPara="1" wrap="square" lIns="91425" tIns="45700" rIns="91425" bIns="45700" anchor="t" anchorCtr="0">
-            <a:noAutofit/>
-          </a:bodyPr>
-          <a:lstStyle/>
-          <a:p>
-            <a:pPr marL="457200" lvl="0" indent="-406400" algn="l" rtl="0">
-              <a:lnSpc>
-                <a:spcPct val="115000"/>
-              </a:lnSpc>
-              <a:spcBef>
-                <a:spcPts val="800"/>
-              </a:spcBef>
-              <a:spcAft>
-                <a:spcPts val="0"/>
-              </a:spcAft>
-              <a:buSzPts val="2800"/>
-              <a:buFont typeface="Helvetica Neue"/>
-              <a:buAutoNum type="arabicPeriod"/>
-            </a:pPr>
-            <a:r>
-              <a:rPr lang="en-US" dirty="0"/>
-              <a:t>What resources do I have available? </a:t>
-            </a:r>
-          </a:p>
-          <a:p>
-            <a:pPr marL="457200" lvl="0" indent="-406400" algn="l" rtl="0">
-              <a:lnSpc>
-                <a:spcPct val="115000"/>
-              </a:lnSpc>
-              <a:spcBef>
-                <a:spcPts val="800"/>
-              </a:spcBef>
-              <a:spcAft>
-                <a:spcPts val="0"/>
-              </a:spcAft>
-              <a:buSzPts val="2800"/>
-              <a:buFont typeface="Helvetica Neue"/>
-              <a:buAutoNum type="arabicPeriod"/>
-            </a:pPr>
-            <a:r>
-              <a:rPr lang="en-US" dirty="0"/>
-              <a:t>How do I choose which resource is best?</a:t>
-            </a:r>
-          </a:p>
-          <a:p>
-            <a:pPr marL="457200" lvl="0" indent="-406400" algn="l" rtl="0">
-              <a:lnSpc>
-                <a:spcPct val="115000"/>
-              </a:lnSpc>
-              <a:spcBef>
-                <a:spcPts val="800"/>
-              </a:spcBef>
-              <a:spcAft>
-                <a:spcPts val="0"/>
-              </a:spcAft>
-              <a:buSzPts val="2800"/>
-              <a:buFont typeface="Helvetica Neue"/>
-              <a:buAutoNum type="arabicPeriod"/>
-            </a:pPr>
-            <a:r>
-              <a:rPr lang="en-US" dirty="0"/>
-              <a:t>How can I compose an effective ticket?</a:t>
-            </a:r>
-          </a:p>
-          <a:p>
-            <a:pPr marL="457200" lvl="0" indent="-406400" algn="l" rtl="0">
-              <a:lnSpc>
-                <a:spcPct val="115000"/>
-              </a:lnSpc>
-              <a:spcBef>
-                <a:spcPts val="800"/>
-              </a:spcBef>
-              <a:spcAft>
-                <a:spcPts val="0"/>
-              </a:spcAft>
-              <a:buSzPts val="2800"/>
-              <a:buFont typeface="Helvetica Neue"/>
-              <a:buAutoNum type="arabicPeriod"/>
-            </a:pPr>
+              <a:t>Questions?</a:t>
+            </a:r>
             <a:endParaRPr dirty="0"/>
           </a:p>
         </p:txBody>
@@ -8822,154 +8652,6 @@
             <a:fld id="{00000000-1234-1234-1234-123412341234}" type="slidenum">
               <a:rPr lang="en-US"/>
               <a:t>20</a:t>
-            </a:fld>
-            <a:endParaRPr/>
-          </a:p>
-        </p:txBody>
-      </p:sp>
-      <p:sp>
-        <p:nvSpPr>
-          <p:cNvPr id="2" name="Date Placeholder 1">
-            <a:extLst>
-              <a:ext uri="{FF2B5EF4-FFF2-40B4-BE49-F238E27FC236}">
-                <a16:creationId xmlns:a16="http://schemas.microsoft.com/office/drawing/2014/main" id="{CB00A736-F82A-97BE-0D08-237520EE6D43}"/>
-              </a:ext>
-            </a:extLst>
-          </p:cNvPr>
-          <p:cNvSpPr>
-            <a:spLocks noGrp="1"/>
-          </p:cNvSpPr>
-          <p:nvPr>
-            <p:ph type="dt" sz="half" idx="10"/>
-          </p:nvPr>
-        </p:nvSpPr>
-        <p:spPr/>
-        <p:txBody>
-          <a:bodyPr/>
-          <a:lstStyle/>
-          <a:p>
-            <a:pPr algn="ctr"/>
-            <a:r>
-              <a:rPr lang="en-US"/>
-              <a:t>8/12/2024</a:t>
-            </a:r>
-          </a:p>
-        </p:txBody>
-      </p:sp>
-    </p:spTree>
-    <p:extLst>
-      <p:ext uri="{BB962C8B-B14F-4D97-AF65-F5344CB8AC3E}">
-        <p14:creationId xmlns:p14="http://schemas.microsoft.com/office/powerpoint/2010/main" val="581952869"/>
-      </p:ext>
-    </p:extLst>
-  </p:cSld>
-  <p:clrMapOvr>
-    <a:masterClrMapping/>
-  </p:clrMapOvr>
-</p:sld>
-</file>
-
-<file path=ppt/slides/slide21.xml><?xml version="1.0" encoding="utf-8"?>
-<p:sld xmlns:a="http://schemas.openxmlformats.org/drawingml/2006/main" xmlns:r="http://schemas.openxmlformats.org/officeDocument/2006/relationships" xmlns:p="http://schemas.openxmlformats.org/presentationml/2006/main">
-  <p:cSld>
-    <p:spTree>
-      <p:nvGrpSpPr>
-        <p:cNvPr id="1" name="Shape 123"/>
-        <p:cNvGrpSpPr/>
-        <p:nvPr/>
-      </p:nvGrpSpPr>
-      <p:grpSpPr>
-        <a:xfrm>
-          <a:off x="0" y="0"/>
-          <a:ext cx="0" cy="0"/>
-          <a:chOff x="0" y="0"/>
-          <a:chExt cx="0" cy="0"/>
-        </a:xfrm>
-      </p:grpSpPr>
-      <p:sp>
-        <p:nvSpPr>
-          <p:cNvPr id="124" name="Google Shape;124;p18"/>
-          <p:cNvSpPr txBox="1">
-            <a:spLocks noGrp="1"/>
-          </p:cNvSpPr>
-          <p:nvPr>
-            <p:ph type="title"/>
-          </p:nvPr>
-        </p:nvSpPr>
-        <p:spPr>
-          <a:xfrm>
-            <a:off x="838200" y="365125"/>
-            <a:ext cx="10515600" cy="1325700"/>
-          </a:xfrm>
-          <a:prstGeom prst="rect">
-            <a:avLst/>
-          </a:prstGeom>
-        </p:spPr>
-        <p:txBody>
-          <a:bodyPr spcFirstLastPara="1" wrap="square" lIns="91425" tIns="45700" rIns="91425" bIns="45700" anchor="ctr" anchorCtr="0">
-            <a:normAutofit/>
-          </a:bodyPr>
-          <a:lstStyle/>
-          <a:p>
-            <a:pPr marL="0" lvl="0" indent="0" algn="l" rtl="0">
-              <a:spcBef>
-                <a:spcPts val="0"/>
-              </a:spcBef>
-              <a:spcAft>
-                <a:spcPts val="0"/>
-              </a:spcAft>
-              <a:buNone/>
-            </a:pPr>
-            <a:r>
-              <a:rPr lang="en-US" dirty="0"/>
-              <a:t>Questions?</a:t>
-            </a:r>
-            <a:endParaRPr dirty="0"/>
-          </a:p>
-        </p:txBody>
-      </p:sp>
-      <p:sp>
-        <p:nvSpPr>
-          <p:cNvPr id="126" name="Google Shape;126;p18"/>
-          <p:cNvSpPr txBox="1">
-            <a:spLocks noGrp="1"/>
-          </p:cNvSpPr>
-          <p:nvPr>
-            <p:ph type="sldNum" idx="12"/>
-          </p:nvPr>
-        </p:nvSpPr>
-        <p:spPr>
-          <a:xfrm>
-            <a:off x="8610600" y="6356350"/>
-            <a:ext cx="682800" cy="365100"/>
-          </a:xfrm>
-          <a:prstGeom prst="rect">
-            <a:avLst/>
-          </a:prstGeom>
-        </p:spPr>
-        <p:txBody>
-          <a:bodyPr spcFirstLastPara="1" wrap="square" lIns="91425" tIns="45700" rIns="91425" bIns="45700" anchor="ctr" anchorCtr="0">
-            <a:noAutofit/>
-          </a:bodyPr>
-          <a:lstStyle/>
-          <a:p>
-            <a:pPr marL="0" lvl="0" indent="0" algn="l" rtl="0">
-              <a:spcBef>
-                <a:spcPts val="0"/>
-              </a:spcBef>
-              <a:spcAft>
-                <a:spcPts val="0"/>
-              </a:spcAft>
-              <a:buClr>
-                <a:srgbClr val="000000"/>
-              </a:buClr>
-              <a:buSzPts val="1200"/>
-              <a:buFont typeface="Arial"/>
-              <a:buNone/>
-            </a:pPr>
-            <a:fld id="{00000000-1234-1234-1234-123412341234}" type="slidenum">
-              <a:rPr lang="en-US"/>
-              <a:t>21</a:t>
             </a:fld>
             <a:endParaRPr/>
           </a:p>
@@ -9017,7 +8699,7 @@
 </p:sld>
 </file>
 
-<file path=ppt/slides/slide22.xml><?xml version="1.0" encoding="utf-8"?>
+<file path=ppt/slides/slide21.xml><?xml version="1.0" encoding="utf-8"?>
 <p:sld xmlns:a="http://schemas.openxmlformats.org/drawingml/2006/main" xmlns:r="http://schemas.openxmlformats.org/officeDocument/2006/relationships" xmlns:p="http://schemas.openxmlformats.org/presentationml/2006/main">
   <p:cSld>
     <p:spTree>
@@ -9293,7 +8975,7 @@
             </a:pPr>
             <a:fld id="{00000000-1234-1234-1234-123412341234}" type="slidenum">
               <a:rPr lang="en-US"/>
-              <a:t>22</a:t>
+              <a:t>21</a:t>
             </a:fld>
             <a:endParaRPr/>
           </a:p>
@@ -9338,253 +9020,6 @@
 </file>
 
 <file path=ppt/slides/slide3.xml><?xml version="1.0" encoding="utf-8"?>
-<p:sld xmlns:a="http://schemas.openxmlformats.org/drawingml/2006/main" xmlns:r="http://schemas.openxmlformats.org/officeDocument/2006/relationships" xmlns:p="http://schemas.openxmlformats.org/presentationml/2006/main">
-  <p:cSld>
-    <p:spTree>
-      <p:nvGrpSpPr>
-        <p:cNvPr id="1" name="Shape 123"/>
-        <p:cNvGrpSpPr/>
-        <p:nvPr/>
-      </p:nvGrpSpPr>
-      <p:grpSpPr>
-        <a:xfrm>
-          <a:off x="0" y="0"/>
-          <a:ext cx="0" cy="0"/>
-          <a:chOff x="0" y="0"/>
-          <a:chExt cx="0" cy="0"/>
-        </a:xfrm>
-      </p:grpSpPr>
-      <p:sp>
-        <p:nvSpPr>
-          <p:cNvPr id="124" name="Google Shape;124;p18"/>
-          <p:cNvSpPr txBox="1">
-            <a:spLocks noGrp="1"/>
-          </p:cNvSpPr>
-          <p:nvPr>
-            <p:ph type="title"/>
-          </p:nvPr>
-        </p:nvSpPr>
-        <p:spPr>
-          <a:xfrm>
-            <a:off x="838200" y="365125"/>
-            <a:ext cx="10515600" cy="1325700"/>
-          </a:xfrm>
-          <a:prstGeom prst="rect">
-            <a:avLst/>
-          </a:prstGeom>
-        </p:spPr>
-        <p:txBody>
-          <a:bodyPr spcFirstLastPara="1" wrap="square" lIns="91425" tIns="45700" rIns="91425" bIns="45700" anchor="ctr" anchorCtr="0">
-            <a:normAutofit/>
-          </a:bodyPr>
-          <a:lstStyle/>
-          <a:p>
-            <a:pPr marL="0" lvl="0" indent="0" algn="l" rtl="0">
-              <a:spcBef>
-                <a:spcPts val="0"/>
-              </a:spcBef>
-              <a:spcAft>
-                <a:spcPts val="0"/>
-              </a:spcAft>
-              <a:buNone/>
-            </a:pPr>
-            <a:r>
-              <a:rPr lang="en-US" dirty="0"/>
-              <a:t>Learning Objectives</a:t>
-            </a:r>
-            <a:endParaRPr dirty="0"/>
-          </a:p>
-        </p:txBody>
-      </p:sp>
-      <p:sp>
-        <p:nvSpPr>
-          <p:cNvPr id="125" name="Google Shape;125;p18"/>
-          <p:cNvSpPr txBox="1">
-            <a:spLocks noGrp="1"/>
-          </p:cNvSpPr>
-          <p:nvPr>
-            <p:ph type="body" idx="1"/>
-          </p:nvPr>
-        </p:nvSpPr>
-        <p:spPr>
-          <a:xfrm>
-            <a:off x="838200" y="1825625"/>
-            <a:ext cx="10515600" cy="4163100"/>
-          </a:xfrm>
-          <a:prstGeom prst="rect">
-            <a:avLst/>
-          </a:prstGeom>
-        </p:spPr>
-        <p:txBody>
-          <a:bodyPr spcFirstLastPara="1" wrap="square" lIns="91425" tIns="45700" rIns="91425" bIns="45700" anchor="t" anchorCtr="0">
-            <a:noAutofit/>
-          </a:bodyPr>
-          <a:lstStyle/>
-          <a:p>
-            <a:pPr marL="457200" lvl="0" indent="-406400" algn="l" rtl="0">
-              <a:lnSpc>
-                <a:spcPct val="115000"/>
-              </a:lnSpc>
-              <a:spcBef>
-                <a:spcPts val="800"/>
-              </a:spcBef>
-              <a:spcAft>
-                <a:spcPts val="0"/>
-              </a:spcAft>
-              <a:buSzPts val="2800"/>
-              <a:buFont typeface="Helvetica Neue"/>
-              <a:buAutoNum type="arabicPeriod"/>
-            </a:pPr>
-            <a:r>
-              <a:rPr lang="en-US" dirty="0"/>
-              <a:t>What resources do I have available? </a:t>
-            </a:r>
-          </a:p>
-          <a:p>
-            <a:pPr marL="457200" lvl="0" indent="-406400" algn="l" rtl="0">
-              <a:lnSpc>
-                <a:spcPct val="115000"/>
-              </a:lnSpc>
-              <a:spcBef>
-                <a:spcPts val="800"/>
-              </a:spcBef>
-              <a:spcAft>
-                <a:spcPts val="0"/>
-              </a:spcAft>
-              <a:buSzPts val="2800"/>
-              <a:buFont typeface="Helvetica Neue"/>
-              <a:buAutoNum type="arabicPeriod"/>
-            </a:pPr>
-            <a:r>
-              <a:rPr lang="en-US" dirty="0"/>
-              <a:t>How do I choose which resource is best?</a:t>
-            </a:r>
-          </a:p>
-          <a:p>
-            <a:pPr marL="457200" lvl="0" indent="-406400" algn="l" rtl="0">
-              <a:lnSpc>
-                <a:spcPct val="115000"/>
-              </a:lnSpc>
-              <a:spcBef>
-                <a:spcPts val="800"/>
-              </a:spcBef>
-              <a:spcAft>
-                <a:spcPts val="0"/>
-              </a:spcAft>
-              <a:buSzPts val="2800"/>
-              <a:buFont typeface="Helvetica Neue"/>
-              <a:buAutoNum type="arabicPeriod"/>
-            </a:pPr>
-            <a:r>
-              <a:rPr lang="en-US" dirty="0"/>
-              <a:t>How can I compose an effective ticket?</a:t>
-            </a:r>
-          </a:p>
-          <a:p>
-            <a:pPr marL="457200" lvl="0" indent="-406400" algn="l" rtl="0">
-              <a:lnSpc>
-                <a:spcPct val="115000"/>
-              </a:lnSpc>
-              <a:spcBef>
-                <a:spcPts val="800"/>
-              </a:spcBef>
-              <a:spcAft>
-                <a:spcPts val="0"/>
-              </a:spcAft>
-              <a:buSzPts val="2800"/>
-              <a:buFont typeface="Helvetica Neue"/>
-              <a:buAutoNum type="arabicPeriod"/>
-            </a:pPr>
-            <a:endParaRPr dirty="0"/>
-          </a:p>
-        </p:txBody>
-      </p:sp>
-      <p:sp>
-        <p:nvSpPr>
-          <p:cNvPr id="126" name="Google Shape;126;p18"/>
-          <p:cNvSpPr txBox="1">
-            <a:spLocks noGrp="1"/>
-          </p:cNvSpPr>
-          <p:nvPr>
-            <p:ph type="sldNum" idx="12"/>
-          </p:nvPr>
-        </p:nvSpPr>
-        <p:spPr>
-          <a:xfrm>
-            <a:off x="8610600" y="6356350"/>
-            <a:ext cx="682800" cy="365100"/>
-          </a:xfrm>
-          <a:prstGeom prst="rect">
-            <a:avLst/>
-          </a:prstGeom>
-        </p:spPr>
-        <p:txBody>
-          <a:bodyPr spcFirstLastPara="1" wrap="square" lIns="91425" tIns="45700" rIns="91425" bIns="45700" anchor="ctr" anchorCtr="0">
-            <a:noAutofit/>
-          </a:bodyPr>
-          <a:lstStyle/>
-          <a:p>
-            <a:pPr marL="0" lvl="0" indent="0" algn="l" rtl="0">
-              <a:spcBef>
-                <a:spcPts val="0"/>
-              </a:spcBef>
-              <a:spcAft>
-                <a:spcPts val="0"/>
-              </a:spcAft>
-              <a:buClr>
-                <a:srgbClr val="000000"/>
-              </a:buClr>
-              <a:buSzPts val="1200"/>
-              <a:buFont typeface="Arial"/>
-              <a:buNone/>
-            </a:pPr>
-            <a:fld id="{00000000-1234-1234-1234-123412341234}" type="slidenum">
-              <a:rPr lang="en-US"/>
-              <a:t>3</a:t>
-            </a:fld>
-            <a:endParaRPr dirty="0"/>
-          </a:p>
-        </p:txBody>
-      </p:sp>
-      <p:sp>
-        <p:nvSpPr>
-          <p:cNvPr id="2" name="Date Placeholder 1">
-            <a:extLst>
-              <a:ext uri="{FF2B5EF4-FFF2-40B4-BE49-F238E27FC236}">
-                <a16:creationId xmlns:a16="http://schemas.microsoft.com/office/drawing/2014/main" id="{318FF01A-1ABF-81D9-B1D1-123FF2A42EAC}"/>
-              </a:ext>
-            </a:extLst>
-          </p:cNvPr>
-          <p:cNvSpPr>
-            <a:spLocks noGrp="1"/>
-          </p:cNvSpPr>
-          <p:nvPr>
-            <p:ph type="dt" sz="half" idx="10"/>
-          </p:nvPr>
-        </p:nvSpPr>
-        <p:spPr/>
-        <p:txBody>
-          <a:bodyPr/>
-          <a:lstStyle/>
-          <a:p>
-            <a:pPr algn="ctr"/>
-            <a:r>
-              <a:rPr lang="en-US"/>
-              <a:t>8/12/2024</a:t>
-            </a:r>
-            <a:endParaRPr lang="en-US" dirty="0"/>
-          </a:p>
-        </p:txBody>
-      </p:sp>
-    </p:spTree>
-  </p:cSld>
-  <p:clrMapOvr>
-    <a:masterClrMapping/>
-  </p:clrMapOvr>
-</p:sld>
-</file>
-
-<file path=ppt/slides/slide4.xml><?xml version="1.0" encoding="utf-8"?>
 <p:sld xmlns:a="http://schemas.openxmlformats.org/drawingml/2006/main" xmlns:r="http://schemas.openxmlformats.org/officeDocument/2006/relationships" xmlns:p="http://schemas.openxmlformats.org/presentationml/2006/main">
   <p:cSld>
     <p:spTree>
@@ -9880,7 +9315,7 @@
             </a:pPr>
             <a:fld id="{00000000-1234-1234-1234-123412341234}" type="slidenum">
               <a:rPr lang="en-US"/>
-              <a:t>4</a:t>
+              <a:t>3</a:t>
             </a:fld>
             <a:endParaRPr dirty="0"/>
           </a:p>
@@ -9910,6 +9345,380 @@
             <a:pPr algn="ctr"/>
             <a:r>
               <a:rPr lang="en-US" dirty="0"/>
+              <a:t>8/12/2024</a:t>
+            </a:r>
+          </a:p>
+        </p:txBody>
+      </p:sp>
+    </p:spTree>
+  </p:cSld>
+  <p:clrMapOvr>
+    <a:masterClrMapping/>
+  </p:clrMapOvr>
+</p:sld>
+</file>
+
+<file path=ppt/slides/slide4.xml><?xml version="1.0" encoding="utf-8"?>
+<p:sld xmlns:a="http://schemas.openxmlformats.org/drawingml/2006/main" xmlns:r="http://schemas.openxmlformats.org/officeDocument/2006/relationships" xmlns:p="http://schemas.openxmlformats.org/presentationml/2006/main">
+  <p:cSld>
+    <p:spTree>
+      <p:nvGrpSpPr>
+        <p:cNvPr id="1" name="Shape 897"/>
+        <p:cNvGrpSpPr/>
+        <p:nvPr/>
+      </p:nvGrpSpPr>
+      <p:grpSpPr>
+        <a:xfrm>
+          <a:off x="0" y="0"/>
+          <a:ext cx="0" cy="0"/>
+          <a:chOff x="0" y="0"/>
+          <a:chExt cx="0" cy="0"/>
+        </a:xfrm>
+      </p:grpSpPr>
+      <p:sp>
+        <p:nvSpPr>
+          <p:cNvPr id="898" name="Google Shape;898;p76"/>
+          <p:cNvSpPr txBox="1">
+            <a:spLocks noGrp="1"/>
+          </p:cNvSpPr>
+          <p:nvPr>
+            <p:ph type="title"/>
+          </p:nvPr>
+        </p:nvSpPr>
+        <p:spPr>
+          <a:xfrm>
+            <a:off x="838200" y="365125"/>
+            <a:ext cx="10515600" cy="1325700"/>
+          </a:xfrm>
+          <a:prstGeom prst="rect">
+            <a:avLst/>
+          </a:prstGeom>
+        </p:spPr>
+        <p:txBody>
+          <a:bodyPr spcFirstLastPara="1" wrap="square" lIns="91425" tIns="45700" rIns="91425" bIns="45700" anchor="ctr" anchorCtr="0">
+            <a:normAutofit/>
+          </a:bodyPr>
+          <a:lstStyle/>
+          <a:p>
+            <a:pPr marL="0" lvl="0" indent="0" algn="l" rtl="0">
+              <a:spcBef>
+                <a:spcPts val="0"/>
+              </a:spcBef>
+              <a:spcAft>
+                <a:spcPts val="0"/>
+              </a:spcAft>
+              <a:buNone/>
+            </a:pPr>
+            <a:r>
+              <a:rPr lang="en-US" dirty="0"/>
+              <a:t>Help! I’m stuck, where do I go?</a:t>
+            </a:r>
+            <a:endParaRPr dirty="0"/>
+          </a:p>
+        </p:txBody>
+      </p:sp>
+      <p:sp>
+        <p:nvSpPr>
+          <p:cNvPr id="899" name="Google Shape;899;p76"/>
+          <p:cNvSpPr txBox="1">
+            <a:spLocks noGrp="1"/>
+          </p:cNvSpPr>
+          <p:nvPr>
+            <p:ph type="body" idx="1"/>
+          </p:nvPr>
+        </p:nvSpPr>
+        <p:spPr>
+          <a:xfrm>
+            <a:off x="838200" y="1825625"/>
+            <a:ext cx="10515600" cy="4163100"/>
+          </a:xfrm>
+          <a:prstGeom prst="rect">
+            <a:avLst/>
+          </a:prstGeom>
+        </p:spPr>
+        <p:txBody>
+          <a:bodyPr spcFirstLastPara="1" wrap="square" lIns="91425" tIns="45700" rIns="91425" bIns="45700" anchor="t" anchorCtr="0">
+            <a:normAutofit/>
+          </a:bodyPr>
+          <a:lstStyle/>
+          <a:p>
+            <a:pPr marL="457200" lvl="0" indent="-374650" algn="l" rtl="0">
+              <a:lnSpc>
+                <a:spcPct val="150001"/>
+              </a:lnSpc>
+              <a:spcBef>
+                <a:spcPts val="300"/>
+              </a:spcBef>
+              <a:spcAft>
+                <a:spcPts val="0"/>
+              </a:spcAft>
+              <a:buClr>
+                <a:srgbClr val="1D1C1D"/>
+              </a:buClr>
+              <a:buSzPts val="2300"/>
+              <a:buFont typeface="Arial"/>
+              <a:buChar char="●"/>
+            </a:pPr>
+            <a:r>
+              <a:rPr lang="en-US" sz="2300" b="1" u="sng" dirty="0">
+                <a:solidFill>
+                  <a:srgbClr val="1D1C1D"/>
+                </a:solidFill>
+              </a:rPr>
+              <a:t>CURC Documentation</a:t>
+            </a:r>
+            <a:r>
+              <a:rPr lang="en-US" sz="2300" dirty="0">
+                <a:solidFill>
+                  <a:srgbClr val="1D1C1D"/>
+                </a:solidFill>
+              </a:rPr>
+              <a:t>: </a:t>
+            </a:r>
+            <a:r>
+              <a:rPr lang="en-US" sz="2300" u="sng" dirty="0">
+                <a:solidFill>
+                  <a:schemeClr val="hlink"/>
+                </a:solidFill>
+                <a:hlinkClick r:id="rId3"/>
+              </a:rPr>
+              <a:t>curc.readthedocs.io</a:t>
+            </a:r>
+            <a:endParaRPr lang="en-US" sz="2300" dirty="0">
+              <a:solidFill>
+                <a:srgbClr val="1D1C1D"/>
+              </a:solidFill>
+            </a:endParaRPr>
+          </a:p>
+          <a:p>
+            <a:pPr marL="457200" lvl="0" indent="-374650" algn="l" rtl="0">
+              <a:lnSpc>
+                <a:spcPct val="150001"/>
+              </a:lnSpc>
+              <a:spcBef>
+                <a:spcPts val="300"/>
+              </a:spcBef>
+              <a:spcAft>
+                <a:spcPts val="0"/>
+              </a:spcAft>
+              <a:buClr>
+                <a:srgbClr val="1D1C1D"/>
+              </a:buClr>
+              <a:buSzPts val="2300"/>
+              <a:buFont typeface="Arial"/>
+              <a:buChar char="●"/>
+            </a:pPr>
+            <a:r>
+              <a:rPr lang="en-US" sz="2300" b="1" u="sng" dirty="0">
+                <a:solidFill>
+                  <a:srgbClr val="1D1C1D"/>
+                </a:solidFill>
+              </a:rPr>
+              <a:t>External Resources</a:t>
+            </a:r>
+          </a:p>
+          <a:p>
+            <a:pPr lvl="1" indent="-374650">
+              <a:lnSpc>
+                <a:spcPct val="150001"/>
+              </a:lnSpc>
+              <a:spcBef>
+                <a:spcPts val="300"/>
+              </a:spcBef>
+              <a:buClr>
+                <a:srgbClr val="1D1C1D"/>
+              </a:buClr>
+              <a:buSzPts val="2300"/>
+              <a:buFont typeface="Arial"/>
+              <a:buChar char="●"/>
+            </a:pPr>
+            <a:r>
+              <a:rPr lang="en-US" sz="1900" dirty="0">
+                <a:solidFill>
+                  <a:srgbClr val="1D1C1D"/>
+                </a:solidFill>
+              </a:rPr>
+              <a:t>Rocky Mountain Advanced Computing Consortium (RMACC) Cyber Infrastructure Portal</a:t>
+            </a:r>
+          </a:p>
+          <a:p>
+            <a:pPr lvl="1" indent="-374650">
+              <a:lnSpc>
+                <a:spcPct val="150001"/>
+              </a:lnSpc>
+              <a:spcBef>
+                <a:spcPts val="300"/>
+              </a:spcBef>
+              <a:buClr>
+                <a:srgbClr val="1D1C1D"/>
+              </a:buClr>
+              <a:buSzPts val="2300"/>
+              <a:buFont typeface="Arial"/>
+              <a:buChar char="●"/>
+            </a:pPr>
+            <a:r>
+              <a:rPr lang="en-US" sz="1900" dirty="0">
+                <a:solidFill>
+                  <a:srgbClr val="1D1C1D"/>
+                </a:solidFill>
+              </a:rPr>
+              <a:t>The Internet! (Stack Overflow, YouTube, etc.)</a:t>
+            </a:r>
+            <a:endParaRPr sz="1900" dirty="0">
+              <a:solidFill>
+                <a:srgbClr val="1D1C1D"/>
+              </a:solidFill>
+            </a:endParaRPr>
+          </a:p>
+          <a:p>
+            <a:pPr marL="457200" lvl="0" indent="-374650" algn="l" rtl="0">
+              <a:lnSpc>
+                <a:spcPct val="150001"/>
+              </a:lnSpc>
+              <a:spcBef>
+                <a:spcPts val="300"/>
+              </a:spcBef>
+              <a:spcAft>
+                <a:spcPts val="0"/>
+              </a:spcAft>
+              <a:buClr>
+                <a:srgbClr val="1D1C1D"/>
+              </a:buClr>
+              <a:buSzPts val="2300"/>
+              <a:buFont typeface="Arial"/>
+              <a:buChar char="●"/>
+            </a:pPr>
+            <a:r>
+              <a:rPr lang="en-US" sz="2300" b="1" u="sng" dirty="0">
+                <a:solidFill>
+                  <a:srgbClr val="1D1C1D"/>
+                </a:solidFill>
+              </a:rPr>
+              <a:t>Trainings &amp; Consults with Center for Research Data and Digital Scholarship (CRDDS)</a:t>
+            </a:r>
+          </a:p>
+          <a:p>
+            <a:pPr marL="457200" lvl="0" indent="-374650" algn="l" rtl="0">
+              <a:lnSpc>
+                <a:spcPct val="150001"/>
+              </a:lnSpc>
+              <a:spcBef>
+                <a:spcPts val="300"/>
+              </a:spcBef>
+              <a:spcAft>
+                <a:spcPts val="0"/>
+              </a:spcAft>
+              <a:buClr>
+                <a:srgbClr val="1D1C1D"/>
+              </a:buClr>
+              <a:buSzPts val="2300"/>
+              <a:buFont typeface="Arial"/>
+              <a:buChar char="●"/>
+            </a:pPr>
+            <a:r>
+              <a:rPr lang="en-US" sz="2300" b="1" u="sng" dirty="0">
+                <a:solidFill>
+                  <a:srgbClr val="1D1C1D"/>
+                </a:solidFill>
+              </a:rPr>
+              <a:t>CURC Helpdesk</a:t>
+            </a:r>
+            <a:r>
+              <a:rPr lang="en-US" sz="2300" dirty="0">
+                <a:solidFill>
+                  <a:srgbClr val="1D1C1D"/>
+                </a:solidFill>
+              </a:rPr>
+              <a:t>: </a:t>
+            </a:r>
+            <a:r>
+              <a:rPr lang="en-US" sz="2300" u="sng" dirty="0">
+                <a:solidFill>
+                  <a:schemeClr val="hlink"/>
+                </a:solidFill>
+                <a:hlinkClick r:id="rId4"/>
+              </a:rPr>
+              <a:t>rc-help@colorado.edu</a:t>
+            </a:r>
+            <a:endParaRPr lang="en-US" sz="2300" u="sng" dirty="0">
+              <a:solidFill>
+                <a:schemeClr val="hlink"/>
+              </a:solidFill>
+            </a:endParaRPr>
+          </a:p>
+        </p:txBody>
+      </p:sp>
+      <p:sp>
+        <p:nvSpPr>
+          <p:cNvPr id="900" name="Google Shape;900;p76"/>
+          <p:cNvSpPr txBox="1">
+            <a:spLocks noGrp="1"/>
+          </p:cNvSpPr>
+          <p:nvPr>
+            <p:ph type="sldNum" idx="12"/>
+          </p:nvPr>
+        </p:nvSpPr>
+        <p:spPr>
+          <a:xfrm>
+            <a:off x="8610600" y="6356350"/>
+            <a:ext cx="682800" cy="365100"/>
+          </a:xfrm>
+          <a:prstGeom prst="rect">
+            <a:avLst/>
+          </a:prstGeom>
+        </p:spPr>
+        <p:txBody>
+          <a:bodyPr spcFirstLastPara="1" wrap="square" lIns="91425" tIns="45700" rIns="91425" bIns="45700" anchor="ctr" anchorCtr="0">
+            <a:noAutofit/>
+          </a:bodyPr>
+          <a:lstStyle/>
+          <a:p>
+            <a:pPr marL="0" lvl="0" indent="0" algn="l" rtl="0">
+              <a:spcBef>
+                <a:spcPts val="0"/>
+              </a:spcBef>
+              <a:spcAft>
+                <a:spcPts val="0"/>
+              </a:spcAft>
+              <a:buClr>
+                <a:srgbClr val="000000"/>
+              </a:buClr>
+              <a:buSzPts val="1200"/>
+              <a:buFont typeface="Arial"/>
+              <a:buNone/>
+            </a:pPr>
+            <a:fld id="{00000000-1234-1234-1234-123412341234}" type="slidenum">
+              <a:rPr lang="en-US"/>
+              <a:t>4</a:t>
+            </a:fld>
+            <a:endParaRPr/>
+          </a:p>
+        </p:txBody>
+      </p:sp>
+      <p:sp>
+        <p:nvSpPr>
+          <p:cNvPr id="2" name="Date Placeholder 1">
+            <a:extLst>
+              <a:ext uri="{FF2B5EF4-FFF2-40B4-BE49-F238E27FC236}">
+                <a16:creationId xmlns:a16="http://schemas.microsoft.com/office/drawing/2014/main" id="{9C1037CF-2E0D-1E56-EF48-6D8A6FDAB5A2}"/>
+              </a:ext>
+            </a:extLst>
+          </p:cNvPr>
+          <p:cNvSpPr>
+            <a:spLocks noGrp="1"/>
+          </p:cNvSpPr>
+          <p:nvPr>
+            <p:ph type="dt" sz="half" idx="10"/>
+          </p:nvPr>
+        </p:nvSpPr>
+        <p:spPr/>
+        <p:txBody>
+          <a:bodyPr/>
+          <a:lstStyle/>
+          <a:p>
+            <a:pPr algn="ctr"/>
+            <a:r>
+              <a:rPr lang="en-US"/>
               <a:t>8/12/2024</a:t>
             </a:r>
           </a:p>
@@ -9976,7 +9785,7 @@
             </a:pPr>
             <a:r>
               <a:rPr lang="en-US" dirty="0"/>
-              <a:t>Help! I’m stuck, where do I go?</a:t>
+              <a:t>When should I use these?</a:t>
             </a:r>
             <a:endParaRPr dirty="0"/>
           </a:p>
@@ -9994,8 +9803,8 @@
         </p:nvSpPr>
         <p:spPr>
           <a:xfrm>
-            <a:off x="838200" y="1825625"/>
-            <a:ext cx="10515600" cy="4163100"/>
+            <a:off x="838200" y="1463040"/>
+            <a:ext cx="10902696" cy="4525685"/>
           </a:xfrm>
           <a:prstGeom prst="rect">
             <a:avLst/>
@@ -10003,7 +9812,7 @@
         </p:spPr>
         <p:txBody>
           <a:bodyPr spcFirstLastPara="1" wrap="square" lIns="91425" tIns="45700" rIns="91425" bIns="45700" anchor="t" anchorCtr="0">
-            <a:normAutofit/>
+            <a:normAutofit fontScale="92500"/>
           </a:bodyPr>
           <a:lstStyle/>
           <a:p>
@@ -10030,7 +9839,7 @@
                   <a:srgbClr val="1D1C1D"/>
                 </a:solidFill>
               </a:rPr>
-              <a:t>CURC Documentation</a:t>
+              <a:t>Documentation</a:t>
             </a:r>
             <a:r>
               <a:rPr lang="en-US" sz="2300" dirty="0">
@@ -10049,23 +9858,20 @@
               </a:rPr>
               <a:t>curc.readthedocs.io</a:t>
             </a:r>
-            <a:endParaRPr lang="en-US" sz="2300" dirty="0">
+            <a:endParaRPr lang="en-US" sz="2300" u="sng" dirty="0">
               <a:solidFill>
                 <a:srgbClr val="1D1C1D"/>
               </a:solidFill>
             </a:endParaRPr>
           </a:p>
           <a:p>
-            <a:pPr marL="457200" lvl="0" indent="-374650" algn="l" rtl="0">
+            <a:pPr lvl="1" indent="-374650">
               <a:lnSpc>
                 <a:spcPct val="150001"/>
               </a:lnSpc>
               <a:spcBef>
                 <a:spcPts val="300"/>
               </a:spcBef>
-              <a:spcAft>
-                <a:spcPts val="0"/>
-              </a:spcAft>
               <a:buClr>
                 <a:srgbClr val="1D1C1D"/>
               </a:buClr>
@@ -10074,6 +9880,33 @@
               <a:buChar char="●"/>
             </a:pPr>
             <a:r>
+              <a:rPr lang="en-US" sz="1900" dirty="0">
+                <a:solidFill>
+                  <a:srgbClr val="1D1C1D"/>
+                </a:solidFill>
+              </a:rPr>
+              <a:t>Useful at any time! Check the documentation first when you run into issues.</a:t>
+            </a:r>
+          </a:p>
+          <a:p>
+            <a:pPr marL="457200" lvl="0" indent="-374650" algn="l" rtl="0">
+              <a:lnSpc>
+                <a:spcPct val="150001"/>
+              </a:lnSpc>
+              <a:spcBef>
+                <a:spcPts val="300"/>
+              </a:spcBef>
+              <a:spcAft>
+                <a:spcPts val="0"/>
+              </a:spcAft>
+              <a:buClr>
+                <a:srgbClr val="1D1C1D"/>
+              </a:buClr>
+              <a:buSzPts val="2300"/>
+              <a:buFont typeface="Arial"/>
+              <a:buChar char="●"/>
+            </a:pPr>
+            <a:r>
               <a:rPr lang="en-US" sz="2300" b="1" u="sng" dirty="0">
                 <a:solidFill>
                   <a:srgbClr val="1D1C1D"/>
@@ -10103,17 +9936,20 @@
                   <a:srgbClr val="1D1C1D"/>
                 </a:solidFill>
               </a:rPr>
-              <a:t>Rocky Mountain Advanced Computing Consortium (RMACC) Cyber Infrastructure Portal</a:t>
-            </a:r>
-          </a:p>
-          <a:p>
-            <a:pPr lvl="1" indent="-374650">
+              <a:t>Useful for learning a new skill or initial troubleshooting. Great first place to look. </a:t>
+            </a:r>
+          </a:p>
+          <a:p>
+            <a:pPr marL="457200" lvl="0" indent="-374650" algn="l" rtl="0">
               <a:lnSpc>
                 <a:spcPct val="150001"/>
               </a:lnSpc>
               <a:spcBef>
                 <a:spcPts val="300"/>
               </a:spcBef>
+              <a:spcAft>
+                <a:spcPts val="0"/>
+              </a:spcAft>
               <a:buClr>
                 <a:srgbClr val="1D1C1D"/>
               </a:buClr>
@@ -10122,30 +9958,22 @@
               <a:buChar char="●"/>
             </a:pPr>
             <a:r>
-              <a:rPr lang="en-US" sz="1900" dirty="0">
+              <a:rPr lang="en-US" sz="2300" b="1" u="sng" dirty="0">
                 <a:solidFill>
                   <a:srgbClr val="1D1C1D"/>
                 </a:solidFill>
               </a:rPr>
-              <a:t>The Internet! (Stack Overflow, YouTube, etc.)</a:t>
-            </a:r>
-            <a:endParaRPr sz="1900" dirty="0">
-              <a:solidFill>
-                <a:srgbClr val="1D1C1D"/>
-              </a:solidFill>
-            </a:endParaRPr>
-          </a:p>
-          <a:p>
-            <a:pPr marL="457200" lvl="0" indent="-374650" algn="l" rtl="0">
+              <a:t>Trainings with Center for Research Data and Digital Scholarship</a:t>
+            </a:r>
+          </a:p>
+          <a:p>
+            <a:pPr lvl="1" indent="-374650">
               <a:lnSpc>
                 <a:spcPct val="150001"/>
               </a:lnSpc>
               <a:spcBef>
                 <a:spcPts val="300"/>
               </a:spcBef>
-              <a:spcAft>
-                <a:spcPts val="0"/>
-              </a:spcAft>
               <a:buClr>
                 <a:srgbClr val="1D1C1D"/>
               </a:buClr>
@@ -10154,12 +9982,36 @@
               <a:buChar char="●"/>
             </a:pPr>
             <a:r>
-              <a:rPr lang="en-US" sz="2300" b="1" u="sng" dirty="0">
+              <a:rPr lang="en-US" sz="1900" dirty="0">
                 <a:solidFill>
                   <a:srgbClr val="1D1C1D"/>
                 </a:solidFill>
               </a:rPr>
-              <a:t>Trainings &amp; Consults with Center for Research Data and Digital Scholarship (CRDDS)</a:t>
+              <a:t>Useful for broad, long-term learning</a:t>
+            </a:r>
+          </a:p>
+          <a:p>
+            <a:pPr lvl="1" indent="-374650">
+              <a:lnSpc>
+                <a:spcPct val="150001"/>
+              </a:lnSpc>
+              <a:spcBef>
+                <a:spcPts val="300"/>
+              </a:spcBef>
+              <a:buClr>
+                <a:srgbClr val="1D1C1D"/>
+              </a:buClr>
+              <a:buSzPts val="2300"/>
+              <a:buFont typeface="Arial"/>
+              <a:buChar char="●"/>
+            </a:pPr>
+            <a:r>
+              <a:rPr lang="en-US" sz="1900" dirty="0">
+                <a:solidFill>
+                  <a:srgbClr val="1D1C1D"/>
+                </a:solidFill>
+              </a:rPr>
+              <a:t>Drop-in consult hours are held Tue (12-1p) and Thu (1-2p) during the Fall and Spring semesters</a:t>
             </a:r>
           </a:p>
           <a:p>
@@ -10211,6 +10063,35 @@
               </a:solidFill>
             </a:endParaRPr>
           </a:p>
+          <a:p>
+            <a:pPr lvl="1" indent="-374650">
+              <a:lnSpc>
+                <a:spcPct val="150001"/>
+              </a:lnSpc>
+              <a:spcBef>
+                <a:spcPts val="300"/>
+              </a:spcBef>
+              <a:buClr>
+                <a:srgbClr val="1D1C1D"/>
+              </a:buClr>
+              <a:buSzPts val="2300"/>
+              <a:buFont typeface="Arial"/>
+              <a:buChar char="●"/>
+            </a:pPr>
+            <a:r>
+              <a:rPr lang="en-US" sz="1900" dirty="0">
+                <a:solidFill>
+                  <a:schemeClr val="tx1"/>
+                </a:solidFill>
+              </a:rPr>
+              <a:t>Useful for quick, personalized assistance. We can schedule Zoom consults if needed.</a:t>
+            </a:r>
+            <a:endParaRPr lang="en-US" sz="1900" dirty="0">
+              <a:solidFill>
+                <a:srgbClr val="1D1C1D"/>
+              </a:solidFill>
+            </a:endParaRPr>
+          </a:p>
         </p:txBody>
       </p:sp>
       <p:sp>
@@ -10265,7 +10146,7 @@
           <p:cNvPr id="2" name="Date Placeholder 1">
             <a:extLst>
               <a:ext uri="{FF2B5EF4-FFF2-40B4-BE49-F238E27FC236}">
-                <a16:creationId xmlns:a16="http://schemas.microsoft.com/office/drawing/2014/main" id="{9C1037CF-2E0D-1E56-EF48-6D8A6FDAB5A2}"/>
+                <a16:creationId xmlns:a16="http://schemas.microsoft.com/office/drawing/2014/main" id="{383635CB-F212-67E0-BE18-C1EBB7BD63AA}"/>
               </a:ext>
             </a:extLst>
           </p:cNvPr>
@@ -10290,6 +10171,11 @@
         </p:txBody>
       </p:sp>
     </p:spTree>
+    <p:extLst>
+      <p:ext uri="{BB962C8B-B14F-4D97-AF65-F5344CB8AC3E}">
+        <p14:creationId xmlns:p14="http://schemas.microsoft.com/office/powerpoint/2010/main" val="3505625943"/>
+      </p:ext>
+    </p:extLst>
   </p:cSld>
   <p:clrMapOvr>
     <a:masterClrMapping/>
@@ -10302,7 +10188,7 @@
   <p:cSld>
     <p:spTree>
       <p:nvGrpSpPr>
-        <p:cNvPr id="1" name="Shape 897"/>
+        <p:cNvPr id="1" name="Shape 123"/>
         <p:cNvGrpSpPr/>
         <p:nvPr/>
       </p:nvGrpSpPr>
@@ -10316,7 +10202,7 @@
       </p:grpSpPr>
       <p:sp>
         <p:nvSpPr>
-          <p:cNvPr id="898" name="Google Shape;898;p76"/>
+          <p:cNvPr id="124" name="Google Shape;124;p18"/>
           <p:cNvSpPr txBox="1">
             <a:spLocks noGrp="1"/>
           </p:cNvSpPr>
@@ -10350,7 +10236,7 @@
             </a:pPr>
             <a:r>
               <a:rPr lang="en-US" dirty="0"/>
-              <a:t>When should I use these?</a:t>
+              <a:t>Our Documentation</a:t>
             </a:r>
             <a:endParaRPr dirty="0"/>
           </a:p>
@@ -10358,310 +10244,81 @@
       </p:sp>
       <p:sp>
         <p:nvSpPr>
-          <p:cNvPr id="899" name="Google Shape;899;p76"/>
-          <p:cNvSpPr txBox="1">
-            <a:spLocks noGrp="1"/>
-          </p:cNvSpPr>
-          <p:nvPr>
-            <p:ph type="body" idx="1"/>
-          </p:nvPr>
-        </p:nvSpPr>
-        <p:spPr>
-          <a:xfrm>
-            <a:off x="838200" y="1463040"/>
-            <a:ext cx="10902696" cy="4525685"/>
+          <p:cNvPr id="2" name="TextBox 1">
+            <a:extLst>
+              <a:ext uri="{FF2B5EF4-FFF2-40B4-BE49-F238E27FC236}">
+                <a16:creationId xmlns:a16="http://schemas.microsoft.com/office/drawing/2014/main" id="{C351AC00-B3DE-16E1-739C-0591D7438DB6}"/>
+              </a:ext>
+            </a:extLst>
+          </p:cNvPr>
+          <p:cNvSpPr txBox="1"/>
+          <p:nvPr/>
+        </p:nvSpPr>
+        <p:spPr>
+          <a:xfrm>
+            <a:off x="838200" y="1494844"/>
+            <a:ext cx="10515600" cy="523220"/>
           </a:xfrm>
           <a:prstGeom prst="rect">
             <a:avLst/>
           </a:prstGeom>
-        </p:spPr>
-        <p:txBody>
-          <a:bodyPr spcFirstLastPara="1" wrap="square" lIns="91425" tIns="45700" rIns="91425" bIns="45700" anchor="t" anchorCtr="0">
-            <a:normAutofit fontScale="92500"/>
+          <a:noFill/>
+        </p:spPr>
+        <p:txBody>
+          <a:bodyPr wrap="square" rtlCol="0">
+            <a:spAutoFit/>
           </a:bodyPr>
           <a:lstStyle/>
           <a:p>
-            <a:pPr marL="457200" lvl="0" indent="-374650" algn="l" rtl="0">
-              <a:lnSpc>
-                <a:spcPct val="150001"/>
-              </a:lnSpc>
-              <a:spcBef>
-                <a:spcPts val="300"/>
-              </a:spcBef>
-              <a:spcAft>
-                <a:spcPts val="0"/>
-              </a:spcAft>
-              <a:buClr>
-                <a:srgbClr val="1D1C1D"/>
-              </a:buClr>
-              <a:buSzPts val="2300"/>
-              <a:buFont typeface="Arial"/>
-              <a:buChar char="●"/>
-            </a:pPr>
-            <a:r>
-              <a:rPr lang="en-US" sz="2300" b="1" u="sng" dirty="0">
-                <a:solidFill>
-                  <a:srgbClr val="1D1C1D"/>
-                </a:solidFill>
-              </a:rPr>
-              <a:t>Documentation</a:t>
-            </a:r>
-            <a:r>
-              <a:rPr lang="en-US" sz="2300" dirty="0">
-                <a:solidFill>
-                  <a:srgbClr val="1D1C1D"/>
-                </a:solidFill>
-              </a:rPr>
-              <a:t>: </a:t>
-            </a:r>
-            <a:r>
-              <a:rPr lang="en-US" sz="2300" u="sng" dirty="0">
-                <a:solidFill>
-                  <a:schemeClr val="hlink"/>
-                </a:solidFill>
+            <a:r>
+              <a:rPr lang="en-US" sz="2800" dirty="0"/>
+              <a:t>Located at: </a:t>
+            </a:r>
+            <a:r>
+              <a:rPr lang="en-US" sz="2800" dirty="0">
                 <a:hlinkClick r:id="rId3"/>
               </a:rPr>
-              <a:t>curc.readthedocs.io</a:t>
-            </a:r>
-            <a:endParaRPr lang="en-US" sz="2300" u="sng" dirty="0">
-              <a:solidFill>
-                <a:srgbClr val="1D1C1D"/>
-              </a:solidFill>
-            </a:endParaRPr>
-          </a:p>
-          <a:p>
-            <a:pPr lvl="1" indent="-374650">
-              <a:lnSpc>
-                <a:spcPct val="150001"/>
-              </a:lnSpc>
-              <a:spcBef>
-                <a:spcPts val="300"/>
-              </a:spcBef>
-              <a:buClr>
-                <a:srgbClr val="1D1C1D"/>
-              </a:buClr>
-              <a:buSzPts val="2300"/>
-              <a:buFont typeface="Arial"/>
-              <a:buChar char="●"/>
-            </a:pPr>
-            <a:r>
-              <a:rPr lang="en-US" sz="1900" dirty="0">
-                <a:solidFill>
-                  <a:srgbClr val="1D1C1D"/>
-                </a:solidFill>
-              </a:rPr>
-              <a:t>Useful at any time! Check the documentation first when you run into issues.</a:t>
-            </a:r>
-          </a:p>
-          <a:p>
-            <a:pPr marL="457200" lvl="0" indent="-374650" algn="l" rtl="0">
-              <a:lnSpc>
-                <a:spcPct val="150001"/>
-              </a:lnSpc>
-              <a:spcBef>
-                <a:spcPts val="300"/>
-              </a:spcBef>
-              <a:spcAft>
-                <a:spcPts val="0"/>
-              </a:spcAft>
-              <a:buClr>
-                <a:srgbClr val="1D1C1D"/>
-              </a:buClr>
-              <a:buSzPts val="2300"/>
-              <a:buFont typeface="Arial"/>
-              <a:buChar char="●"/>
-            </a:pPr>
-            <a:r>
-              <a:rPr lang="en-US" sz="2300" b="1" u="sng" dirty="0">
-                <a:solidFill>
-                  <a:srgbClr val="1D1C1D"/>
-                </a:solidFill>
-              </a:rPr>
-              <a:t>External Resources</a:t>
-            </a:r>
-          </a:p>
-          <a:p>
-            <a:pPr lvl="1" indent="-374650">
-              <a:lnSpc>
-                <a:spcPct val="150001"/>
-              </a:lnSpc>
-              <a:spcBef>
-                <a:spcPts val="300"/>
-              </a:spcBef>
-              <a:buClr>
-                <a:srgbClr val="1D1C1D"/>
-              </a:buClr>
-              <a:buSzPts val="2300"/>
-              <a:buFont typeface="Arial"/>
-              <a:buChar char="●"/>
-            </a:pPr>
-            <a:r>
-              <a:rPr lang="en-US" sz="1900" dirty="0">
-                <a:solidFill>
-                  <a:srgbClr val="1D1C1D"/>
-                </a:solidFill>
-              </a:rPr>
-              <a:t>Useful for learning a new skill or initial troubleshooting. Great first place to look. </a:t>
-            </a:r>
-          </a:p>
-          <a:p>
-            <a:pPr marL="457200" lvl="0" indent="-374650" algn="l" rtl="0">
-              <a:lnSpc>
-                <a:spcPct val="150001"/>
-              </a:lnSpc>
-              <a:spcBef>
-                <a:spcPts val="300"/>
-              </a:spcBef>
-              <a:spcAft>
-                <a:spcPts val="0"/>
-              </a:spcAft>
-              <a:buClr>
-                <a:srgbClr val="1D1C1D"/>
-              </a:buClr>
-              <a:buSzPts val="2300"/>
-              <a:buFont typeface="Arial"/>
-              <a:buChar char="●"/>
-            </a:pPr>
-            <a:r>
-              <a:rPr lang="en-US" sz="2300" b="1" u="sng" dirty="0">
-                <a:solidFill>
-                  <a:srgbClr val="1D1C1D"/>
-                </a:solidFill>
-              </a:rPr>
-              <a:t>Trainings with Center for Research Data and Digital Scholarship</a:t>
-            </a:r>
-          </a:p>
-          <a:p>
-            <a:pPr lvl="1" indent="-374650">
-              <a:lnSpc>
-                <a:spcPct val="150001"/>
-              </a:lnSpc>
-              <a:spcBef>
-                <a:spcPts val="300"/>
-              </a:spcBef>
-              <a:buClr>
-                <a:srgbClr val="1D1C1D"/>
-              </a:buClr>
-              <a:buSzPts val="2300"/>
-              <a:buFont typeface="Arial"/>
-              <a:buChar char="●"/>
-            </a:pPr>
-            <a:r>
-              <a:rPr lang="en-US" sz="1900" dirty="0">
-                <a:solidFill>
-                  <a:srgbClr val="1D1C1D"/>
-                </a:solidFill>
-              </a:rPr>
-              <a:t>Useful for broad, long-term learning</a:t>
-            </a:r>
-          </a:p>
-          <a:p>
-            <a:pPr lvl="1" indent="-374650">
-              <a:lnSpc>
-                <a:spcPct val="150001"/>
-              </a:lnSpc>
-              <a:spcBef>
-                <a:spcPts val="300"/>
-              </a:spcBef>
-              <a:buClr>
-                <a:srgbClr val="1D1C1D"/>
-              </a:buClr>
-              <a:buSzPts val="2300"/>
-              <a:buFont typeface="Arial"/>
-              <a:buChar char="●"/>
-            </a:pPr>
-            <a:r>
-              <a:rPr lang="en-US" sz="1900" dirty="0">
-                <a:solidFill>
-                  <a:srgbClr val="1D1C1D"/>
-                </a:solidFill>
-              </a:rPr>
-              <a:t>Drop-in consult hours are held Tue (12-1p) and Thu (1-2p) during the Fall and Spring semesters</a:t>
-            </a:r>
-          </a:p>
-          <a:p>
-            <a:pPr marL="457200" lvl="0" indent="-374650" algn="l" rtl="0">
-              <a:lnSpc>
-                <a:spcPct val="150001"/>
-              </a:lnSpc>
-              <a:spcBef>
-                <a:spcPts val="300"/>
-              </a:spcBef>
-              <a:spcAft>
-                <a:spcPts val="0"/>
-              </a:spcAft>
-              <a:buClr>
-                <a:srgbClr val="1D1C1D"/>
-              </a:buClr>
-              <a:buSzPts val="2300"/>
-              <a:buFont typeface="Arial"/>
-              <a:buChar char="●"/>
-            </a:pPr>
-            <a:r>
-              <a:rPr lang="en-US" sz="2300" b="1" u="sng" dirty="0">
-                <a:solidFill>
-                  <a:srgbClr val="1D1C1D"/>
-                </a:solidFill>
-              </a:rPr>
-              <a:t>CURC Helpdesk</a:t>
-            </a:r>
-            <a:r>
-              <a:rPr lang="en-US" sz="2300" dirty="0">
-                <a:solidFill>
-                  <a:srgbClr val="1D1C1D"/>
-                </a:solidFill>
-              </a:rPr>
-              <a:t>: </a:t>
-            </a:r>
-            <a:r>
-              <a:rPr lang="en-US" sz="2300" u="sng" dirty="0">
-                <a:solidFill>
-                  <a:schemeClr val="hlink"/>
-                </a:solidFill>
-                <a:hlinkClick r:id="rId4"/>
-              </a:rPr>
-              <a:t>rc-help@colorado.edu</a:t>
-            </a:r>
-            <a:endParaRPr lang="en-US" sz="2300" u="sng" dirty="0">
-              <a:solidFill>
-                <a:schemeClr val="hlink"/>
-              </a:solidFill>
-            </a:endParaRPr>
-          </a:p>
-          <a:p>
-            <a:pPr lvl="1" indent="-374650">
-              <a:lnSpc>
-                <a:spcPct val="150001"/>
-              </a:lnSpc>
-              <a:spcBef>
-                <a:spcPts val="300"/>
-              </a:spcBef>
-              <a:buClr>
-                <a:srgbClr val="1D1C1D"/>
-              </a:buClr>
-              <a:buSzPts val="2300"/>
-              <a:buFont typeface="Arial"/>
-              <a:buChar char="●"/>
-            </a:pPr>
-            <a:r>
-              <a:rPr lang="en-US" sz="1900" dirty="0">
-                <a:solidFill>
-                  <a:schemeClr val="tx1"/>
-                </a:solidFill>
-              </a:rPr>
-              <a:t>Useful for quick, personalized assistance. We can schedule Zoom consults if needed.</a:t>
-            </a:r>
-            <a:endParaRPr lang="en-US" sz="1900" dirty="0">
-              <a:solidFill>
-                <a:srgbClr val="1D1C1D"/>
-              </a:solidFill>
-            </a:endParaRPr>
-          </a:p>
-        </p:txBody>
-      </p:sp>
-      <p:sp>
-        <p:nvSpPr>
-          <p:cNvPr id="900" name="Google Shape;900;p76"/>
+              <a:t>https://curc.readthedocs.io</a:t>
+            </a:r>
+            <a:r>
+              <a:rPr lang="en-US" sz="2800" dirty="0"/>
+              <a:t> </a:t>
+            </a:r>
+          </a:p>
+        </p:txBody>
+      </p:sp>
+      <p:pic>
+        <p:nvPicPr>
+          <p:cNvPr id="4" name="Picture 3" descr="Screen shot showing the Research Computing documentation webpage">
+            <a:extLst>
+              <a:ext uri="{FF2B5EF4-FFF2-40B4-BE49-F238E27FC236}">
+                <a16:creationId xmlns:a16="http://schemas.microsoft.com/office/drawing/2014/main" id="{039B8453-DA9A-18BE-4241-4996EB58BFF6}"/>
+              </a:ext>
+            </a:extLst>
+          </p:cNvPr>
+          <p:cNvPicPr>
+            <a:picLocks noChangeAspect="1"/>
+          </p:cNvPicPr>
+          <p:nvPr/>
+        </p:nvPicPr>
+        <p:blipFill rotWithShape="1">
+          <a:blip r:embed="rId4"/>
+          <a:srcRect t="7602" b="4503"/>
+          <a:stretch/>
+        </p:blipFill>
+        <p:spPr>
+          <a:xfrm>
+            <a:off x="2422357" y="2018064"/>
+            <a:ext cx="7283116" cy="4000922"/>
+          </a:xfrm>
+          <a:prstGeom prst="rect">
+            <a:avLst/>
+          </a:prstGeom>
+        </p:spPr>
+      </p:pic>
+      <p:sp>
+        <p:nvSpPr>
+          <p:cNvPr id="126" name="Google Shape;126;p18"/>
           <p:cNvSpPr txBox="1">
             <a:spLocks noGrp="1"/>
           </p:cNvSpPr>
@@ -10708,10 +10365,10 @@
       </p:sp>
       <p:sp>
         <p:nvSpPr>
-          <p:cNvPr id="2" name="Date Placeholder 1">
+          <p:cNvPr id="3" name="Date Placeholder 2">
             <a:extLst>
               <a:ext uri="{FF2B5EF4-FFF2-40B4-BE49-F238E27FC236}">
-                <a16:creationId xmlns:a16="http://schemas.microsoft.com/office/drawing/2014/main" id="{383635CB-F212-67E0-BE18-C1EBB7BD63AA}"/>
+                <a16:creationId xmlns:a16="http://schemas.microsoft.com/office/drawing/2014/main" id="{988B91B0-3990-39DD-EF58-B3EB44C89149}"/>
               </a:ext>
             </a:extLst>
           </p:cNvPr>
@@ -10738,7 +10395,7 @@
     </p:spTree>
     <p:extLst>
       <p:ext uri="{BB962C8B-B14F-4D97-AF65-F5344CB8AC3E}">
-        <p14:creationId xmlns:p14="http://schemas.microsoft.com/office/powerpoint/2010/main" val="3505625943"/>
+        <p14:creationId xmlns:p14="http://schemas.microsoft.com/office/powerpoint/2010/main" val="52745319"/>
       </p:ext>
     </p:extLst>
   </p:cSld>
@@ -10801,228 +10458,6 @@
             </a:pPr>
             <a:r>
               <a:rPr lang="en-US" dirty="0"/>
-              <a:t>Our Documentation</a:t>
-            </a:r>
-            <a:endParaRPr dirty="0"/>
-          </a:p>
-        </p:txBody>
-      </p:sp>
-      <p:sp>
-        <p:nvSpPr>
-          <p:cNvPr id="2" name="TextBox 1">
-            <a:extLst>
-              <a:ext uri="{FF2B5EF4-FFF2-40B4-BE49-F238E27FC236}">
-                <a16:creationId xmlns:a16="http://schemas.microsoft.com/office/drawing/2014/main" id="{C351AC00-B3DE-16E1-739C-0591D7438DB6}"/>
-              </a:ext>
-            </a:extLst>
-          </p:cNvPr>
-          <p:cNvSpPr txBox="1"/>
-          <p:nvPr/>
-        </p:nvSpPr>
-        <p:spPr>
-          <a:xfrm>
-            <a:off x="838200" y="1494844"/>
-            <a:ext cx="10515600" cy="523220"/>
-          </a:xfrm>
-          <a:prstGeom prst="rect">
-            <a:avLst/>
-          </a:prstGeom>
-          <a:noFill/>
-        </p:spPr>
-        <p:txBody>
-          <a:bodyPr wrap="square" rtlCol="0">
-            <a:spAutoFit/>
-          </a:bodyPr>
-          <a:lstStyle/>
-          <a:p>
-            <a:r>
-              <a:rPr lang="en-US" sz="2800" dirty="0"/>
-              <a:t>Located at: </a:t>
-            </a:r>
-            <a:r>
-              <a:rPr lang="en-US" sz="2800" dirty="0">
-                <a:hlinkClick r:id="rId3"/>
-              </a:rPr>
-              <a:t>https://curc.readthedocs.io</a:t>
-            </a:r>
-            <a:r>
-              <a:rPr lang="en-US" sz="2800" dirty="0"/>
-              <a:t> </a:t>
-            </a:r>
-          </a:p>
-        </p:txBody>
-      </p:sp>
-      <p:pic>
-        <p:nvPicPr>
-          <p:cNvPr id="4" name="Picture 3" descr="Screen shot showing the Research Computing documentation webpage">
-            <a:extLst>
-              <a:ext uri="{FF2B5EF4-FFF2-40B4-BE49-F238E27FC236}">
-                <a16:creationId xmlns:a16="http://schemas.microsoft.com/office/drawing/2014/main" id="{039B8453-DA9A-18BE-4241-4996EB58BFF6}"/>
-              </a:ext>
-            </a:extLst>
-          </p:cNvPr>
-          <p:cNvPicPr>
-            <a:picLocks noChangeAspect="1"/>
-          </p:cNvPicPr>
-          <p:nvPr/>
-        </p:nvPicPr>
-        <p:blipFill rotWithShape="1">
-          <a:blip r:embed="rId4"/>
-          <a:srcRect t="7602" b="4503"/>
-          <a:stretch/>
-        </p:blipFill>
-        <p:spPr>
-          <a:xfrm>
-            <a:off x="2422357" y="2018064"/>
-            <a:ext cx="7283116" cy="4000922"/>
-          </a:xfrm>
-          <a:prstGeom prst="rect">
-            <a:avLst/>
-          </a:prstGeom>
-        </p:spPr>
-      </p:pic>
-      <p:sp>
-        <p:nvSpPr>
-          <p:cNvPr id="126" name="Google Shape;126;p18"/>
-          <p:cNvSpPr txBox="1">
-            <a:spLocks noGrp="1"/>
-          </p:cNvSpPr>
-          <p:nvPr>
-            <p:ph type="sldNum" idx="12"/>
-          </p:nvPr>
-        </p:nvSpPr>
-        <p:spPr>
-          <a:xfrm>
-            <a:off x="8610600" y="6356350"/>
-            <a:ext cx="682800" cy="365100"/>
-          </a:xfrm>
-          <a:prstGeom prst="rect">
-            <a:avLst/>
-          </a:prstGeom>
-        </p:spPr>
-        <p:txBody>
-          <a:bodyPr spcFirstLastPara="1" wrap="square" lIns="91425" tIns="45700" rIns="91425" bIns="45700" anchor="ctr" anchorCtr="0">
-            <a:noAutofit/>
-          </a:bodyPr>
-          <a:lstStyle/>
-          <a:p>
-            <a:pPr marL="0" lvl="0" indent="0" algn="l" rtl="0">
-              <a:spcBef>
-                <a:spcPts val="0"/>
-              </a:spcBef>
-              <a:spcAft>
-                <a:spcPts val="0"/>
-              </a:spcAft>
-              <a:buClr>
-                <a:srgbClr val="000000"/>
-              </a:buClr>
-              <a:buSzPts val="1200"/>
-              <a:buFont typeface="Arial"/>
-              <a:buNone/>
-            </a:pPr>
-            <a:fld id="{00000000-1234-1234-1234-123412341234}" type="slidenum">
-              <a:rPr lang="en-US"/>
-              <a:t>7</a:t>
-            </a:fld>
-            <a:endParaRPr/>
-          </a:p>
-        </p:txBody>
-      </p:sp>
-      <p:sp>
-        <p:nvSpPr>
-          <p:cNvPr id="3" name="Date Placeholder 2">
-            <a:extLst>
-              <a:ext uri="{FF2B5EF4-FFF2-40B4-BE49-F238E27FC236}">
-                <a16:creationId xmlns:a16="http://schemas.microsoft.com/office/drawing/2014/main" id="{988B91B0-3990-39DD-EF58-B3EB44C89149}"/>
-              </a:ext>
-            </a:extLst>
-          </p:cNvPr>
-          <p:cNvSpPr>
-            <a:spLocks noGrp="1"/>
-          </p:cNvSpPr>
-          <p:nvPr>
-            <p:ph type="dt" sz="half" idx="10"/>
-          </p:nvPr>
-        </p:nvSpPr>
-        <p:spPr/>
-        <p:txBody>
-          <a:bodyPr/>
-          <a:lstStyle/>
-          <a:p>
-            <a:pPr algn="ctr"/>
-            <a:r>
-              <a:rPr lang="en-US"/>
-              <a:t>8/12/2024</a:t>
-            </a:r>
-          </a:p>
-        </p:txBody>
-      </p:sp>
-    </p:spTree>
-    <p:extLst>
-      <p:ext uri="{BB962C8B-B14F-4D97-AF65-F5344CB8AC3E}">
-        <p14:creationId xmlns:p14="http://schemas.microsoft.com/office/powerpoint/2010/main" val="52745319"/>
-      </p:ext>
-    </p:extLst>
-  </p:cSld>
-  <p:clrMapOvr>
-    <a:masterClrMapping/>
-  </p:clrMapOvr>
-</p:sld>
-</file>
-
-<file path=ppt/slides/slide8.xml><?xml version="1.0" encoding="utf-8"?>
-<p:sld xmlns:a="http://schemas.openxmlformats.org/drawingml/2006/main" xmlns:r="http://schemas.openxmlformats.org/officeDocument/2006/relationships" xmlns:p="http://schemas.openxmlformats.org/presentationml/2006/main">
-  <p:cSld>
-    <p:spTree>
-      <p:nvGrpSpPr>
-        <p:cNvPr id="1" name="Shape 123"/>
-        <p:cNvGrpSpPr/>
-        <p:nvPr/>
-      </p:nvGrpSpPr>
-      <p:grpSpPr>
-        <a:xfrm>
-          <a:off x="0" y="0"/>
-          <a:ext cx="0" cy="0"/>
-          <a:chOff x="0" y="0"/>
-          <a:chExt cx="0" cy="0"/>
-        </a:xfrm>
-      </p:grpSpPr>
-      <p:sp>
-        <p:nvSpPr>
-          <p:cNvPr id="124" name="Google Shape;124;p18"/>
-          <p:cNvSpPr txBox="1">
-            <a:spLocks noGrp="1"/>
-          </p:cNvSpPr>
-          <p:nvPr>
-            <p:ph type="title"/>
-          </p:nvPr>
-        </p:nvSpPr>
-        <p:spPr>
-          <a:xfrm>
-            <a:off x="838200" y="365125"/>
-            <a:ext cx="10515600" cy="1325700"/>
-          </a:xfrm>
-          <a:prstGeom prst="rect">
-            <a:avLst/>
-          </a:prstGeom>
-        </p:spPr>
-        <p:txBody>
-          <a:bodyPr spcFirstLastPara="1" wrap="square" lIns="91425" tIns="45700" rIns="91425" bIns="45700" anchor="ctr" anchorCtr="0">
-            <a:normAutofit/>
-          </a:bodyPr>
-          <a:lstStyle/>
-          <a:p>
-            <a:pPr marL="0" lvl="0" indent="0" algn="l" rtl="0">
-              <a:spcBef>
-                <a:spcPts val="0"/>
-              </a:spcBef>
-              <a:spcAft>
-                <a:spcPts val="0"/>
-              </a:spcAft>
-              <a:buNone/>
-            </a:pPr>
-            <a:r>
-              <a:rPr lang="en-US" dirty="0"/>
               <a:t>CRDDS trainings and consult hours</a:t>
             </a:r>
             <a:endParaRPr dirty="0"/>
@@ -11144,7 +10579,7 @@
             </a:pPr>
             <a:fld id="{00000000-1234-1234-1234-123412341234}" type="slidenum">
               <a:rPr lang="en-US"/>
-              <a:t>8</a:t>
+              <a:t>7</a:t>
             </a:fld>
             <a:endParaRPr/>
           </a:p>
@@ -11192,7 +10627,7 @@
 </p:sld>
 </file>
 
-<file path=ppt/slides/slide9.xml><?xml version="1.0" encoding="utf-8"?>
+<file path=ppt/slides/slide8.xml><?xml version="1.0" encoding="utf-8"?>
 <p:sld xmlns:a="http://schemas.openxmlformats.org/drawingml/2006/main" xmlns:r="http://schemas.openxmlformats.org/officeDocument/2006/relationships" xmlns:p="http://schemas.openxmlformats.org/presentationml/2006/main">
   <p:cSld>
     <p:spTree>
@@ -11453,7 +10888,7 @@
             </a:pPr>
             <a:fld id="{00000000-1234-1234-1234-123412341234}" type="slidenum">
               <a:rPr lang="en-US" smtClean="0"/>
-              <a:t>9</a:t>
+              <a:t>8</a:t>
             </a:fld>
             <a:endParaRPr lang="en-US" dirty="0"/>
           </a:p>
@@ -11489,6 +10924,154 @@
         </p:txBody>
       </p:sp>
     </p:spTree>
+  </p:cSld>
+  <p:clrMapOvr>
+    <a:masterClrMapping/>
+  </p:clrMapOvr>
+</p:sld>
+</file>
+
+<file path=ppt/slides/slide9.xml><?xml version="1.0" encoding="utf-8"?>
+<p:sld xmlns:a="http://schemas.openxmlformats.org/drawingml/2006/main" xmlns:r="http://schemas.openxmlformats.org/officeDocument/2006/relationships" xmlns:p="http://schemas.openxmlformats.org/presentationml/2006/main">
+  <p:cSld>
+    <p:spTree>
+      <p:nvGrpSpPr>
+        <p:cNvPr id="1" name="Shape 123"/>
+        <p:cNvGrpSpPr/>
+        <p:nvPr/>
+      </p:nvGrpSpPr>
+      <p:grpSpPr>
+        <a:xfrm>
+          <a:off x="0" y="0"/>
+          <a:ext cx="0" cy="0"/>
+          <a:chOff x="0" y="0"/>
+          <a:chExt cx="0" cy="0"/>
+        </a:xfrm>
+      </p:grpSpPr>
+      <p:sp>
+        <p:nvSpPr>
+          <p:cNvPr id="124" name="Google Shape;124;p18"/>
+          <p:cNvSpPr txBox="1">
+            <a:spLocks noGrp="1"/>
+          </p:cNvSpPr>
+          <p:nvPr>
+            <p:ph type="title"/>
+          </p:nvPr>
+        </p:nvSpPr>
+        <p:spPr>
+          <a:xfrm>
+            <a:off x="838200" y="365125"/>
+            <a:ext cx="10515600" cy="1325700"/>
+          </a:xfrm>
+          <a:prstGeom prst="rect">
+            <a:avLst/>
+          </a:prstGeom>
+        </p:spPr>
+        <p:txBody>
+          <a:bodyPr spcFirstLastPara="1" wrap="square" lIns="91425" tIns="45700" rIns="91425" bIns="45700" anchor="ctr" anchorCtr="0">
+            <a:normAutofit/>
+          </a:bodyPr>
+          <a:lstStyle/>
+          <a:p>
+            <a:pPr marL="0" lvl="0" indent="0" algn="l" rtl="0">
+              <a:spcBef>
+                <a:spcPts val="0"/>
+              </a:spcBef>
+              <a:spcAft>
+                <a:spcPts val="0"/>
+              </a:spcAft>
+              <a:buNone/>
+            </a:pPr>
+            <a:r>
+              <a:rPr lang="en-US" dirty="0"/>
+              <a:t>Composing an effective ticket</a:t>
+            </a:r>
+            <a:endParaRPr dirty="0"/>
+          </a:p>
+        </p:txBody>
+      </p:sp>
+      <p:sp>
+        <p:nvSpPr>
+          <p:cNvPr id="126" name="Google Shape;126;p18"/>
+          <p:cNvSpPr txBox="1">
+            <a:spLocks noGrp="1"/>
+          </p:cNvSpPr>
+          <p:nvPr>
+            <p:ph type="sldNum" idx="12"/>
+          </p:nvPr>
+        </p:nvSpPr>
+        <p:spPr>
+          <a:xfrm>
+            <a:off x="8610600" y="6356350"/>
+            <a:ext cx="682800" cy="365100"/>
+          </a:xfrm>
+          <a:prstGeom prst="rect">
+            <a:avLst/>
+          </a:prstGeom>
+        </p:spPr>
+        <p:txBody>
+          <a:bodyPr spcFirstLastPara="1" wrap="square" lIns="91425" tIns="45700" rIns="91425" bIns="45700" anchor="ctr" anchorCtr="0">
+            <a:noAutofit/>
+          </a:bodyPr>
+          <a:lstStyle/>
+          <a:p>
+            <a:pPr marL="0" lvl="0" indent="0" algn="l" rtl="0">
+              <a:spcBef>
+                <a:spcPts val="0"/>
+              </a:spcBef>
+              <a:spcAft>
+                <a:spcPts val="0"/>
+              </a:spcAft>
+              <a:buClr>
+                <a:srgbClr val="000000"/>
+              </a:buClr>
+              <a:buSzPts val="1200"/>
+              <a:buFont typeface="Arial"/>
+              <a:buNone/>
+            </a:pPr>
+            <a:fld id="{00000000-1234-1234-1234-123412341234}" type="slidenum">
+              <a:rPr lang="en-US"/>
+              <a:t>9</a:t>
+            </a:fld>
+            <a:endParaRPr/>
+          </a:p>
+        </p:txBody>
+      </p:sp>
+      <p:sp>
+        <p:nvSpPr>
+          <p:cNvPr id="2" name="Date Placeholder 1">
+            <a:extLst>
+              <a:ext uri="{FF2B5EF4-FFF2-40B4-BE49-F238E27FC236}">
+                <a16:creationId xmlns:a16="http://schemas.microsoft.com/office/drawing/2014/main" id="{0DD02C7C-E9B8-5F77-97D9-27140B71DA76}"/>
+              </a:ext>
+            </a:extLst>
+          </p:cNvPr>
+          <p:cNvSpPr>
+            <a:spLocks noGrp="1"/>
+          </p:cNvSpPr>
+          <p:nvPr>
+            <p:ph type="dt" sz="half" idx="10"/>
+          </p:nvPr>
+        </p:nvSpPr>
+        <p:spPr/>
+        <p:txBody>
+          <a:bodyPr/>
+          <a:lstStyle/>
+          <a:p>
+            <a:pPr algn="ctr"/>
+            <a:r>
+              <a:rPr lang="en-US"/>
+              <a:t>8/12/2024</a:t>
+            </a:r>
+          </a:p>
+        </p:txBody>
+      </p:sp>
+    </p:spTree>
+    <p:extLst>
+      <p:ext uri="{BB962C8B-B14F-4D97-AF65-F5344CB8AC3E}">
+        <p14:creationId xmlns:p14="http://schemas.microsoft.com/office/powerpoint/2010/main" val="3375651352"/>
+      </p:ext>
+    </p:extLst>
   </p:cSld>
   <p:clrMapOvr>
     <a:masterClrMapping/>
@@ -12053,15 +11636,6 @@
 </file>
 
 <file path=customXml/item1.xml><?xml version="1.0" encoding="utf-8"?>
-<?mso-contentType ?>
-<FormTemplates xmlns="http://schemas.microsoft.com/sharepoint/v3/contenttype/forms">
-  <Display>DocumentLibraryForm</Display>
-  <Edit>DocumentLibraryForm</Edit>
-  <New>DocumentLibraryForm</New>
-</FormTemplates>
-</file>
-
-<file path=customXml/item2.xml><?xml version="1.0" encoding="utf-8"?>
 <ct:contentTypeSchema xmlns:ct="http://schemas.microsoft.com/office/2006/metadata/contentType" xmlns:ma="http://schemas.microsoft.com/office/2006/metadata/properties/metaAttributes" ct:_="" ma:_="" ma:contentTypeName="Document" ma:contentTypeID="0x010100DC7320DB280744439FF1CC777D09ECA4" ma:contentTypeVersion="15" ma:contentTypeDescription="Create a new document." ma:contentTypeScope="" ma:versionID="e50b92032c956cc777cf00ac7d475189">
   <xsd:schema xmlns:xsd="http://www.w3.org/2001/XMLSchema" xmlns:xs="http://www.w3.org/2001/XMLSchema" xmlns:p="http://schemas.microsoft.com/office/2006/metadata/properties" xmlns:ns2="7e49f7d3-8802-46ca-9604-495ce27f67f4" xmlns:ns3="a1519f9a-9d6a-41c1-afc9-552e4069f82f" xmlns:ns4="92c16b9d-8c83-445e-a4f4-1fe3d2f43f13" targetNamespace="http://schemas.microsoft.com/office/2006/metadata/properties" ma:root="true" ma:fieldsID="fcd7cab68a23f1df7b42ced4f3edf141" ns2:_="" ns3:_="" ns4:_="">
     <xsd:import namespace="7e49f7d3-8802-46ca-9604-495ce27f67f4"/>
@@ -12303,6 +11877,15 @@
 </ct:contentTypeSchema>
 </file>
 
+<file path=customXml/item2.xml><?xml version="1.0" encoding="utf-8"?>
+<?mso-contentType ?>
+<FormTemplates xmlns="http://schemas.microsoft.com/sharepoint/v3/contenttype/forms">
+  <Display>DocumentLibraryForm</Display>
+  <Edit>DocumentLibraryForm</Edit>
+  <New>DocumentLibraryForm</New>
+</FormTemplates>
+</file>
+
 <file path=customXml/item3.xml><?xml version="1.0" encoding="utf-8"?>
 <p:properties xmlns:p="http://schemas.microsoft.com/office/2006/metadata/properties" xmlns:xsi="http://www.w3.org/2001/XMLSchema-instance" xmlns:pc="http://schemas.microsoft.com/office/infopath/2007/PartnerControls">
   <documentManagement>
@@ -12315,14 +11898,6 @@
 </file>
 
 <file path=customXml/itemProps1.xml><?xml version="1.0" encoding="utf-8"?>
-<ds:datastoreItem xmlns:ds="http://schemas.openxmlformats.org/officeDocument/2006/customXml" ds:itemID="{06B4C708-AA43-4CE7-BE2D-F9D9A02F4940}">
-  <ds:schemaRefs>
-    <ds:schemaRef ds:uri="http://schemas.microsoft.com/sharepoint/v3/contenttype/forms"/>
-  </ds:schemaRefs>
-</ds:datastoreItem>
-</file>
-
-<file path=customXml/itemProps2.xml><?xml version="1.0" encoding="utf-8"?>
 <ds:datastoreItem xmlns:ds="http://schemas.openxmlformats.org/officeDocument/2006/customXml" ds:itemID="{6BBC22CE-40EC-4545-8FE9-90326628051D}">
   <ds:schemaRefs>
     <ds:schemaRef ds:uri="7e49f7d3-8802-46ca-9604-495ce27f67f4"/>
@@ -12338,6 +11913,14 @@
     <ds:schemaRef ds:uri="http://schemas.microsoft.com/office/infopath/2007/PartnerControls"/>
     <ds:schemaRef ds:uri="http://schemas.openxmlformats.org/package/2006/metadata/core-properties"/>
     <ds:schemaRef ds:uri="http://www.w3.org/2001/XMLSchema"/>
+  </ds:schemaRefs>
+</ds:datastoreItem>
+</file>
+
+<file path=customXml/itemProps2.xml><?xml version="1.0" encoding="utf-8"?>
+<ds:datastoreItem xmlns:ds="http://schemas.openxmlformats.org/officeDocument/2006/customXml" ds:itemID="{06B4C708-AA43-4CE7-BE2D-F9D9A02F4940}">
+  <ds:schemaRefs>
+    <ds:schemaRef ds:uri="http://schemas.microsoft.com/sharepoint/v3/contenttype/forms"/>
   </ds:schemaRefs>
 </ds:datastoreItem>
 </file>

</xml_diff>

<commit_message>
Updated lecture for Jan 2024 (#13)
</commit_message>
<xml_diff>
--- a/asking_for_help/getting_help_curc.pptx
+++ b/asking_for_help/getting_help_curc.pptx
@@ -5,7 +5,7 @@
     <p:sldMasterId id="2147483660" r:id="rId4"/>
   </p:sldMasterIdLst>
   <p:notesMasterIdLst>
-    <p:notesMasterId r:id="rId26"/>
+    <p:notesMasterId r:id="rId25"/>
   </p:notesMasterIdLst>
   <p:sldIdLst>
     <p:sldId id="340" r:id="rId5"/>
@@ -28,7 +28,6 @@
     <p:sldId id="335" r:id="rId22"/>
     <p:sldId id="337" r:id="rId23"/>
     <p:sldId id="338" r:id="rId24"/>
-    <p:sldId id="350" r:id="rId25"/>
   </p:sldIdLst>
   <p:sldSz cx="12192000" cy="6858000"/>
   <p:notesSz cx="6858000" cy="9144000"/>
@@ -234,7 +233,7 @@
           <a:p>
             <a:fld id="{EFDA08D6-E137-3341-A5EE-84219A24203E}" type="datetimeFigureOut">
               <a:rPr lang="en-US" smtClean="0"/>
-              <a:t>8/12/24</a:t>
+              <a:t>1/6/25</a:t>
             </a:fld>
             <a:endParaRPr lang="en-US"/>
           </a:p>
@@ -1761,157 +1760,6 @@
 </p:notes>
 </file>
 
-<file path=ppt/notesSlides/notesSlide18.xml><?xml version="1.0" encoding="utf-8"?>
-<p:notes xmlns:a="http://schemas.openxmlformats.org/drawingml/2006/main" xmlns:r="http://schemas.openxmlformats.org/officeDocument/2006/relationships" xmlns:p="http://schemas.openxmlformats.org/presentationml/2006/main" showMasterSp="0" showMasterPhAnim="0">
-  <p:cSld>
-    <p:spTree>
-      <p:nvGrpSpPr>
-        <p:cNvPr id="1" name="Shape 908"/>
-        <p:cNvGrpSpPr/>
-        <p:nvPr/>
-      </p:nvGrpSpPr>
-      <p:grpSpPr>
-        <a:xfrm>
-          <a:off x="0" y="0"/>
-          <a:ext cx="0" cy="0"/>
-          <a:chOff x="0" y="0"/>
-          <a:chExt cx="0" cy="0"/>
-        </a:xfrm>
-      </p:grpSpPr>
-      <p:sp>
-        <p:nvSpPr>
-          <p:cNvPr id="909" name="Google Shape;909;g12316551eda_0_874:notes"/>
-          <p:cNvSpPr>
-            <a:spLocks noGrp="1" noRot="1" noChangeAspect="1"/>
-          </p:cNvSpPr>
-          <p:nvPr>
-            <p:ph type="sldImg" idx="2"/>
-          </p:nvPr>
-        </p:nvSpPr>
-        <p:spPr>
-          <a:xfrm>
-            <a:off x="685800" y="1143000"/>
-            <a:ext cx="5486400" cy="3086100"/>
-          </a:xfrm>
-          <a:custGeom>
-            <a:avLst/>
-            <a:gdLst/>
-            <a:ahLst/>
-            <a:cxnLst/>
-            <a:rect l="l" t="t" r="r" b="b"/>
-            <a:pathLst>
-              <a:path w="120000" h="120000" extrusionOk="0">
-                <a:moveTo>
-                  <a:pt x="0" y="0"/>
-                </a:moveTo>
-                <a:lnTo>
-                  <a:pt x="120000" y="0"/>
-                </a:lnTo>
-                <a:lnTo>
-                  <a:pt x="120000" y="120000"/>
-                </a:lnTo>
-                <a:lnTo>
-                  <a:pt x="0" y="120000"/>
-                </a:lnTo>
-                <a:close/>
-              </a:path>
-            </a:pathLst>
-          </a:custGeom>
-        </p:spPr>
-      </p:sp>
-      <p:sp>
-        <p:nvSpPr>
-          <p:cNvPr id="910" name="Google Shape;910;g12316551eda_0_874:notes"/>
-          <p:cNvSpPr txBox="1">
-            <a:spLocks noGrp="1"/>
-          </p:cNvSpPr>
-          <p:nvPr>
-            <p:ph type="body" idx="1"/>
-          </p:nvPr>
-        </p:nvSpPr>
-        <p:spPr>
-          <a:xfrm>
-            <a:off x="685800" y="4400550"/>
-            <a:ext cx="5486400" cy="3600600"/>
-          </a:xfrm>
-          <a:prstGeom prst="rect">
-            <a:avLst/>
-          </a:prstGeom>
-        </p:spPr>
-        <p:txBody>
-          <a:bodyPr spcFirstLastPara="1" wrap="square" lIns="91425" tIns="45700" rIns="91425" bIns="45700" anchor="t" anchorCtr="0">
-            <a:noAutofit/>
-          </a:bodyPr>
-          <a:lstStyle/>
-          <a:p>
-            <a:pPr marL="0" lvl="0" indent="0" algn="l" rtl="0">
-              <a:spcBef>
-                <a:spcPts val="0"/>
-              </a:spcBef>
-              <a:spcAft>
-                <a:spcPts val="0"/>
-              </a:spcAft>
-              <a:buNone/>
-            </a:pPr>
-            <a:endParaRPr/>
-          </a:p>
-        </p:txBody>
-      </p:sp>
-      <p:sp>
-        <p:nvSpPr>
-          <p:cNvPr id="911" name="Google Shape;911;g12316551eda_0_874:notes"/>
-          <p:cNvSpPr txBox="1">
-            <a:spLocks noGrp="1"/>
-          </p:cNvSpPr>
-          <p:nvPr>
-            <p:ph type="sldNum" idx="12"/>
-          </p:nvPr>
-        </p:nvSpPr>
-        <p:spPr>
-          <a:xfrm>
-            <a:off x="3884613" y="8685213"/>
-            <a:ext cx="2971800" cy="458700"/>
-          </a:xfrm>
-          <a:prstGeom prst="rect">
-            <a:avLst/>
-          </a:prstGeom>
-        </p:spPr>
-        <p:txBody>
-          <a:bodyPr spcFirstLastPara="1" wrap="square" lIns="91425" tIns="45700" rIns="91425" bIns="45700" anchor="b" anchorCtr="0">
-            <a:noAutofit/>
-          </a:bodyPr>
-          <a:lstStyle/>
-          <a:p>
-            <a:pPr marL="0" lvl="0" indent="0" algn="r" rtl="0">
-              <a:spcBef>
-                <a:spcPts val="0"/>
-              </a:spcBef>
-              <a:spcAft>
-                <a:spcPts val="0"/>
-              </a:spcAft>
-              <a:buClr>
-                <a:srgbClr val="000000"/>
-              </a:buClr>
-              <a:buSzPts val="1200"/>
-              <a:buFont typeface="Arial"/>
-              <a:buNone/>
-            </a:pPr>
-            <a:fld id="{00000000-1234-1234-1234-123412341234}" type="slidenum">
-              <a:rPr lang="en-US"/>
-              <a:t>21</a:t>
-            </a:fld>
-            <a:endParaRPr/>
-          </a:p>
-        </p:txBody>
-      </p:sp>
-    </p:spTree>
-  </p:cSld>
-  <p:clrMapOvr>
-    <a:masterClrMapping/>
-  </p:clrMapOvr>
-</p:notes>
-</file>
-
 <file path=ppt/notesSlides/notesSlide2.xml><?xml version="1.0" encoding="utf-8"?>
 <p:notes xmlns:a="http://schemas.openxmlformats.org/drawingml/2006/main" xmlns:r="http://schemas.openxmlformats.org/officeDocument/2006/relationships" xmlns:p="http://schemas.openxmlformats.org/presentationml/2006/main" showMasterSp="0" showMasterPhAnim="0">
   <p:cSld>
@@ -3253,7 +3101,7 @@
             <a:pPr algn="ctr"/>
             <a:r>
               <a:rPr lang="en-US"/>
-              <a:t>8/12/2024</a:t>
+              <a:t>01/07/2025</a:t>
             </a:r>
           </a:p>
         </p:txBody>
@@ -3434,7 +3282,7 @@
             <a:pPr algn="ctr"/>
             <a:r>
               <a:rPr lang="en-US"/>
-              <a:t>8/12/2024</a:t>
+              <a:t>01/07/2025</a:t>
             </a:r>
           </a:p>
         </p:txBody>
@@ -3727,7 +3575,7 @@
             <a:pPr algn="ctr"/>
             <a:r>
               <a:rPr lang="en-US"/>
-              <a:t>8/12/2024</a:t>
+              <a:t>01/07/2025</a:t>
             </a:r>
           </a:p>
         </p:txBody>
@@ -4129,7 +3977,7 @@
               <a:rPr lang="en-US" sz="2800" dirty="0">
                 <a:latin typeface="Century Gothic" panose="020B0502020202020204" pitchFamily="34" charset="0"/>
               </a:rPr>
-              <a:t>August 12, 2024</a:t>
+              <a:t>January 7, 2025</a:t>
             </a:r>
           </a:p>
         </p:txBody>
@@ -4782,10 +4630,10 @@
       </p:sp>
       <p:sp>
         <p:nvSpPr>
-          <p:cNvPr id="4" name="Slide Number Placeholder 3">
+          <p:cNvPr id="7" name="Slide Number Placeholder 6">
             <a:extLst>
               <a:ext uri="{FF2B5EF4-FFF2-40B4-BE49-F238E27FC236}">
-                <a16:creationId xmlns:a16="http://schemas.microsoft.com/office/drawing/2014/main" id="{841C1259-B1D8-7F86-6EBE-1508951C6DFB}"/>
+                <a16:creationId xmlns:a16="http://schemas.microsoft.com/office/drawing/2014/main" id="{2015AC5B-F3EF-C619-05BA-5F5E01FF4387}"/>
               </a:ext>
             </a:extLst>
           </p:cNvPr>
@@ -4793,7 +4641,7 @@
             <a:spLocks noGrp="1"/>
           </p:cNvSpPr>
           <p:nvPr>
-            <p:ph type="sldNum" idx="12"/>
+            <p:ph type="sldNum" sz="quarter" idx="12"/>
           </p:nvPr>
         </p:nvSpPr>
         <p:spPr/>
@@ -4801,29 +4649,20 @@
           <a:bodyPr/>
           <a:lstStyle/>
           <a:p>
-            <a:pPr marL="0" lvl="0" indent="0" algn="l" rtl="0">
-              <a:spcBef>
-                <a:spcPts val="0"/>
-              </a:spcBef>
-              <a:spcAft>
-                <a:spcPts val="0"/>
-              </a:spcAft>
-              <a:buNone/>
-            </a:pPr>
-            <a:fld id="{00000000-1234-1234-1234-123412341234}" type="slidenum">
+            <a:fld id="{ABDA560F-461C-6043-9BC4-489BA92F7161}" type="slidenum">
               <a:rPr lang="en-US" smtClean="0"/>
               <a:t>10</a:t>
             </a:fld>
-            <a:endParaRPr lang="en-US" dirty="0"/>
-          </a:p>
-        </p:txBody>
-      </p:sp>
-      <p:sp>
-        <p:nvSpPr>
-          <p:cNvPr id="6" name="Date Placeholder 5">
+            <a:endParaRPr lang="en-US"/>
+          </a:p>
+        </p:txBody>
+      </p:sp>
+      <p:sp>
+        <p:nvSpPr>
+          <p:cNvPr id="8" name="Date Placeholder 7">
             <a:extLst>
               <a:ext uri="{FF2B5EF4-FFF2-40B4-BE49-F238E27FC236}">
-                <a16:creationId xmlns:a16="http://schemas.microsoft.com/office/drawing/2014/main" id="{D5D4472F-54B5-B48E-6CE7-93E0C3814188}"/>
+                <a16:creationId xmlns:a16="http://schemas.microsoft.com/office/drawing/2014/main" id="{5EA0EBD3-CD16-CE56-114E-0FBE97684EB4}"/>
               </a:ext>
             </a:extLst>
           </p:cNvPr>
@@ -4842,7 +4681,7 @@
             <a:pPr algn="ctr"/>
             <a:r>
               <a:rPr lang="en-US"/>
-              <a:t>8/12/2024</a:t>
+              <a:t>01/07/2025</a:t>
             </a:r>
           </a:p>
         </p:txBody>
@@ -5026,57 +4865,10 @@
       </p:sp>
       <p:sp>
         <p:nvSpPr>
-          <p:cNvPr id="126" name="Google Shape;126;p18"/>
-          <p:cNvSpPr txBox="1">
-            <a:spLocks noGrp="1"/>
-          </p:cNvSpPr>
-          <p:nvPr>
-            <p:ph type="sldNum" idx="12"/>
-          </p:nvPr>
-        </p:nvSpPr>
-        <p:spPr>
-          <a:xfrm>
-            <a:off x="8610600" y="6356350"/>
-            <a:ext cx="682800" cy="365100"/>
-          </a:xfrm>
-          <a:prstGeom prst="rect">
-            <a:avLst/>
-          </a:prstGeom>
-        </p:spPr>
-        <p:txBody>
-          <a:bodyPr spcFirstLastPara="1" wrap="square" lIns="91425" tIns="45700" rIns="91425" bIns="45700" anchor="ctr" anchorCtr="0">
-            <a:noAutofit/>
-          </a:bodyPr>
-          <a:lstStyle/>
-          <a:p>
-            <a:pPr marL="0" lvl="0" indent="0" algn="l" rtl="0">
-              <a:spcBef>
-                <a:spcPts val="0"/>
-              </a:spcBef>
-              <a:spcAft>
-                <a:spcPts val="0"/>
-              </a:spcAft>
-              <a:buClr>
-                <a:srgbClr val="000000"/>
-              </a:buClr>
-              <a:buSzPts val="1200"/>
-              <a:buFont typeface="Arial"/>
-              <a:buNone/>
-            </a:pPr>
-            <a:fld id="{00000000-1234-1234-1234-123412341234}" type="slidenum">
-              <a:rPr lang="en-US"/>
-              <a:t>11</a:t>
-            </a:fld>
-            <a:endParaRPr/>
-          </a:p>
-        </p:txBody>
-      </p:sp>
-      <p:sp>
-        <p:nvSpPr>
-          <p:cNvPr id="2" name="Date Placeholder 1">
+          <p:cNvPr id="3" name="Slide Number Placeholder 2">
             <a:extLst>
               <a:ext uri="{FF2B5EF4-FFF2-40B4-BE49-F238E27FC236}">
-                <a16:creationId xmlns:a16="http://schemas.microsoft.com/office/drawing/2014/main" id="{9F2D606A-32D9-4E09-578A-260AB1832CDC}"/>
+                <a16:creationId xmlns:a16="http://schemas.microsoft.com/office/drawing/2014/main" id="{BB43DCE8-C564-BC4F-6A1B-4A22C54B1AE9}"/>
               </a:ext>
             </a:extLst>
           </p:cNvPr>
@@ -5084,6 +4876,35 @@
             <a:spLocks noGrp="1"/>
           </p:cNvSpPr>
           <p:nvPr>
+            <p:ph type="sldNum" sz="quarter" idx="12"/>
+          </p:nvPr>
+        </p:nvSpPr>
+        <p:spPr/>
+        <p:txBody>
+          <a:bodyPr/>
+          <a:lstStyle/>
+          <a:p>
+            <a:fld id="{ABDA560F-461C-6043-9BC4-489BA92F7161}" type="slidenum">
+              <a:rPr lang="en-US" smtClean="0"/>
+              <a:t>11</a:t>
+            </a:fld>
+            <a:endParaRPr lang="en-US"/>
+          </a:p>
+        </p:txBody>
+      </p:sp>
+      <p:sp>
+        <p:nvSpPr>
+          <p:cNvPr id="4" name="Date Placeholder 3">
+            <a:extLst>
+              <a:ext uri="{FF2B5EF4-FFF2-40B4-BE49-F238E27FC236}">
+                <a16:creationId xmlns:a16="http://schemas.microsoft.com/office/drawing/2014/main" id="{A8945785-546B-0887-4E8B-576D2B3211D7}"/>
+              </a:ext>
+            </a:extLst>
+          </p:cNvPr>
+          <p:cNvSpPr>
+            <a:spLocks noGrp="1"/>
+          </p:cNvSpPr>
+          <p:nvPr>
             <p:ph type="dt" sz="half" idx="10"/>
           </p:nvPr>
         </p:nvSpPr>
@@ -5095,7 +4916,7 @@
             <a:pPr algn="ctr"/>
             <a:r>
               <a:rPr lang="en-US"/>
-              <a:t>8/12/2024</a:t>
+              <a:t>01/07/2025</a:t>
             </a:r>
           </a:p>
         </p:txBody>
@@ -5643,10 +5464,10 @@
       </p:sp>
       <p:sp>
         <p:nvSpPr>
-          <p:cNvPr id="4" name="Slide Number Placeholder 3">
+          <p:cNvPr id="2" name="Slide Number Placeholder 1">
             <a:extLst>
               <a:ext uri="{FF2B5EF4-FFF2-40B4-BE49-F238E27FC236}">
-                <a16:creationId xmlns:a16="http://schemas.microsoft.com/office/drawing/2014/main" id="{841C1259-B1D8-7F86-6EBE-1508951C6DFB}"/>
+                <a16:creationId xmlns:a16="http://schemas.microsoft.com/office/drawing/2014/main" id="{FE984591-30C9-5DD5-5874-B26DD6A4345C}"/>
               </a:ext>
             </a:extLst>
           </p:cNvPr>
@@ -5654,7 +5475,7 @@
             <a:spLocks noGrp="1"/>
           </p:cNvSpPr>
           <p:nvPr>
-            <p:ph type="sldNum" idx="12"/>
+            <p:ph type="sldNum" sz="quarter" idx="12"/>
           </p:nvPr>
         </p:nvSpPr>
         <p:spPr/>
@@ -5662,16 +5483,7 @@
           <a:bodyPr/>
           <a:lstStyle/>
           <a:p>
-            <a:pPr marL="0" lvl="0" indent="0" algn="l" rtl="0">
-              <a:spcBef>
-                <a:spcPts val="0"/>
-              </a:spcBef>
-              <a:spcAft>
-                <a:spcPts val="0"/>
-              </a:spcAft>
-              <a:buNone/>
-            </a:pPr>
-            <a:fld id="{00000000-1234-1234-1234-123412341234}" type="slidenum">
+            <a:fld id="{ABDA560F-461C-6043-9BC4-489BA92F7161}" type="slidenum">
               <a:rPr lang="en-US" smtClean="0"/>
               <a:t>12</a:t>
             </a:fld>
@@ -5681,10 +5493,10 @@
       </p:sp>
       <p:sp>
         <p:nvSpPr>
-          <p:cNvPr id="6" name="Date Placeholder 5">
+          <p:cNvPr id="7" name="Date Placeholder 6">
             <a:extLst>
               <a:ext uri="{FF2B5EF4-FFF2-40B4-BE49-F238E27FC236}">
-                <a16:creationId xmlns:a16="http://schemas.microsoft.com/office/drawing/2014/main" id="{6EBCD051-5B02-DD39-58D1-D7A5845A8ED1}"/>
+                <a16:creationId xmlns:a16="http://schemas.microsoft.com/office/drawing/2014/main" id="{9ED96AB6-4D16-BDB0-9A16-7EE01D91D7C2}"/>
               </a:ext>
             </a:extLst>
           </p:cNvPr>
@@ -5703,7 +5515,7 @@
             <a:pPr algn="ctr"/>
             <a:r>
               <a:rPr lang="en-US"/>
-              <a:t>8/12/2024</a:t>
+              <a:t>01/07/2025</a:t>
             </a:r>
           </a:p>
         </p:txBody>
@@ -5886,57 +5698,10 @@
       </p:sp>
       <p:sp>
         <p:nvSpPr>
-          <p:cNvPr id="126" name="Google Shape;126;p18"/>
-          <p:cNvSpPr txBox="1">
-            <a:spLocks noGrp="1"/>
-          </p:cNvSpPr>
-          <p:nvPr>
-            <p:ph type="sldNum" idx="12"/>
-          </p:nvPr>
-        </p:nvSpPr>
-        <p:spPr>
-          <a:xfrm>
-            <a:off x="8610600" y="6356350"/>
-            <a:ext cx="682800" cy="365100"/>
-          </a:xfrm>
-          <a:prstGeom prst="rect">
-            <a:avLst/>
-          </a:prstGeom>
-        </p:spPr>
-        <p:txBody>
-          <a:bodyPr spcFirstLastPara="1" wrap="square" lIns="91425" tIns="45700" rIns="91425" bIns="45700" anchor="ctr" anchorCtr="0">
-            <a:noAutofit/>
-          </a:bodyPr>
-          <a:lstStyle/>
-          <a:p>
-            <a:pPr marL="0" lvl="0" indent="0" algn="l" rtl="0">
-              <a:spcBef>
-                <a:spcPts val="0"/>
-              </a:spcBef>
-              <a:spcAft>
-                <a:spcPts val="0"/>
-              </a:spcAft>
-              <a:buClr>
-                <a:srgbClr val="000000"/>
-              </a:buClr>
-              <a:buSzPts val="1200"/>
-              <a:buFont typeface="Arial"/>
-              <a:buNone/>
-            </a:pPr>
-            <a:fld id="{00000000-1234-1234-1234-123412341234}" type="slidenum">
-              <a:rPr lang="en-US"/>
-              <a:t>13</a:t>
-            </a:fld>
-            <a:endParaRPr/>
-          </a:p>
-        </p:txBody>
-      </p:sp>
-      <p:sp>
-        <p:nvSpPr>
-          <p:cNvPr id="2" name="Date Placeholder 1">
+          <p:cNvPr id="3" name="Slide Number Placeholder 2">
             <a:extLst>
               <a:ext uri="{FF2B5EF4-FFF2-40B4-BE49-F238E27FC236}">
-                <a16:creationId xmlns:a16="http://schemas.microsoft.com/office/drawing/2014/main" id="{F6B2437E-26D9-CF0C-147A-62C10946FAAB}"/>
+                <a16:creationId xmlns:a16="http://schemas.microsoft.com/office/drawing/2014/main" id="{BE8BC7D3-CBED-4CA7-12C0-922B876B5035}"/>
               </a:ext>
             </a:extLst>
           </p:cNvPr>
@@ -5944,6 +5709,35 @@
             <a:spLocks noGrp="1"/>
           </p:cNvSpPr>
           <p:nvPr>
+            <p:ph type="sldNum" sz="quarter" idx="12"/>
+          </p:nvPr>
+        </p:nvSpPr>
+        <p:spPr/>
+        <p:txBody>
+          <a:bodyPr/>
+          <a:lstStyle/>
+          <a:p>
+            <a:fld id="{ABDA560F-461C-6043-9BC4-489BA92F7161}" type="slidenum">
+              <a:rPr lang="en-US" smtClean="0"/>
+              <a:t>13</a:t>
+            </a:fld>
+            <a:endParaRPr lang="en-US"/>
+          </a:p>
+        </p:txBody>
+      </p:sp>
+      <p:sp>
+        <p:nvSpPr>
+          <p:cNvPr id="4" name="Date Placeholder 3">
+            <a:extLst>
+              <a:ext uri="{FF2B5EF4-FFF2-40B4-BE49-F238E27FC236}">
+                <a16:creationId xmlns:a16="http://schemas.microsoft.com/office/drawing/2014/main" id="{71C3E3D1-3406-4ACE-1B4D-B7665B46B9EC}"/>
+              </a:ext>
+            </a:extLst>
+          </p:cNvPr>
+          <p:cNvSpPr>
+            <a:spLocks noGrp="1"/>
+          </p:cNvSpPr>
+          <p:nvPr>
             <p:ph type="dt" sz="half" idx="10"/>
           </p:nvPr>
         </p:nvSpPr>
@@ -5955,7 +5749,7 @@
             <a:pPr algn="ctr"/>
             <a:r>
               <a:rPr lang="en-US"/>
-              <a:t>8/12/2024</a:t>
+              <a:t>01/07/2025</a:t>
             </a:r>
           </a:p>
         </p:txBody>
@@ -6586,10 +6380,10 @@
       </p:sp>
       <p:sp>
         <p:nvSpPr>
-          <p:cNvPr id="4" name="Slide Number Placeholder 3">
+          <p:cNvPr id="2" name="Slide Number Placeholder 1">
             <a:extLst>
               <a:ext uri="{FF2B5EF4-FFF2-40B4-BE49-F238E27FC236}">
-                <a16:creationId xmlns:a16="http://schemas.microsoft.com/office/drawing/2014/main" id="{841C1259-B1D8-7F86-6EBE-1508951C6DFB}"/>
+                <a16:creationId xmlns:a16="http://schemas.microsoft.com/office/drawing/2014/main" id="{3A73C87A-A79D-E97D-9C3A-9F3D0F069FBB}"/>
               </a:ext>
             </a:extLst>
           </p:cNvPr>
@@ -6597,7 +6391,7 @@
             <a:spLocks noGrp="1"/>
           </p:cNvSpPr>
           <p:nvPr>
-            <p:ph type="sldNum" idx="12"/>
+            <p:ph type="sldNum" sz="quarter" idx="12"/>
           </p:nvPr>
         </p:nvSpPr>
         <p:spPr/>
@@ -6605,16 +6399,7 @@
           <a:bodyPr/>
           <a:lstStyle/>
           <a:p>
-            <a:pPr marL="0" lvl="0" indent="0" algn="l" rtl="0">
-              <a:spcBef>
-                <a:spcPts val="0"/>
-              </a:spcBef>
-              <a:spcAft>
-                <a:spcPts val="0"/>
-              </a:spcAft>
-              <a:buNone/>
-            </a:pPr>
-            <a:fld id="{00000000-1234-1234-1234-123412341234}" type="slidenum">
+            <a:fld id="{ABDA560F-461C-6043-9BC4-489BA92F7161}" type="slidenum">
               <a:rPr lang="en-US" smtClean="0"/>
               <a:t>14</a:t>
             </a:fld>
@@ -6624,10 +6409,10 @@
       </p:sp>
       <p:sp>
         <p:nvSpPr>
-          <p:cNvPr id="6" name="Date Placeholder 5">
+          <p:cNvPr id="7" name="Date Placeholder 6">
             <a:extLst>
               <a:ext uri="{FF2B5EF4-FFF2-40B4-BE49-F238E27FC236}">
-                <a16:creationId xmlns:a16="http://schemas.microsoft.com/office/drawing/2014/main" id="{1C13C323-07D2-1146-659A-370FE17715D0}"/>
+                <a16:creationId xmlns:a16="http://schemas.microsoft.com/office/drawing/2014/main" id="{7651EE19-B350-8921-976D-0C19C19DC494}"/>
               </a:ext>
             </a:extLst>
           </p:cNvPr>
@@ -6646,7 +6431,7 @@
             <a:pPr algn="ctr"/>
             <a:r>
               <a:rPr lang="en-US"/>
-              <a:t>8/12/2024</a:t>
+              <a:t>01/07/2025</a:t>
             </a:r>
           </a:p>
         </p:txBody>
@@ -6832,57 +6617,10 @@
       </p:sp>
       <p:sp>
         <p:nvSpPr>
-          <p:cNvPr id="126" name="Google Shape;126;p18"/>
-          <p:cNvSpPr txBox="1">
-            <a:spLocks noGrp="1"/>
-          </p:cNvSpPr>
-          <p:nvPr>
-            <p:ph type="sldNum" idx="12"/>
-          </p:nvPr>
-        </p:nvSpPr>
-        <p:spPr>
-          <a:xfrm>
-            <a:off x="8610600" y="6356350"/>
-            <a:ext cx="682800" cy="365100"/>
-          </a:xfrm>
-          <a:prstGeom prst="rect">
-            <a:avLst/>
-          </a:prstGeom>
-        </p:spPr>
-        <p:txBody>
-          <a:bodyPr spcFirstLastPara="1" wrap="square" lIns="91425" tIns="45700" rIns="91425" bIns="45700" anchor="ctr" anchorCtr="0">
-            <a:noAutofit/>
-          </a:bodyPr>
-          <a:lstStyle/>
-          <a:p>
-            <a:pPr marL="0" lvl="0" indent="0" algn="l" rtl="0">
-              <a:spcBef>
-                <a:spcPts val="0"/>
-              </a:spcBef>
-              <a:spcAft>
-                <a:spcPts val="0"/>
-              </a:spcAft>
-              <a:buClr>
-                <a:srgbClr val="000000"/>
-              </a:buClr>
-              <a:buSzPts val="1200"/>
-              <a:buFont typeface="Arial"/>
-              <a:buNone/>
-            </a:pPr>
-            <a:fld id="{00000000-1234-1234-1234-123412341234}" type="slidenum">
-              <a:rPr lang="en-US"/>
-              <a:t>15</a:t>
-            </a:fld>
-            <a:endParaRPr/>
-          </a:p>
-        </p:txBody>
-      </p:sp>
-      <p:sp>
-        <p:nvSpPr>
-          <p:cNvPr id="2" name="Date Placeholder 1">
+          <p:cNvPr id="3" name="Slide Number Placeholder 2">
             <a:extLst>
               <a:ext uri="{FF2B5EF4-FFF2-40B4-BE49-F238E27FC236}">
-                <a16:creationId xmlns:a16="http://schemas.microsoft.com/office/drawing/2014/main" id="{858E7FB9-56E3-217B-EB46-937C71F8B802}"/>
+                <a16:creationId xmlns:a16="http://schemas.microsoft.com/office/drawing/2014/main" id="{9B1277F7-6374-51B7-FA65-521A6F29E96C}"/>
               </a:ext>
             </a:extLst>
           </p:cNvPr>
@@ -6890,6 +6628,35 @@
             <a:spLocks noGrp="1"/>
           </p:cNvSpPr>
           <p:nvPr>
+            <p:ph type="sldNum" sz="quarter" idx="12"/>
+          </p:nvPr>
+        </p:nvSpPr>
+        <p:spPr/>
+        <p:txBody>
+          <a:bodyPr/>
+          <a:lstStyle/>
+          <a:p>
+            <a:fld id="{ABDA560F-461C-6043-9BC4-489BA92F7161}" type="slidenum">
+              <a:rPr lang="en-US" smtClean="0"/>
+              <a:t>15</a:t>
+            </a:fld>
+            <a:endParaRPr lang="en-US"/>
+          </a:p>
+        </p:txBody>
+      </p:sp>
+      <p:sp>
+        <p:nvSpPr>
+          <p:cNvPr id="4" name="Date Placeholder 3">
+            <a:extLst>
+              <a:ext uri="{FF2B5EF4-FFF2-40B4-BE49-F238E27FC236}">
+                <a16:creationId xmlns:a16="http://schemas.microsoft.com/office/drawing/2014/main" id="{75B54C41-153A-00AD-A742-A1DE94E7F7A9}"/>
+              </a:ext>
+            </a:extLst>
+          </p:cNvPr>
+          <p:cNvSpPr>
+            <a:spLocks noGrp="1"/>
+          </p:cNvSpPr>
+          <p:nvPr>
             <p:ph type="dt" sz="half" idx="10"/>
           </p:nvPr>
         </p:nvSpPr>
@@ -6901,7 +6668,7 @@
             <a:pPr algn="ctr"/>
             <a:r>
               <a:rPr lang="en-US"/>
-              <a:t>8/12/2024</a:t>
+              <a:t>01/07/2025</a:t>
             </a:r>
           </a:p>
         </p:txBody>
@@ -7471,10 +7238,10 @@
       </p:sp>
       <p:sp>
         <p:nvSpPr>
-          <p:cNvPr id="4" name="Slide Number Placeholder 3">
+          <p:cNvPr id="2" name="Slide Number Placeholder 1">
             <a:extLst>
               <a:ext uri="{FF2B5EF4-FFF2-40B4-BE49-F238E27FC236}">
-                <a16:creationId xmlns:a16="http://schemas.microsoft.com/office/drawing/2014/main" id="{841C1259-B1D8-7F86-6EBE-1508951C6DFB}"/>
+                <a16:creationId xmlns:a16="http://schemas.microsoft.com/office/drawing/2014/main" id="{6AC66DA0-4C89-E6A6-C988-D3E541132612}"/>
               </a:ext>
             </a:extLst>
           </p:cNvPr>
@@ -7482,7 +7249,7 @@
             <a:spLocks noGrp="1"/>
           </p:cNvSpPr>
           <p:nvPr>
-            <p:ph type="sldNum" idx="12"/>
+            <p:ph type="sldNum" sz="quarter" idx="12"/>
           </p:nvPr>
         </p:nvSpPr>
         <p:spPr/>
@@ -7490,16 +7257,7 @@
           <a:bodyPr/>
           <a:lstStyle/>
           <a:p>
-            <a:pPr marL="0" lvl="0" indent="0" algn="l" rtl="0">
-              <a:spcBef>
-                <a:spcPts val="0"/>
-              </a:spcBef>
-              <a:spcAft>
-                <a:spcPts val="0"/>
-              </a:spcAft>
-              <a:buNone/>
-            </a:pPr>
-            <a:fld id="{00000000-1234-1234-1234-123412341234}" type="slidenum">
+            <a:fld id="{ABDA560F-461C-6043-9BC4-489BA92F7161}" type="slidenum">
               <a:rPr lang="en-US" smtClean="0"/>
               <a:t>16</a:t>
             </a:fld>
@@ -7509,10 +7267,10 @@
       </p:sp>
       <p:sp>
         <p:nvSpPr>
-          <p:cNvPr id="6" name="Date Placeholder 5">
+          <p:cNvPr id="7" name="Date Placeholder 6">
             <a:extLst>
               <a:ext uri="{FF2B5EF4-FFF2-40B4-BE49-F238E27FC236}">
-                <a16:creationId xmlns:a16="http://schemas.microsoft.com/office/drawing/2014/main" id="{B98D85DE-88FF-8FBD-9A34-1089DE697FA9}"/>
+                <a16:creationId xmlns:a16="http://schemas.microsoft.com/office/drawing/2014/main" id="{518E1E62-8410-C8B8-0AA4-85F14F70C67D}"/>
               </a:ext>
             </a:extLst>
           </p:cNvPr>
@@ -7531,7 +7289,7 @@
             <a:pPr algn="ctr"/>
             <a:r>
               <a:rPr lang="en-US"/>
-              <a:t>8/12/2024</a:t>
+              <a:t>01/07/2025</a:t>
             </a:r>
           </a:p>
         </p:txBody>
@@ -7732,57 +7490,10 @@
       </p:sp>
       <p:sp>
         <p:nvSpPr>
-          <p:cNvPr id="126" name="Google Shape;126;p18"/>
-          <p:cNvSpPr txBox="1">
-            <a:spLocks noGrp="1"/>
-          </p:cNvSpPr>
-          <p:nvPr>
-            <p:ph type="sldNum" idx="12"/>
-          </p:nvPr>
-        </p:nvSpPr>
-        <p:spPr>
-          <a:xfrm>
-            <a:off x="8610600" y="6356350"/>
-            <a:ext cx="682800" cy="365100"/>
-          </a:xfrm>
-          <a:prstGeom prst="rect">
-            <a:avLst/>
-          </a:prstGeom>
-        </p:spPr>
-        <p:txBody>
-          <a:bodyPr spcFirstLastPara="1" wrap="square" lIns="91425" tIns="45700" rIns="91425" bIns="45700" anchor="ctr" anchorCtr="0">
-            <a:noAutofit/>
-          </a:bodyPr>
-          <a:lstStyle/>
-          <a:p>
-            <a:pPr marL="0" lvl="0" indent="0" algn="l" rtl="0">
-              <a:spcBef>
-                <a:spcPts val="0"/>
-              </a:spcBef>
-              <a:spcAft>
-                <a:spcPts val="0"/>
-              </a:spcAft>
-              <a:buClr>
-                <a:srgbClr val="000000"/>
-              </a:buClr>
-              <a:buSzPts val="1200"/>
-              <a:buFont typeface="Arial"/>
-              <a:buNone/>
-            </a:pPr>
-            <a:fld id="{00000000-1234-1234-1234-123412341234}" type="slidenum">
-              <a:rPr lang="en-US"/>
-              <a:t>17</a:t>
-            </a:fld>
-            <a:endParaRPr/>
-          </a:p>
-        </p:txBody>
-      </p:sp>
-      <p:sp>
-        <p:nvSpPr>
-          <p:cNvPr id="2" name="Date Placeholder 1">
+          <p:cNvPr id="3" name="Slide Number Placeholder 2">
             <a:extLst>
               <a:ext uri="{FF2B5EF4-FFF2-40B4-BE49-F238E27FC236}">
-                <a16:creationId xmlns:a16="http://schemas.microsoft.com/office/drawing/2014/main" id="{F6A0EDE9-0DA8-CAC9-C4DB-516C719410E5}"/>
+                <a16:creationId xmlns:a16="http://schemas.microsoft.com/office/drawing/2014/main" id="{97C8EBA4-B590-81E3-D896-36A325105226}"/>
               </a:ext>
             </a:extLst>
           </p:cNvPr>
@@ -7790,6 +7501,35 @@
             <a:spLocks noGrp="1"/>
           </p:cNvSpPr>
           <p:nvPr>
+            <p:ph type="sldNum" sz="quarter" idx="12"/>
+          </p:nvPr>
+        </p:nvSpPr>
+        <p:spPr/>
+        <p:txBody>
+          <a:bodyPr/>
+          <a:lstStyle/>
+          <a:p>
+            <a:fld id="{ABDA560F-461C-6043-9BC4-489BA92F7161}" type="slidenum">
+              <a:rPr lang="en-US" smtClean="0"/>
+              <a:t>17</a:t>
+            </a:fld>
+            <a:endParaRPr lang="en-US"/>
+          </a:p>
+        </p:txBody>
+      </p:sp>
+      <p:sp>
+        <p:nvSpPr>
+          <p:cNvPr id="4" name="Date Placeholder 3">
+            <a:extLst>
+              <a:ext uri="{FF2B5EF4-FFF2-40B4-BE49-F238E27FC236}">
+                <a16:creationId xmlns:a16="http://schemas.microsoft.com/office/drawing/2014/main" id="{BB9A858E-5CDC-EACE-237A-0B2B9CAF3E6A}"/>
+              </a:ext>
+            </a:extLst>
+          </p:cNvPr>
+          <p:cNvSpPr>
+            <a:spLocks noGrp="1"/>
+          </p:cNvSpPr>
+          <p:nvPr>
             <p:ph type="dt" sz="half" idx="10"/>
           </p:nvPr>
         </p:nvSpPr>
@@ -7801,7 +7541,7 @@
             <a:pPr algn="ctr"/>
             <a:r>
               <a:rPr lang="en-US"/>
-              <a:t>8/12/2024</a:t>
+              <a:t>01/07/2025</a:t>
             </a:r>
           </a:p>
         </p:txBody>
@@ -7966,57 +7706,10 @@
       </p:sp>
       <p:sp>
         <p:nvSpPr>
-          <p:cNvPr id="126" name="Google Shape;126;p18"/>
-          <p:cNvSpPr txBox="1">
-            <a:spLocks noGrp="1"/>
-          </p:cNvSpPr>
-          <p:nvPr>
-            <p:ph type="sldNum" idx="12"/>
-          </p:nvPr>
-        </p:nvSpPr>
-        <p:spPr>
-          <a:xfrm>
-            <a:off x="8610600" y="6356350"/>
-            <a:ext cx="682800" cy="365100"/>
-          </a:xfrm>
-          <a:prstGeom prst="rect">
-            <a:avLst/>
-          </a:prstGeom>
-        </p:spPr>
-        <p:txBody>
-          <a:bodyPr spcFirstLastPara="1" wrap="square" lIns="91425" tIns="45700" rIns="91425" bIns="45700" anchor="ctr" anchorCtr="0">
-            <a:noAutofit/>
-          </a:bodyPr>
-          <a:lstStyle/>
-          <a:p>
-            <a:pPr marL="0" lvl="0" indent="0" algn="l" rtl="0">
-              <a:spcBef>
-                <a:spcPts val="0"/>
-              </a:spcBef>
-              <a:spcAft>
-                <a:spcPts val="0"/>
-              </a:spcAft>
-              <a:buClr>
-                <a:srgbClr val="000000"/>
-              </a:buClr>
-              <a:buSzPts val="1200"/>
-              <a:buFont typeface="Arial"/>
-              <a:buNone/>
-            </a:pPr>
-            <a:fld id="{00000000-1234-1234-1234-123412341234}" type="slidenum">
-              <a:rPr lang="en-US"/>
-              <a:t>18</a:t>
-            </a:fld>
-            <a:endParaRPr/>
-          </a:p>
-        </p:txBody>
-      </p:sp>
-      <p:sp>
-        <p:nvSpPr>
-          <p:cNvPr id="2" name="Date Placeholder 1">
+          <p:cNvPr id="3" name="Slide Number Placeholder 2">
             <a:extLst>
               <a:ext uri="{FF2B5EF4-FFF2-40B4-BE49-F238E27FC236}">
-                <a16:creationId xmlns:a16="http://schemas.microsoft.com/office/drawing/2014/main" id="{1968AC8A-F62A-9933-1989-7D14D99E9269}"/>
+                <a16:creationId xmlns:a16="http://schemas.microsoft.com/office/drawing/2014/main" id="{CAEF4B64-5D6A-9E46-2206-E53A71505512}"/>
               </a:ext>
             </a:extLst>
           </p:cNvPr>
@@ -8024,6 +7717,35 @@
             <a:spLocks noGrp="1"/>
           </p:cNvSpPr>
           <p:nvPr>
+            <p:ph type="sldNum" sz="quarter" idx="12"/>
+          </p:nvPr>
+        </p:nvSpPr>
+        <p:spPr/>
+        <p:txBody>
+          <a:bodyPr/>
+          <a:lstStyle/>
+          <a:p>
+            <a:fld id="{ABDA560F-461C-6043-9BC4-489BA92F7161}" type="slidenum">
+              <a:rPr lang="en-US" smtClean="0"/>
+              <a:t>18</a:t>
+            </a:fld>
+            <a:endParaRPr lang="en-US"/>
+          </a:p>
+        </p:txBody>
+      </p:sp>
+      <p:sp>
+        <p:nvSpPr>
+          <p:cNvPr id="4" name="Date Placeholder 3">
+            <a:extLst>
+              <a:ext uri="{FF2B5EF4-FFF2-40B4-BE49-F238E27FC236}">
+                <a16:creationId xmlns:a16="http://schemas.microsoft.com/office/drawing/2014/main" id="{DF2B6FEB-33F6-5F90-EF5D-55C37A826F2D}"/>
+              </a:ext>
+            </a:extLst>
+          </p:cNvPr>
+          <p:cNvSpPr>
+            <a:spLocks noGrp="1"/>
+          </p:cNvSpPr>
+          <p:nvPr>
             <p:ph type="dt" sz="half" idx="10"/>
           </p:nvPr>
         </p:nvSpPr>
@@ -8035,7 +7757,7 @@
             <a:pPr algn="ctr"/>
             <a:r>
               <a:rPr lang="en-US"/>
-              <a:t>8/12/2024</a:t>
+              <a:t>01/07/2025</a:t>
             </a:r>
           </a:p>
         </p:txBody>
@@ -8217,57 +7939,10 @@
       </p:sp>
       <p:sp>
         <p:nvSpPr>
-          <p:cNvPr id="126" name="Google Shape;126;p18"/>
-          <p:cNvSpPr txBox="1">
-            <a:spLocks noGrp="1"/>
-          </p:cNvSpPr>
-          <p:nvPr>
-            <p:ph type="sldNum" idx="12"/>
-          </p:nvPr>
-        </p:nvSpPr>
-        <p:spPr>
-          <a:xfrm>
-            <a:off x="8610600" y="6356350"/>
-            <a:ext cx="682800" cy="365100"/>
-          </a:xfrm>
-          <a:prstGeom prst="rect">
-            <a:avLst/>
-          </a:prstGeom>
-        </p:spPr>
-        <p:txBody>
-          <a:bodyPr spcFirstLastPara="1" wrap="square" lIns="91425" tIns="45700" rIns="91425" bIns="45700" anchor="ctr" anchorCtr="0">
-            <a:noAutofit/>
-          </a:bodyPr>
-          <a:lstStyle/>
-          <a:p>
-            <a:pPr marL="0" lvl="0" indent="0" algn="l" rtl="0">
-              <a:spcBef>
-                <a:spcPts val="0"/>
-              </a:spcBef>
-              <a:spcAft>
-                <a:spcPts val="0"/>
-              </a:spcAft>
-              <a:buClr>
-                <a:srgbClr val="000000"/>
-              </a:buClr>
-              <a:buSzPts val="1200"/>
-              <a:buFont typeface="Arial"/>
-              <a:buNone/>
-            </a:pPr>
-            <a:fld id="{00000000-1234-1234-1234-123412341234}" type="slidenum">
-              <a:rPr lang="en-US"/>
-              <a:t>19</a:t>
-            </a:fld>
-            <a:endParaRPr/>
-          </a:p>
-        </p:txBody>
-      </p:sp>
-      <p:sp>
-        <p:nvSpPr>
-          <p:cNvPr id="2" name="Date Placeholder 1">
+          <p:cNvPr id="3" name="Slide Number Placeholder 2">
             <a:extLst>
               <a:ext uri="{FF2B5EF4-FFF2-40B4-BE49-F238E27FC236}">
-                <a16:creationId xmlns:a16="http://schemas.microsoft.com/office/drawing/2014/main" id="{CB00A736-F82A-97BE-0D08-237520EE6D43}"/>
+                <a16:creationId xmlns:a16="http://schemas.microsoft.com/office/drawing/2014/main" id="{466965DA-7F88-FF3D-8809-C30139945A6D}"/>
               </a:ext>
             </a:extLst>
           </p:cNvPr>
@@ -8275,6 +7950,35 @@
             <a:spLocks noGrp="1"/>
           </p:cNvSpPr>
           <p:nvPr>
+            <p:ph type="sldNum" sz="quarter" idx="12"/>
+          </p:nvPr>
+        </p:nvSpPr>
+        <p:spPr/>
+        <p:txBody>
+          <a:bodyPr/>
+          <a:lstStyle/>
+          <a:p>
+            <a:fld id="{ABDA560F-461C-6043-9BC4-489BA92F7161}" type="slidenum">
+              <a:rPr lang="en-US" smtClean="0"/>
+              <a:t>19</a:t>
+            </a:fld>
+            <a:endParaRPr lang="en-US"/>
+          </a:p>
+        </p:txBody>
+      </p:sp>
+      <p:sp>
+        <p:nvSpPr>
+          <p:cNvPr id="4" name="Date Placeholder 3">
+            <a:extLst>
+              <a:ext uri="{FF2B5EF4-FFF2-40B4-BE49-F238E27FC236}">
+                <a16:creationId xmlns:a16="http://schemas.microsoft.com/office/drawing/2014/main" id="{8F364EA2-6839-ADB2-F3FD-23E7EEAF1019}"/>
+              </a:ext>
+            </a:extLst>
+          </p:cNvPr>
+          <p:cNvSpPr>
+            <a:spLocks noGrp="1"/>
+          </p:cNvSpPr>
+          <p:nvPr>
             <p:ph type="dt" sz="half" idx="10"/>
           </p:nvPr>
         </p:nvSpPr>
@@ -8286,7 +7990,7 @@
             <a:pPr algn="ctr"/>
             <a:r>
               <a:rPr lang="en-US"/>
-              <a:t>8/12/2024</a:t>
+              <a:t>01/07/2025</a:t>
             </a:r>
           </a:p>
         </p:txBody>
@@ -8468,57 +8172,10 @@
       </p:sp>
       <p:sp>
         <p:nvSpPr>
-          <p:cNvPr id="126" name="Google Shape;126;p18"/>
-          <p:cNvSpPr txBox="1">
-            <a:spLocks noGrp="1"/>
-          </p:cNvSpPr>
-          <p:nvPr>
-            <p:ph type="sldNum" idx="12"/>
-          </p:nvPr>
-        </p:nvSpPr>
-        <p:spPr>
-          <a:xfrm>
-            <a:off x="8610600" y="6356350"/>
-            <a:ext cx="682800" cy="365100"/>
-          </a:xfrm>
-          <a:prstGeom prst="rect">
-            <a:avLst/>
-          </a:prstGeom>
-        </p:spPr>
-        <p:txBody>
-          <a:bodyPr spcFirstLastPara="1" wrap="square" lIns="91425" tIns="45700" rIns="91425" bIns="45700" anchor="ctr" anchorCtr="0">
-            <a:noAutofit/>
-          </a:bodyPr>
-          <a:lstStyle/>
-          <a:p>
-            <a:pPr marL="0" lvl="0" indent="0" algn="l" rtl="0">
-              <a:spcBef>
-                <a:spcPts val="0"/>
-              </a:spcBef>
-              <a:spcAft>
-                <a:spcPts val="0"/>
-              </a:spcAft>
-              <a:buClr>
-                <a:srgbClr val="000000"/>
-              </a:buClr>
-              <a:buSzPts val="1200"/>
-              <a:buFont typeface="Arial"/>
-              <a:buNone/>
-            </a:pPr>
-            <a:fld id="{00000000-1234-1234-1234-123412341234}" type="slidenum">
-              <a:rPr lang="en-US"/>
-              <a:t>2</a:t>
-            </a:fld>
-            <a:endParaRPr dirty="0"/>
-          </a:p>
-        </p:txBody>
-      </p:sp>
-      <p:sp>
-        <p:nvSpPr>
-          <p:cNvPr id="2" name="Date Placeholder 1">
+          <p:cNvPr id="3" name="Slide Number Placeholder 2">
             <a:extLst>
               <a:ext uri="{FF2B5EF4-FFF2-40B4-BE49-F238E27FC236}">
-                <a16:creationId xmlns:a16="http://schemas.microsoft.com/office/drawing/2014/main" id="{318FF01A-1ABF-81D9-B1D1-123FF2A42EAC}"/>
+                <a16:creationId xmlns:a16="http://schemas.microsoft.com/office/drawing/2014/main" id="{9E215B52-D3D2-D070-3C59-2AA229AB7D61}"/>
               </a:ext>
             </a:extLst>
           </p:cNvPr>
@@ -8526,6 +8183,35 @@
             <a:spLocks noGrp="1"/>
           </p:cNvSpPr>
           <p:nvPr>
+            <p:ph type="sldNum" sz="quarter" idx="12"/>
+          </p:nvPr>
+        </p:nvSpPr>
+        <p:spPr/>
+        <p:txBody>
+          <a:bodyPr/>
+          <a:lstStyle/>
+          <a:p>
+            <a:fld id="{ABDA560F-461C-6043-9BC4-489BA92F7161}" type="slidenum">
+              <a:rPr lang="en-US" smtClean="0"/>
+              <a:t>2</a:t>
+            </a:fld>
+            <a:endParaRPr lang="en-US"/>
+          </a:p>
+        </p:txBody>
+      </p:sp>
+      <p:sp>
+        <p:nvSpPr>
+          <p:cNvPr id="4" name="Date Placeholder 3">
+            <a:extLst>
+              <a:ext uri="{FF2B5EF4-FFF2-40B4-BE49-F238E27FC236}">
+                <a16:creationId xmlns:a16="http://schemas.microsoft.com/office/drawing/2014/main" id="{7F190669-C907-75B6-990B-54187C7E9856}"/>
+              </a:ext>
+            </a:extLst>
+          </p:cNvPr>
+          <p:cNvSpPr>
+            <a:spLocks noGrp="1"/>
+          </p:cNvSpPr>
+          <p:nvPr>
             <p:ph type="dt" sz="half" idx="10"/>
           </p:nvPr>
         </p:nvSpPr>
@@ -8537,9 +8223,8 @@
             <a:pPr algn="ctr"/>
             <a:r>
               <a:rPr lang="en-US"/>
-              <a:t>8/12/2024</a:t>
-            </a:r>
-            <a:endParaRPr lang="en-US" dirty="0"/>
+              <a:t>01/07/2025</a:t>
+            </a:r>
           </a:p>
         </p:txBody>
       </p:sp>
@@ -8612,57 +8297,10 @@
       </p:sp>
       <p:sp>
         <p:nvSpPr>
-          <p:cNvPr id="126" name="Google Shape;126;p18"/>
-          <p:cNvSpPr txBox="1">
-            <a:spLocks noGrp="1"/>
-          </p:cNvSpPr>
-          <p:nvPr>
-            <p:ph type="sldNum" idx="12"/>
-          </p:nvPr>
-        </p:nvSpPr>
-        <p:spPr>
-          <a:xfrm>
-            <a:off x="8610600" y="6356350"/>
-            <a:ext cx="682800" cy="365100"/>
-          </a:xfrm>
-          <a:prstGeom prst="rect">
-            <a:avLst/>
-          </a:prstGeom>
-        </p:spPr>
-        <p:txBody>
-          <a:bodyPr spcFirstLastPara="1" wrap="square" lIns="91425" tIns="45700" rIns="91425" bIns="45700" anchor="ctr" anchorCtr="0">
-            <a:noAutofit/>
-          </a:bodyPr>
-          <a:lstStyle/>
-          <a:p>
-            <a:pPr marL="0" lvl="0" indent="0" algn="l" rtl="0">
-              <a:spcBef>
-                <a:spcPts val="0"/>
-              </a:spcBef>
-              <a:spcAft>
-                <a:spcPts val="0"/>
-              </a:spcAft>
-              <a:buClr>
-                <a:srgbClr val="000000"/>
-              </a:buClr>
-              <a:buSzPts val="1200"/>
-              <a:buFont typeface="Arial"/>
-              <a:buNone/>
-            </a:pPr>
-            <a:fld id="{00000000-1234-1234-1234-123412341234}" type="slidenum">
-              <a:rPr lang="en-US"/>
-              <a:t>20</a:t>
-            </a:fld>
-            <a:endParaRPr/>
-          </a:p>
-        </p:txBody>
-      </p:sp>
-      <p:sp>
-        <p:nvSpPr>
-          <p:cNvPr id="2" name="Date Placeholder 1">
+          <p:cNvPr id="3" name="Slide Number Placeholder 2">
             <a:extLst>
               <a:ext uri="{FF2B5EF4-FFF2-40B4-BE49-F238E27FC236}">
-                <a16:creationId xmlns:a16="http://schemas.microsoft.com/office/drawing/2014/main" id="{38DE24F2-F81D-93D1-6369-A22C7B19B36F}"/>
+                <a16:creationId xmlns:a16="http://schemas.microsoft.com/office/drawing/2014/main" id="{2B52D83D-E866-2B12-7C3F-A1E49F6A1A5E}"/>
               </a:ext>
             </a:extLst>
           </p:cNvPr>
@@ -8670,6 +8308,35 @@
             <a:spLocks noGrp="1"/>
           </p:cNvSpPr>
           <p:nvPr>
+            <p:ph type="sldNum" sz="quarter" idx="12"/>
+          </p:nvPr>
+        </p:nvSpPr>
+        <p:spPr/>
+        <p:txBody>
+          <a:bodyPr/>
+          <a:lstStyle/>
+          <a:p>
+            <a:fld id="{ABDA560F-461C-6043-9BC4-489BA92F7161}" type="slidenum">
+              <a:rPr lang="en-US" smtClean="0"/>
+              <a:t>20</a:t>
+            </a:fld>
+            <a:endParaRPr lang="en-US"/>
+          </a:p>
+        </p:txBody>
+      </p:sp>
+      <p:sp>
+        <p:nvSpPr>
+          <p:cNvPr id="4" name="Date Placeholder 3">
+            <a:extLst>
+              <a:ext uri="{FF2B5EF4-FFF2-40B4-BE49-F238E27FC236}">
+                <a16:creationId xmlns:a16="http://schemas.microsoft.com/office/drawing/2014/main" id="{E3524239-3A4B-5D8F-F9C7-A709FD64DC5A}"/>
+              </a:ext>
+            </a:extLst>
+          </p:cNvPr>
+          <p:cNvSpPr>
+            <a:spLocks noGrp="1"/>
+          </p:cNvSpPr>
+          <p:nvPr>
             <p:ph type="dt" sz="half" idx="10"/>
           </p:nvPr>
         </p:nvSpPr>
@@ -8681,7 +8348,7 @@
             <a:pPr algn="ctr"/>
             <a:r>
               <a:rPr lang="en-US"/>
-              <a:t>8/12/2024</a:t>
+              <a:t>01/07/2025</a:t>
             </a:r>
           </a:p>
         </p:txBody>
@@ -8692,326 +8359,6 @@
         <p14:creationId xmlns:p14="http://schemas.microsoft.com/office/powerpoint/2010/main" val="1675476773"/>
       </p:ext>
     </p:extLst>
-  </p:cSld>
-  <p:clrMapOvr>
-    <a:masterClrMapping/>
-  </p:clrMapOvr>
-</p:sld>
-</file>
-
-<file path=ppt/slides/slide21.xml><?xml version="1.0" encoding="utf-8"?>
-<p:sld xmlns:a="http://schemas.openxmlformats.org/drawingml/2006/main" xmlns:r="http://schemas.openxmlformats.org/officeDocument/2006/relationships" xmlns:p="http://schemas.openxmlformats.org/presentationml/2006/main">
-  <p:cSld>
-    <p:spTree>
-      <p:nvGrpSpPr>
-        <p:cNvPr id="1" name="Shape 912"/>
-        <p:cNvGrpSpPr/>
-        <p:nvPr/>
-      </p:nvGrpSpPr>
-      <p:grpSpPr>
-        <a:xfrm>
-          <a:off x="0" y="0"/>
-          <a:ext cx="0" cy="0"/>
-          <a:chOff x="0" y="0"/>
-          <a:chExt cx="0" cy="0"/>
-        </a:xfrm>
-      </p:grpSpPr>
-      <p:sp>
-        <p:nvSpPr>
-          <p:cNvPr id="913" name="Google Shape;913;p78"/>
-          <p:cNvSpPr txBox="1">
-            <a:spLocks noGrp="1"/>
-          </p:cNvSpPr>
-          <p:nvPr>
-            <p:ph type="title"/>
-          </p:nvPr>
-        </p:nvSpPr>
-        <p:spPr>
-          <a:xfrm>
-            <a:off x="838200" y="365125"/>
-            <a:ext cx="10515600" cy="1325700"/>
-          </a:xfrm>
-          <a:prstGeom prst="rect">
-            <a:avLst/>
-          </a:prstGeom>
-        </p:spPr>
-        <p:txBody>
-          <a:bodyPr spcFirstLastPara="1" wrap="square" lIns="91425" tIns="45700" rIns="91425" bIns="45700" anchor="ctr" anchorCtr="0">
-            <a:normAutofit/>
-          </a:bodyPr>
-          <a:lstStyle/>
-          <a:p>
-            <a:pPr marL="0" lvl="0" indent="0" algn="l" rtl="0">
-              <a:spcBef>
-                <a:spcPts val="0"/>
-              </a:spcBef>
-              <a:spcAft>
-                <a:spcPts val="0"/>
-              </a:spcAft>
-              <a:buNone/>
-            </a:pPr>
-            <a:r>
-              <a:rPr lang="en-US" sz="4800" b="1"/>
-              <a:t>Thank you! </a:t>
-            </a:r>
-            <a:endParaRPr sz="4800" b="1"/>
-          </a:p>
-        </p:txBody>
-      </p:sp>
-      <p:sp>
-        <p:nvSpPr>
-          <p:cNvPr id="2" name="Google Shape;913;p78">
-            <a:extLst>
-              <a:ext uri="{FF2B5EF4-FFF2-40B4-BE49-F238E27FC236}">
-                <a16:creationId xmlns:a16="http://schemas.microsoft.com/office/drawing/2014/main" id="{6598FD10-7D38-4EBF-DFFC-AF789EAB271B}"/>
-              </a:ext>
-            </a:extLst>
-          </p:cNvPr>
-          <p:cNvSpPr txBox="1">
-            <a:spLocks/>
-          </p:cNvSpPr>
-          <p:nvPr/>
-        </p:nvSpPr>
-        <p:spPr>
-          <a:xfrm>
-            <a:off x="753093" y="2150994"/>
-            <a:ext cx="10515600" cy="1325700"/>
-          </a:xfrm>
-          <a:prstGeom prst="rect">
-            <a:avLst/>
-          </a:prstGeom>
-        </p:spPr>
-        <p:txBody>
-          <a:bodyPr spcFirstLastPara="1" vert="horz" wrap="square" lIns="91425" tIns="45700" rIns="91425" bIns="45700" rtlCol="0" anchor="ctr" anchorCtr="0">
-            <a:normAutofit/>
-          </a:bodyPr>
-          <a:lstStyle>
-            <a:lvl1pPr algn="l" defTabSz="914400" rtl="0" eaLnBrk="1" latinLnBrk="0" hangingPunct="1">
-              <a:lnSpc>
-                <a:spcPct val="90000"/>
-              </a:lnSpc>
-              <a:spcBef>
-                <a:spcPct val="0"/>
-              </a:spcBef>
-              <a:buNone/>
-              <a:defRPr sz="4400" kern="1200">
-                <a:solidFill>
-                  <a:schemeClr val="tx1"/>
-                </a:solidFill>
-                <a:latin typeface="+mj-lt"/>
-                <a:ea typeface="+mj-ea"/>
-                <a:cs typeface="+mj-cs"/>
-              </a:defRPr>
-            </a:lvl1pPr>
-          </a:lstStyle>
-          <a:p>
-            <a:pPr>
-              <a:spcBef>
-                <a:spcPts val="0"/>
-              </a:spcBef>
-            </a:pPr>
-            <a:r>
-              <a:rPr lang="en-US"/>
-              <a:t>Survey and feedback</a:t>
-            </a:r>
-          </a:p>
-        </p:txBody>
-      </p:sp>
-      <p:sp>
-        <p:nvSpPr>
-          <p:cNvPr id="914" name="Google Shape;914;p78"/>
-          <p:cNvSpPr txBox="1">
-            <a:spLocks noGrp="1"/>
-          </p:cNvSpPr>
-          <p:nvPr>
-            <p:ph type="body" idx="1"/>
-          </p:nvPr>
-        </p:nvSpPr>
-        <p:spPr>
-          <a:xfrm>
-            <a:off x="838200" y="1825625"/>
-            <a:ext cx="10515600" cy="4163100"/>
-          </a:xfrm>
-          <a:prstGeom prst="rect">
-            <a:avLst/>
-          </a:prstGeom>
-        </p:spPr>
-        <p:txBody>
-          <a:bodyPr spcFirstLastPara="1" wrap="square" lIns="91425" tIns="45700" rIns="91425" bIns="45700" anchor="t" anchorCtr="0">
-            <a:normAutofit/>
-          </a:bodyPr>
-          <a:lstStyle/>
-          <a:p>
-            <a:pPr marL="177800" lvl="0" indent="0" algn="l" rtl="0">
-              <a:lnSpc>
-                <a:spcPct val="200000"/>
-              </a:lnSpc>
-              <a:spcBef>
-                <a:spcPts val="800"/>
-              </a:spcBef>
-              <a:spcAft>
-                <a:spcPts val="0"/>
-              </a:spcAft>
-              <a:buClr>
-                <a:schemeClr val="dk1"/>
-              </a:buClr>
-              <a:buSzPts val="1100"/>
-              <a:buFont typeface="Arial"/>
-              <a:buNone/>
-            </a:pPr>
-            <a:endParaRPr sz="2600"/>
-          </a:p>
-          <a:p>
-            <a:pPr marL="0" lvl="0" indent="0" algn="l" rtl="0">
-              <a:lnSpc>
-                <a:spcPct val="200000"/>
-              </a:lnSpc>
-              <a:spcBef>
-                <a:spcPts val="800"/>
-              </a:spcBef>
-              <a:spcAft>
-                <a:spcPts val="0"/>
-              </a:spcAft>
-              <a:buClr>
-                <a:schemeClr val="dk1"/>
-              </a:buClr>
-              <a:buSzPts val="1100"/>
-              <a:buFont typeface="Arial"/>
-              <a:buNone/>
-            </a:pPr>
-            <a:r>
-              <a:rPr lang="en-US" sz="3000" u="sng">
-                <a:solidFill>
-                  <a:schemeClr val="hlink"/>
-                </a:solidFill>
-                <a:hlinkClick r:id="rId3"/>
-              </a:rPr>
-              <a:t>http://tinyurl.com/curc-survey18</a:t>
-            </a:r>
-            <a:endParaRPr sz="3000"/>
-          </a:p>
-          <a:p>
-            <a:pPr marL="0" lvl="0" indent="0" algn="l" rtl="0">
-              <a:spcBef>
-                <a:spcPts val="1000"/>
-              </a:spcBef>
-              <a:spcAft>
-                <a:spcPts val="0"/>
-              </a:spcAft>
-              <a:buNone/>
-            </a:pPr>
-            <a:endParaRPr sz="3300"/>
-          </a:p>
-        </p:txBody>
-      </p:sp>
-      <p:pic>
-        <p:nvPicPr>
-          <p:cNvPr id="3" name="Picture 2" descr="QR code for course survey and feedback">
-            <a:extLst>
-              <a:ext uri="{FF2B5EF4-FFF2-40B4-BE49-F238E27FC236}">
-                <a16:creationId xmlns:a16="http://schemas.microsoft.com/office/drawing/2014/main" id="{FB3B42ED-3AFD-2CAE-AC47-A546D553AC65}"/>
-              </a:ext>
-            </a:extLst>
-          </p:cNvPr>
-          <p:cNvPicPr>
-            <a:picLocks noChangeAspect="1"/>
-          </p:cNvPicPr>
-          <p:nvPr/>
-        </p:nvPicPr>
-        <p:blipFill>
-          <a:blip r:embed="rId4"/>
-          <a:stretch>
-            <a:fillRect/>
-          </a:stretch>
-        </p:blipFill>
-        <p:spPr>
-          <a:xfrm>
-            <a:off x="6907300" y="1690825"/>
-            <a:ext cx="4089400" cy="4051300"/>
-          </a:xfrm>
-          <a:prstGeom prst="rect">
-            <a:avLst/>
-          </a:prstGeom>
-        </p:spPr>
-      </p:pic>
-      <p:sp>
-        <p:nvSpPr>
-          <p:cNvPr id="915" name="Google Shape;915;p78"/>
-          <p:cNvSpPr txBox="1">
-            <a:spLocks noGrp="1"/>
-          </p:cNvSpPr>
-          <p:nvPr>
-            <p:ph type="sldNum" idx="12"/>
-          </p:nvPr>
-        </p:nvSpPr>
-        <p:spPr>
-          <a:xfrm>
-            <a:off x="8610600" y="6356350"/>
-            <a:ext cx="682800" cy="365100"/>
-          </a:xfrm>
-          <a:prstGeom prst="rect">
-            <a:avLst/>
-          </a:prstGeom>
-        </p:spPr>
-        <p:txBody>
-          <a:bodyPr spcFirstLastPara="1" wrap="square" lIns="91425" tIns="45700" rIns="91425" bIns="45700" anchor="ctr" anchorCtr="0">
-            <a:noAutofit/>
-          </a:bodyPr>
-          <a:lstStyle/>
-          <a:p>
-            <a:pPr marL="0" lvl="0" indent="0" algn="l" rtl="0">
-              <a:spcBef>
-                <a:spcPts val="0"/>
-              </a:spcBef>
-              <a:spcAft>
-                <a:spcPts val="0"/>
-              </a:spcAft>
-              <a:buClr>
-                <a:srgbClr val="000000"/>
-              </a:buClr>
-              <a:buSzPts val="1200"/>
-              <a:buFont typeface="Arial"/>
-              <a:buNone/>
-            </a:pPr>
-            <a:fld id="{00000000-1234-1234-1234-123412341234}" type="slidenum">
-              <a:rPr lang="en-US"/>
-              <a:t>21</a:t>
-            </a:fld>
-            <a:endParaRPr/>
-          </a:p>
-        </p:txBody>
-      </p:sp>
-      <p:sp>
-        <p:nvSpPr>
-          <p:cNvPr id="4" name="Date Placeholder 3">
-            <a:extLst>
-              <a:ext uri="{FF2B5EF4-FFF2-40B4-BE49-F238E27FC236}">
-                <a16:creationId xmlns:a16="http://schemas.microsoft.com/office/drawing/2014/main" id="{772815EA-2915-4E51-F36A-8658A77A19B3}"/>
-              </a:ext>
-            </a:extLst>
-          </p:cNvPr>
-          <p:cNvSpPr>
-            <a:spLocks noGrp="1"/>
-          </p:cNvSpPr>
-          <p:nvPr>
-            <p:ph type="dt" sz="half" idx="10"/>
-          </p:nvPr>
-        </p:nvSpPr>
-        <p:spPr/>
-        <p:txBody>
-          <a:bodyPr/>
-          <a:lstStyle/>
-          <a:p>
-            <a:pPr algn="ctr"/>
-            <a:r>
-              <a:rPr lang="en-US"/>
-              <a:t>8/12/2024</a:t>
-            </a:r>
-            <a:endParaRPr lang="en-US" dirty="0"/>
-          </a:p>
-        </p:txBody>
-      </p:sp>
-    </p:spTree>
   </p:cSld>
   <p:clrMapOvr>
     <a:masterClrMapping/>
@@ -9276,57 +8623,10 @@
       </p:sp>
       <p:sp>
         <p:nvSpPr>
-          <p:cNvPr id="134" name="Google Shape;134;p19"/>
-          <p:cNvSpPr txBox="1">
-            <a:spLocks noGrp="1"/>
-          </p:cNvSpPr>
-          <p:nvPr>
-            <p:ph type="sldNum" idx="12"/>
-          </p:nvPr>
-        </p:nvSpPr>
-        <p:spPr>
-          <a:xfrm>
-            <a:off x="8610600" y="6356350"/>
-            <a:ext cx="682800" cy="365100"/>
-          </a:xfrm>
-          <a:prstGeom prst="rect">
-            <a:avLst/>
-          </a:prstGeom>
-        </p:spPr>
-        <p:txBody>
-          <a:bodyPr spcFirstLastPara="1" wrap="square" lIns="91425" tIns="45700" rIns="91425" bIns="45700" anchor="ctr" anchorCtr="0">
-            <a:noAutofit/>
-          </a:bodyPr>
-          <a:lstStyle/>
-          <a:p>
-            <a:pPr marL="0" lvl="0" indent="0" algn="l" rtl="0">
-              <a:spcBef>
-                <a:spcPts val="0"/>
-              </a:spcBef>
-              <a:spcAft>
-                <a:spcPts val="0"/>
-              </a:spcAft>
-              <a:buClr>
-                <a:srgbClr val="000000"/>
-              </a:buClr>
-              <a:buSzPts val="1200"/>
-              <a:buFont typeface="Arial"/>
-              <a:buNone/>
-            </a:pPr>
-            <a:fld id="{00000000-1234-1234-1234-123412341234}" type="slidenum">
-              <a:rPr lang="en-US"/>
-              <a:t>3</a:t>
-            </a:fld>
-            <a:endParaRPr dirty="0"/>
-          </a:p>
-        </p:txBody>
-      </p:sp>
-      <p:sp>
-        <p:nvSpPr>
-          <p:cNvPr id="2" name="Date Placeholder 1">
+          <p:cNvPr id="3" name="Slide Number Placeholder 2">
             <a:extLst>
               <a:ext uri="{FF2B5EF4-FFF2-40B4-BE49-F238E27FC236}">
-                <a16:creationId xmlns:a16="http://schemas.microsoft.com/office/drawing/2014/main" id="{BFFD6D1F-0D9B-BD72-310C-E656CB20818A}"/>
+                <a16:creationId xmlns:a16="http://schemas.microsoft.com/office/drawing/2014/main" id="{0672A9F2-A4F2-599C-E8BE-BF4CF978AB07}"/>
               </a:ext>
             </a:extLst>
           </p:cNvPr>
@@ -9334,6 +8634,35 @@
             <a:spLocks noGrp="1"/>
           </p:cNvSpPr>
           <p:nvPr>
+            <p:ph type="sldNum" sz="quarter" idx="12"/>
+          </p:nvPr>
+        </p:nvSpPr>
+        <p:spPr/>
+        <p:txBody>
+          <a:bodyPr/>
+          <a:lstStyle/>
+          <a:p>
+            <a:fld id="{ABDA560F-461C-6043-9BC4-489BA92F7161}" type="slidenum">
+              <a:rPr lang="en-US" smtClean="0"/>
+              <a:t>3</a:t>
+            </a:fld>
+            <a:endParaRPr lang="en-US"/>
+          </a:p>
+        </p:txBody>
+      </p:sp>
+      <p:sp>
+        <p:nvSpPr>
+          <p:cNvPr id="4" name="Date Placeholder 3">
+            <a:extLst>
+              <a:ext uri="{FF2B5EF4-FFF2-40B4-BE49-F238E27FC236}">
+                <a16:creationId xmlns:a16="http://schemas.microsoft.com/office/drawing/2014/main" id="{8F83EC8B-CFF7-429D-5CD4-7D6CAFC3B9F4}"/>
+              </a:ext>
+            </a:extLst>
+          </p:cNvPr>
+          <p:cNvSpPr>
+            <a:spLocks noGrp="1"/>
+          </p:cNvSpPr>
+          <p:nvPr>
             <p:ph type="dt" sz="half" idx="10"/>
           </p:nvPr>
         </p:nvSpPr>
@@ -9344,8 +8673,8 @@
           <a:p>
             <a:pPr algn="ctr"/>
             <a:r>
-              <a:rPr lang="en-US" dirty="0"/>
-              <a:t>8/12/2024</a:t>
+              <a:rPr lang="en-US"/>
+              <a:t>01/07/2025</a:t>
             </a:r>
           </a:p>
         </p:txBody>
@@ -9650,57 +8979,10 @@
       </p:sp>
       <p:sp>
         <p:nvSpPr>
-          <p:cNvPr id="900" name="Google Shape;900;p76"/>
-          <p:cNvSpPr txBox="1">
-            <a:spLocks noGrp="1"/>
-          </p:cNvSpPr>
-          <p:nvPr>
-            <p:ph type="sldNum" idx="12"/>
-          </p:nvPr>
-        </p:nvSpPr>
-        <p:spPr>
-          <a:xfrm>
-            <a:off x="8610600" y="6356350"/>
-            <a:ext cx="682800" cy="365100"/>
-          </a:xfrm>
-          <a:prstGeom prst="rect">
-            <a:avLst/>
-          </a:prstGeom>
-        </p:spPr>
-        <p:txBody>
-          <a:bodyPr spcFirstLastPara="1" wrap="square" lIns="91425" tIns="45700" rIns="91425" bIns="45700" anchor="ctr" anchorCtr="0">
-            <a:noAutofit/>
-          </a:bodyPr>
-          <a:lstStyle/>
-          <a:p>
-            <a:pPr marL="0" lvl="0" indent="0" algn="l" rtl="0">
-              <a:spcBef>
-                <a:spcPts val="0"/>
-              </a:spcBef>
-              <a:spcAft>
-                <a:spcPts val="0"/>
-              </a:spcAft>
-              <a:buClr>
-                <a:srgbClr val="000000"/>
-              </a:buClr>
-              <a:buSzPts val="1200"/>
-              <a:buFont typeface="Arial"/>
-              <a:buNone/>
-            </a:pPr>
-            <a:fld id="{00000000-1234-1234-1234-123412341234}" type="slidenum">
-              <a:rPr lang="en-US"/>
-              <a:t>4</a:t>
-            </a:fld>
-            <a:endParaRPr/>
-          </a:p>
-        </p:txBody>
-      </p:sp>
-      <p:sp>
-        <p:nvSpPr>
-          <p:cNvPr id="2" name="Date Placeholder 1">
+          <p:cNvPr id="3" name="Slide Number Placeholder 2">
             <a:extLst>
               <a:ext uri="{FF2B5EF4-FFF2-40B4-BE49-F238E27FC236}">
-                <a16:creationId xmlns:a16="http://schemas.microsoft.com/office/drawing/2014/main" id="{9C1037CF-2E0D-1E56-EF48-6D8A6FDAB5A2}"/>
+                <a16:creationId xmlns:a16="http://schemas.microsoft.com/office/drawing/2014/main" id="{686F5494-F97D-1DD7-9F9C-4C2D515CD663}"/>
               </a:ext>
             </a:extLst>
           </p:cNvPr>
@@ -9708,6 +8990,35 @@
             <a:spLocks noGrp="1"/>
           </p:cNvSpPr>
           <p:nvPr>
+            <p:ph type="sldNum" sz="quarter" idx="12"/>
+          </p:nvPr>
+        </p:nvSpPr>
+        <p:spPr/>
+        <p:txBody>
+          <a:bodyPr/>
+          <a:lstStyle/>
+          <a:p>
+            <a:fld id="{ABDA560F-461C-6043-9BC4-489BA92F7161}" type="slidenum">
+              <a:rPr lang="en-US" smtClean="0"/>
+              <a:t>4</a:t>
+            </a:fld>
+            <a:endParaRPr lang="en-US"/>
+          </a:p>
+        </p:txBody>
+      </p:sp>
+      <p:sp>
+        <p:nvSpPr>
+          <p:cNvPr id="4" name="Date Placeholder 3">
+            <a:extLst>
+              <a:ext uri="{FF2B5EF4-FFF2-40B4-BE49-F238E27FC236}">
+                <a16:creationId xmlns:a16="http://schemas.microsoft.com/office/drawing/2014/main" id="{DFB11BAE-6DA3-34AA-531C-89111B324895}"/>
+              </a:ext>
+            </a:extLst>
+          </p:cNvPr>
+          <p:cNvSpPr>
+            <a:spLocks noGrp="1"/>
+          </p:cNvSpPr>
+          <p:nvPr>
             <p:ph type="dt" sz="half" idx="10"/>
           </p:nvPr>
         </p:nvSpPr>
@@ -9719,7 +9030,7 @@
             <a:pPr algn="ctr"/>
             <a:r>
               <a:rPr lang="en-US"/>
-              <a:t>8/12/2024</a:t>
+              <a:t>01/07/2025</a:t>
             </a:r>
           </a:p>
         </p:txBody>
@@ -10096,57 +9407,10 @@
       </p:sp>
       <p:sp>
         <p:nvSpPr>
-          <p:cNvPr id="900" name="Google Shape;900;p76"/>
-          <p:cNvSpPr txBox="1">
-            <a:spLocks noGrp="1"/>
-          </p:cNvSpPr>
-          <p:nvPr>
-            <p:ph type="sldNum" idx="12"/>
-          </p:nvPr>
-        </p:nvSpPr>
-        <p:spPr>
-          <a:xfrm>
-            <a:off x="8610600" y="6356350"/>
-            <a:ext cx="682800" cy="365100"/>
-          </a:xfrm>
-          <a:prstGeom prst="rect">
-            <a:avLst/>
-          </a:prstGeom>
-        </p:spPr>
-        <p:txBody>
-          <a:bodyPr spcFirstLastPara="1" wrap="square" lIns="91425" tIns="45700" rIns="91425" bIns="45700" anchor="ctr" anchorCtr="0">
-            <a:noAutofit/>
-          </a:bodyPr>
-          <a:lstStyle/>
-          <a:p>
-            <a:pPr marL="0" lvl="0" indent="0" algn="l" rtl="0">
-              <a:spcBef>
-                <a:spcPts val="0"/>
-              </a:spcBef>
-              <a:spcAft>
-                <a:spcPts val="0"/>
-              </a:spcAft>
-              <a:buClr>
-                <a:srgbClr val="000000"/>
-              </a:buClr>
-              <a:buSzPts val="1200"/>
-              <a:buFont typeface="Arial"/>
-              <a:buNone/>
-            </a:pPr>
-            <a:fld id="{00000000-1234-1234-1234-123412341234}" type="slidenum">
-              <a:rPr lang="en-US"/>
-              <a:t>5</a:t>
-            </a:fld>
-            <a:endParaRPr/>
-          </a:p>
-        </p:txBody>
-      </p:sp>
-      <p:sp>
-        <p:nvSpPr>
-          <p:cNvPr id="2" name="Date Placeholder 1">
+          <p:cNvPr id="3" name="Slide Number Placeholder 2">
             <a:extLst>
               <a:ext uri="{FF2B5EF4-FFF2-40B4-BE49-F238E27FC236}">
-                <a16:creationId xmlns:a16="http://schemas.microsoft.com/office/drawing/2014/main" id="{383635CB-F212-67E0-BE18-C1EBB7BD63AA}"/>
+                <a16:creationId xmlns:a16="http://schemas.microsoft.com/office/drawing/2014/main" id="{8B0A8AC3-D7E0-90F2-73EB-F63A6D7B8AFA}"/>
               </a:ext>
             </a:extLst>
           </p:cNvPr>
@@ -10154,6 +9418,35 @@
             <a:spLocks noGrp="1"/>
           </p:cNvSpPr>
           <p:nvPr>
+            <p:ph type="sldNum" sz="quarter" idx="12"/>
+          </p:nvPr>
+        </p:nvSpPr>
+        <p:spPr/>
+        <p:txBody>
+          <a:bodyPr/>
+          <a:lstStyle/>
+          <a:p>
+            <a:fld id="{ABDA560F-461C-6043-9BC4-489BA92F7161}" type="slidenum">
+              <a:rPr lang="en-US" smtClean="0"/>
+              <a:t>5</a:t>
+            </a:fld>
+            <a:endParaRPr lang="en-US"/>
+          </a:p>
+        </p:txBody>
+      </p:sp>
+      <p:sp>
+        <p:nvSpPr>
+          <p:cNvPr id="4" name="Date Placeholder 3">
+            <a:extLst>
+              <a:ext uri="{FF2B5EF4-FFF2-40B4-BE49-F238E27FC236}">
+                <a16:creationId xmlns:a16="http://schemas.microsoft.com/office/drawing/2014/main" id="{A2CC8BA0-DDE6-FDB2-ECAF-6412681BC0DA}"/>
+              </a:ext>
+            </a:extLst>
+          </p:cNvPr>
+          <p:cNvSpPr>
+            <a:spLocks noGrp="1"/>
+          </p:cNvSpPr>
+          <p:nvPr>
             <p:ph type="dt" sz="half" idx="10"/>
           </p:nvPr>
         </p:nvSpPr>
@@ -10165,7 +9458,7 @@
             <a:pPr algn="ctr"/>
             <a:r>
               <a:rPr lang="en-US"/>
-              <a:t>8/12/2024</a:t>
+              <a:t>01/07/2025</a:t>
             </a:r>
           </a:p>
         </p:txBody>
@@ -10289,10 +9582,13 @@
       </p:sp>
       <p:pic>
         <p:nvPicPr>
-          <p:cNvPr id="4" name="Picture 3" descr="Screen shot showing the Research Computing documentation webpage">
+          <p:cNvPr id="4" name="Picture 3">
             <a:extLst>
               <a:ext uri="{FF2B5EF4-FFF2-40B4-BE49-F238E27FC236}">
                 <a16:creationId xmlns:a16="http://schemas.microsoft.com/office/drawing/2014/main" id="{039B8453-DA9A-18BE-4241-4996EB58BFF6}"/>
+              </a:ext>
+              <a:ext uri="{C183D7F6-B498-43B3-948B-1728B52AA6E4}">
+                <adec:decorative xmlns:adec="http://schemas.microsoft.com/office/drawing/2017/decorative" val="1"/>
               </a:ext>
             </a:extLst>
           </p:cNvPr>
@@ -10301,15 +9597,15 @@
           </p:cNvPicPr>
           <p:nvPr/>
         </p:nvPicPr>
-        <p:blipFill rotWithShape="1">
+        <p:blipFill>
           <a:blip r:embed="rId4"/>
-          <a:srcRect t="7602" b="4503"/>
+          <a:srcRect l="197" r="-162"/>
           <a:stretch/>
         </p:blipFill>
         <p:spPr>
           <a:xfrm>
-            <a:off x="2422357" y="2018064"/>
-            <a:ext cx="7283116" cy="4000922"/>
+            <a:off x="2151528" y="2018064"/>
+            <a:ext cx="7853083" cy="4000922"/>
           </a:xfrm>
           <a:prstGeom prst="rect">
             <a:avLst/>
@@ -10318,57 +9614,10 @@
       </p:pic>
       <p:sp>
         <p:nvSpPr>
-          <p:cNvPr id="126" name="Google Shape;126;p18"/>
-          <p:cNvSpPr txBox="1">
-            <a:spLocks noGrp="1"/>
-          </p:cNvSpPr>
-          <p:nvPr>
-            <p:ph type="sldNum" idx="12"/>
-          </p:nvPr>
-        </p:nvSpPr>
-        <p:spPr>
-          <a:xfrm>
-            <a:off x="8610600" y="6356350"/>
-            <a:ext cx="682800" cy="365100"/>
-          </a:xfrm>
-          <a:prstGeom prst="rect">
-            <a:avLst/>
-          </a:prstGeom>
-        </p:spPr>
-        <p:txBody>
-          <a:bodyPr spcFirstLastPara="1" wrap="square" lIns="91425" tIns="45700" rIns="91425" bIns="45700" anchor="ctr" anchorCtr="0">
-            <a:noAutofit/>
-          </a:bodyPr>
-          <a:lstStyle/>
-          <a:p>
-            <a:pPr marL="0" lvl="0" indent="0" algn="l" rtl="0">
-              <a:spcBef>
-                <a:spcPts val="0"/>
-              </a:spcBef>
-              <a:spcAft>
-                <a:spcPts val="0"/>
-              </a:spcAft>
-              <a:buClr>
-                <a:srgbClr val="000000"/>
-              </a:buClr>
-              <a:buSzPts val="1200"/>
-              <a:buFont typeface="Arial"/>
-              <a:buNone/>
-            </a:pPr>
-            <a:fld id="{00000000-1234-1234-1234-123412341234}" type="slidenum">
-              <a:rPr lang="en-US"/>
-              <a:t>6</a:t>
-            </a:fld>
-            <a:endParaRPr/>
-          </a:p>
-        </p:txBody>
-      </p:sp>
-      <p:sp>
-        <p:nvSpPr>
-          <p:cNvPr id="3" name="Date Placeholder 2">
+          <p:cNvPr id="5" name="Slide Number Placeholder 4">
             <a:extLst>
               <a:ext uri="{FF2B5EF4-FFF2-40B4-BE49-F238E27FC236}">
-                <a16:creationId xmlns:a16="http://schemas.microsoft.com/office/drawing/2014/main" id="{988B91B0-3990-39DD-EF58-B3EB44C89149}"/>
+                <a16:creationId xmlns:a16="http://schemas.microsoft.com/office/drawing/2014/main" id="{D6C9C548-1E34-60AC-ABB4-906B09306DBF}"/>
               </a:ext>
             </a:extLst>
           </p:cNvPr>
@@ -10376,6 +9625,35 @@
             <a:spLocks noGrp="1"/>
           </p:cNvSpPr>
           <p:nvPr>
+            <p:ph type="sldNum" sz="quarter" idx="12"/>
+          </p:nvPr>
+        </p:nvSpPr>
+        <p:spPr/>
+        <p:txBody>
+          <a:bodyPr/>
+          <a:lstStyle/>
+          <a:p>
+            <a:fld id="{ABDA560F-461C-6043-9BC4-489BA92F7161}" type="slidenum">
+              <a:rPr lang="en-US" smtClean="0"/>
+              <a:t>6</a:t>
+            </a:fld>
+            <a:endParaRPr lang="en-US"/>
+          </a:p>
+        </p:txBody>
+      </p:sp>
+      <p:sp>
+        <p:nvSpPr>
+          <p:cNvPr id="6" name="Date Placeholder 5">
+            <a:extLst>
+              <a:ext uri="{FF2B5EF4-FFF2-40B4-BE49-F238E27FC236}">
+                <a16:creationId xmlns:a16="http://schemas.microsoft.com/office/drawing/2014/main" id="{E5F296D0-12BF-8F49-081F-46909E9765F4}"/>
+              </a:ext>
+            </a:extLst>
+          </p:cNvPr>
+          <p:cNvSpPr>
+            <a:spLocks noGrp="1"/>
+          </p:cNvSpPr>
+          <p:nvPr>
             <p:ph type="dt" sz="half" idx="10"/>
           </p:nvPr>
         </p:nvSpPr>
@@ -10387,7 +9665,7 @@
             <a:pPr algn="ctr"/>
             <a:r>
               <a:rPr lang="en-US"/>
-              <a:t>8/12/2024</a:t>
+              <a:t>01/07/2025</a:t>
             </a:r>
           </a:p>
         </p:txBody>
@@ -10511,10 +9789,13 @@
       </p:sp>
       <p:pic>
         <p:nvPicPr>
-          <p:cNvPr id="4" name="Picture 3" descr="Screen shot showing the CRDDS events webpage.">
+          <p:cNvPr id="4" name="Picture 3">
             <a:extLst>
               <a:ext uri="{FF2B5EF4-FFF2-40B4-BE49-F238E27FC236}">
                 <a16:creationId xmlns:a16="http://schemas.microsoft.com/office/drawing/2014/main" id="{4F566A0F-A21F-AF04-AA03-F0662B588F13}"/>
+              </a:ext>
+              <a:ext uri="{C183D7F6-B498-43B3-948B-1728B52AA6E4}">
+                <adec:decorative xmlns:adec="http://schemas.microsoft.com/office/drawing/2017/decorative" val="1"/>
               </a:ext>
             </a:extLst>
           </p:cNvPr>
@@ -10523,74 +9804,32 @@
           </p:cNvPicPr>
           <p:nvPr/>
         </p:nvPicPr>
-        <p:blipFill rotWithShape="1">
+        <p:blipFill>
           <a:blip r:embed="rId4"/>
-          <a:srcRect t="7427" r="34612" b="29181"/>
+          <a:srcRect l="-255" r="223"/>
           <a:stretch/>
         </p:blipFill>
         <p:spPr>
           <a:xfrm>
-            <a:off x="3100136" y="2136599"/>
-            <a:ext cx="5991727" cy="3630537"/>
+            <a:off x="2312894" y="2136599"/>
+            <a:ext cx="7530353" cy="3630537"/>
           </a:xfrm>
           <a:prstGeom prst="rect">
             <a:avLst/>
           </a:prstGeom>
+          <a:ln>
+            <a:solidFill>
+              <a:schemeClr val="tx1"/>
+            </a:solidFill>
+          </a:ln>
         </p:spPr>
       </p:pic>
       <p:sp>
         <p:nvSpPr>
-          <p:cNvPr id="126" name="Google Shape;126;p18"/>
-          <p:cNvSpPr txBox="1">
-            <a:spLocks noGrp="1"/>
-          </p:cNvSpPr>
-          <p:nvPr>
-            <p:ph type="sldNum" idx="12"/>
-          </p:nvPr>
-        </p:nvSpPr>
-        <p:spPr>
-          <a:xfrm>
-            <a:off x="8610600" y="6356350"/>
-            <a:ext cx="682800" cy="365100"/>
-          </a:xfrm>
-          <a:prstGeom prst="rect">
-            <a:avLst/>
-          </a:prstGeom>
-        </p:spPr>
-        <p:txBody>
-          <a:bodyPr spcFirstLastPara="1" wrap="square" lIns="91425" tIns="45700" rIns="91425" bIns="45700" anchor="ctr" anchorCtr="0">
-            <a:noAutofit/>
-          </a:bodyPr>
-          <a:lstStyle/>
-          <a:p>
-            <a:pPr marL="0" lvl="0" indent="0" algn="l" rtl="0">
-              <a:spcBef>
-                <a:spcPts val="0"/>
-              </a:spcBef>
-              <a:spcAft>
-                <a:spcPts val="0"/>
-              </a:spcAft>
-              <a:buClr>
-                <a:srgbClr val="000000"/>
-              </a:buClr>
-              <a:buSzPts val="1200"/>
-              <a:buFont typeface="Arial"/>
-              <a:buNone/>
-            </a:pPr>
-            <a:fld id="{00000000-1234-1234-1234-123412341234}" type="slidenum">
-              <a:rPr lang="en-US"/>
-              <a:t>7</a:t>
-            </a:fld>
-            <a:endParaRPr/>
-          </a:p>
-        </p:txBody>
-      </p:sp>
-      <p:sp>
-        <p:nvSpPr>
-          <p:cNvPr id="3" name="Date Placeholder 2">
+          <p:cNvPr id="5" name="Slide Number Placeholder 4">
             <a:extLst>
               <a:ext uri="{FF2B5EF4-FFF2-40B4-BE49-F238E27FC236}">
-                <a16:creationId xmlns:a16="http://schemas.microsoft.com/office/drawing/2014/main" id="{36FF1BF4-5C11-1476-FD88-D3F10A359886}"/>
+                <a16:creationId xmlns:a16="http://schemas.microsoft.com/office/drawing/2014/main" id="{4228BD8E-2FDB-CC8B-C8E5-CA59379D5395}"/>
               </a:ext>
             </a:extLst>
           </p:cNvPr>
@@ -10598,6 +9837,35 @@
             <a:spLocks noGrp="1"/>
           </p:cNvSpPr>
           <p:nvPr>
+            <p:ph type="sldNum" sz="quarter" idx="12"/>
+          </p:nvPr>
+        </p:nvSpPr>
+        <p:spPr/>
+        <p:txBody>
+          <a:bodyPr/>
+          <a:lstStyle/>
+          <a:p>
+            <a:fld id="{ABDA560F-461C-6043-9BC4-489BA92F7161}" type="slidenum">
+              <a:rPr lang="en-US" smtClean="0"/>
+              <a:t>7</a:t>
+            </a:fld>
+            <a:endParaRPr lang="en-US"/>
+          </a:p>
+        </p:txBody>
+      </p:sp>
+      <p:sp>
+        <p:nvSpPr>
+          <p:cNvPr id="6" name="Date Placeholder 5">
+            <a:extLst>
+              <a:ext uri="{FF2B5EF4-FFF2-40B4-BE49-F238E27FC236}">
+                <a16:creationId xmlns:a16="http://schemas.microsoft.com/office/drawing/2014/main" id="{A9650288-1534-931A-2FDE-9A073E13B5BC}"/>
+              </a:ext>
+            </a:extLst>
+          </p:cNvPr>
+          <p:cNvSpPr>
+            <a:spLocks noGrp="1"/>
+          </p:cNvSpPr>
+          <p:nvPr>
             <p:ph type="dt" sz="half" idx="10"/>
           </p:nvPr>
         </p:nvSpPr>
@@ -10609,7 +9877,7 @@
             <a:pPr algn="ctr"/>
             <a:r>
               <a:rPr lang="en-US"/>
-              <a:t>8/12/2024</a:t>
+              <a:t>01/07/2025</a:t>
             </a:r>
           </a:p>
         </p:txBody>
@@ -10853,10 +10121,10 @@
       </p:sp>
       <p:sp>
         <p:nvSpPr>
-          <p:cNvPr id="4" name="Slide Number Placeholder 3">
+          <p:cNvPr id="3" name="Slide Number Placeholder 2">
             <a:extLst>
               <a:ext uri="{FF2B5EF4-FFF2-40B4-BE49-F238E27FC236}">
-                <a16:creationId xmlns:a16="http://schemas.microsoft.com/office/drawing/2014/main" id="{30DB86FD-6550-FCEF-4460-0776A432A20C}"/>
+                <a16:creationId xmlns:a16="http://schemas.microsoft.com/office/drawing/2014/main" id="{FB4CBC96-5185-76B2-C3C6-CB61B2164B15}"/>
               </a:ext>
             </a:extLst>
           </p:cNvPr>
@@ -10864,42 +10132,28 @@
             <a:spLocks noGrp="1"/>
           </p:cNvSpPr>
           <p:nvPr>
-            <p:ph type="sldNum" idx="12"/>
-          </p:nvPr>
-        </p:nvSpPr>
-        <p:spPr>
-          <a:xfrm>
-            <a:off x="8610600" y="6356350"/>
-            <a:ext cx="2743200" cy="365125"/>
-          </a:xfrm>
-        </p:spPr>
+            <p:ph type="sldNum" sz="quarter" idx="12"/>
+          </p:nvPr>
+        </p:nvSpPr>
+        <p:spPr/>
         <p:txBody>
           <a:bodyPr/>
           <a:lstStyle/>
           <a:p>
-            <a:pPr marL="0" lvl="0" indent="0" algn="l" rtl="0">
-              <a:spcBef>
-                <a:spcPts val="0"/>
-              </a:spcBef>
-              <a:spcAft>
-                <a:spcPts val="0"/>
-              </a:spcAft>
-              <a:buNone/>
-            </a:pPr>
-            <a:fld id="{00000000-1234-1234-1234-123412341234}" type="slidenum">
+            <a:fld id="{ABDA560F-461C-6043-9BC4-489BA92F7161}" type="slidenum">
               <a:rPr lang="en-US" smtClean="0"/>
               <a:t>8</a:t>
             </a:fld>
-            <a:endParaRPr lang="en-US" dirty="0"/>
-          </a:p>
-        </p:txBody>
-      </p:sp>
-      <p:sp>
-        <p:nvSpPr>
-          <p:cNvPr id="2" name="Date Placeholder 1">
+            <a:endParaRPr lang="en-US"/>
+          </a:p>
+        </p:txBody>
+      </p:sp>
+      <p:sp>
+        <p:nvSpPr>
+          <p:cNvPr id="5" name="Date Placeholder 4">
             <a:extLst>
               <a:ext uri="{FF2B5EF4-FFF2-40B4-BE49-F238E27FC236}">
-                <a16:creationId xmlns:a16="http://schemas.microsoft.com/office/drawing/2014/main" id="{08316B1A-1932-692E-04D1-C80D15EA50D1}"/>
+                <a16:creationId xmlns:a16="http://schemas.microsoft.com/office/drawing/2014/main" id="{8CE0FFBA-BF9C-BED9-62BE-80E8CB01237C}"/>
               </a:ext>
             </a:extLst>
           </p:cNvPr>
@@ -10918,7 +10172,7 @@
             <a:pPr algn="ctr"/>
             <a:r>
               <a:rPr lang="en-US"/>
-              <a:t>8/12/2024</a:t>
+              <a:t>01/07/2025</a:t>
             </a:r>
           </a:p>
         </p:txBody>
@@ -10992,57 +10246,10 @@
       </p:sp>
       <p:sp>
         <p:nvSpPr>
-          <p:cNvPr id="126" name="Google Shape;126;p18"/>
-          <p:cNvSpPr txBox="1">
-            <a:spLocks noGrp="1"/>
-          </p:cNvSpPr>
-          <p:nvPr>
-            <p:ph type="sldNum" idx="12"/>
-          </p:nvPr>
-        </p:nvSpPr>
-        <p:spPr>
-          <a:xfrm>
-            <a:off x="8610600" y="6356350"/>
-            <a:ext cx="682800" cy="365100"/>
-          </a:xfrm>
-          <a:prstGeom prst="rect">
-            <a:avLst/>
-          </a:prstGeom>
-        </p:spPr>
-        <p:txBody>
-          <a:bodyPr spcFirstLastPara="1" wrap="square" lIns="91425" tIns="45700" rIns="91425" bIns="45700" anchor="ctr" anchorCtr="0">
-            <a:noAutofit/>
-          </a:bodyPr>
-          <a:lstStyle/>
-          <a:p>
-            <a:pPr marL="0" lvl="0" indent="0" algn="l" rtl="0">
-              <a:spcBef>
-                <a:spcPts val="0"/>
-              </a:spcBef>
-              <a:spcAft>
-                <a:spcPts val="0"/>
-              </a:spcAft>
-              <a:buClr>
-                <a:srgbClr val="000000"/>
-              </a:buClr>
-              <a:buSzPts val="1200"/>
-              <a:buFont typeface="Arial"/>
-              <a:buNone/>
-            </a:pPr>
-            <a:fld id="{00000000-1234-1234-1234-123412341234}" type="slidenum">
-              <a:rPr lang="en-US"/>
-              <a:t>9</a:t>
-            </a:fld>
-            <a:endParaRPr/>
-          </a:p>
-        </p:txBody>
-      </p:sp>
-      <p:sp>
-        <p:nvSpPr>
-          <p:cNvPr id="2" name="Date Placeholder 1">
+          <p:cNvPr id="3" name="Slide Number Placeholder 2">
             <a:extLst>
               <a:ext uri="{FF2B5EF4-FFF2-40B4-BE49-F238E27FC236}">
-                <a16:creationId xmlns:a16="http://schemas.microsoft.com/office/drawing/2014/main" id="{0DD02C7C-E9B8-5F77-97D9-27140B71DA76}"/>
+                <a16:creationId xmlns:a16="http://schemas.microsoft.com/office/drawing/2014/main" id="{172DB15D-F5A9-F5AB-CC94-772520E99371}"/>
               </a:ext>
             </a:extLst>
           </p:cNvPr>
@@ -11050,6 +10257,35 @@
             <a:spLocks noGrp="1"/>
           </p:cNvSpPr>
           <p:nvPr>
+            <p:ph type="sldNum" sz="quarter" idx="12"/>
+          </p:nvPr>
+        </p:nvSpPr>
+        <p:spPr/>
+        <p:txBody>
+          <a:bodyPr/>
+          <a:lstStyle/>
+          <a:p>
+            <a:fld id="{ABDA560F-461C-6043-9BC4-489BA92F7161}" type="slidenum">
+              <a:rPr lang="en-US" smtClean="0"/>
+              <a:t>9</a:t>
+            </a:fld>
+            <a:endParaRPr lang="en-US"/>
+          </a:p>
+        </p:txBody>
+      </p:sp>
+      <p:sp>
+        <p:nvSpPr>
+          <p:cNvPr id="4" name="Date Placeholder 3">
+            <a:extLst>
+              <a:ext uri="{FF2B5EF4-FFF2-40B4-BE49-F238E27FC236}">
+                <a16:creationId xmlns:a16="http://schemas.microsoft.com/office/drawing/2014/main" id="{DD9A851D-B58B-1556-240C-13AA8742E226}"/>
+              </a:ext>
+            </a:extLst>
+          </p:cNvPr>
+          <p:cNvSpPr>
+            <a:spLocks noGrp="1"/>
+          </p:cNvSpPr>
+          <p:nvPr>
             <p:ph type="dt" sz="half" idx="10"/>
           </p:nvPr>
         </p:nvSpPr>
@@ -11061,7 +10297,7 @@
             <a:pPr algn="ctr"/>
             <a:r>
               <a:rPr lang="en-US"/>
-              <a:t>8/12/2024</a:t>
+              <a:t>01/07/2025</a:t>
             </a:r>
           </a:p>
         </p:txBody>
@@ -11636,6 +10872,26 @@
 </file>
 
 <file path=customXml/item1.xml><?xml version="1.0" encoding="utf-8"?>
+<p:properties xmlns:p="http://schemas.microsoft.com/office/2006/metadata/properties" xmlns:xsi="http://www.w3.org/2001/XMLSchema-instance" xmlns:pc="http://schemas.microsoft.com/office/infopath/2007/PartnerControls">
+  <documentManagement>
+    <TaxCatchAll xmlns="92c16b9d-8c83-445e-a4f4-1fe3d2f43f13" xsi:nil="true"/>
+    <lcf76f155ced4ddcb4097134ff3c332f xmlns="7e49f7d3-8802-46ca-9604-495ce27f67f4">
+      <Terms xmlns="http://schemas.microsoft.com/office/infopath/2007/PartnerControls"/>
+    </lcf76f155ced4ddcb4097134ff3c332f>
+  </documentManagement>
+</p:properties>
+</file>
+
+<file path=customXml/item2.xml><?xml version="1.0" encoding="utf-8"?>
+<?mso-contentType ?>
+<FormTemplates xmlns="http://schemas.microsoft.com/sharepoint/v3/contenttype/forms">
+  <Display>DocumentLibraryForm</Display>
+  <Edit>DocumentLibraryForm</Edit>
+  <New>DocumentLibraryForm</New>
+</FormTemplates>
+</file>
+
+<file path=customXml/item3.xml><?xml version="1.0" encoding="utf-8"?>
 <ct:contentTypeSchema xmlns:ct="http://schemas.microsoft.com/office/2006/metadata/contentType" xmlns:ma="http://schemas.microsoft.com/office/2006/metadata/properties/metaAttributes" ct:_="" ma:_="" ma:contentTypeName="Document" ma:contentTypeID="0x010100DC7320DB280744439FF1CC777D09ECA4" ma:contentTypeVersion="15" ma:contentTypeDescription="Create a new document." ma:contentTypeScope="" ma:versionID="e50b92032c956cc777cf00ac7d475189">
   <xsd:schema xmlns:xsd="http://www.w3.org/2001/XMLSchema" xmlns:xs="http://www.w3.org/2001/XMLSchema" xmlns:p="http://schemas.microsoft.com/office/2006/metadata/properties" xmlns:ns2="7e49f7d3-8802-46ca-9604-495ce27f67f4" xmlns:ns3="a1519f9a-9d6a-41c1-afc9-552e4069f82f" xmlns:ns4="92c16b9d-8c83-445e-a4f4-1fe3d2f43f13" targetNamespace="http://schemas.microsoft.com/office/2006/metadata/properties" ma:root="true" ma:fieldsID="fcd7cab68a23f1df7b42ced4f3edf141" ns2:_="" ns3:_="" ns4:_="">
     <xsd:import namespace="7e49f7d3-8802-46ca-9604-495ce27f67f4"/>
@@ -11877,27 +11133,33 @@
 </ct:contentTypeSchema>
 </file>
 
-<file path=customXml/item2.xml><?xml version="1.0" encoding="utf-8"?>
-<?mso-contentType ?>
-<FormTemplates xmlns="http://schemas.microsoft.com/sharepoint/v3/contenttype/forms">
-  <Display>DocumentLibraryForm</Display>
-  <Edit>DocumentLibraryForm</Edit>
-  <New>DocumentLibraryForm</New>
-</FormTemplates>
+<file path=customXml/itemProps1.xml><?xml version="1.0" encoding="utf-8"?>
+<ds:datastoreItem xmlns:ds="http://schemas.openxmlformats.org/officeDocument/2006/customXml" ds:itemID="{4AB02FF4-25A1-49FE-9DF7-DD19F525B7FA}">
+  <ds:schemaRefs>
+    <ds:schemaRef ds:uri="7e49f7d3-8802-46ca-9604-495ce27f67f4"/>
+    <ds:schemaRef ds:uri="92c16b9d-8c83-445e-a4f4-1fe3d2f43f13"/>
+    <ds:schemaRef ds:uri="a1519f9a-9d6a-41c1-afc9-552e4069f82f"/>
+    <ds:schemaRef ds:uri="http://purl.org/dc/dcmitype/"/>
+    <ds:schemaRef ds:uri="http://purl.org/dc/elements/1.1/"/>
+    <ds:schemaRef ds:uri="http://purl.org/dc/terms/"/>
+    <ds:schemaRef ds:uri="http://schemas.microsoft.com/office/2006/documentManagement/types"/>
+    <ds:schemaRef ds:uri="http://schemas.microsoft.com/office/2006/metadata/properties"/>
+    <ds:schemaRef ds:uri="http://schemas.microsoft.com/office/infopath/2007/PartnerControls"/>
+    <ds:schemaRef ds:uri="http://schemas.openxmlformats.org/package/2006/metadata/core-properties"/>
+    <ds:schemaRef ds:uri="http://www.w3.org/XML/1998/namespace"/>
+  </ds:schemaRefs>
+</ds:datastoreItem>
 </file>
 
-<file path=customXml/item3.xml><?xml version="1.0" encoding="utf-8"?>
-<p:properties xmlns:p="http://schemas.microsoft.com/office/2006/metadata/properties" xmlns:xsi="http://www.w3.org/2001/XMLSchema-instance" xmlns:pc="http://schemas.microsoft.com/office/infopath/2007/PartnerControls">
-  <documentManagement>
-    <TaxCatchAll xmlns="92c16b9d-8c83-445e-a4f4-1fe3d2f43f13" xsi:nil="true"/>
-    <lcf76f155ced4ddcb4097134ff3c332f xmlns="7e49f7d3-8802-46ca-9604-495ce27f67f4">
-      <Terms xmlns="http://schemas.microsoft.com/office/infopath/2007/PartnerControls"/>
-    </lcf76f155ced4ddcb4097134ff3c332f>
-  </documentManagement>
-</p:properties>
+<file path=customXml/itemProps2.xml><?xml version="1.0" encoding="utf-8"?>
+<ds:datastoreItem xmlns:ds="http://schemas.openxmlformats.org/officeDocument/2006/customXml" ds:itemID="{06B4C708-AA43-4CE7-BE2D-F9D9A02F4940}">
+  <ds:schemaRefs>
+    <ds:schemaRef ds:uri="http://schemas.microsoft.com/sharepoint/v3/contenttype/forms"/>
+  </ds:schemaRefs>
+</ds:datastoreItem>
 </file>
 
-<file path=customXml/itemProps1.xml><?xml version="1.0" encoding="utf-8"?>
+<file path=customXml/itemProps3.xml><?xml version="1.0" encoding="utf-8"?>
 <ds:datastoreItem xmlns:ds="http://schemas.openxmlformats.org/officeDocument/2006/customXml" ds:itemID="{6BBC22CE-40EC-4545-8FE9-90326628051D}">
   <ds:schemaRefs>
     <ds:schemaRef ds:uri="7e49f7d3-8802-46ca-9604-495ce27f67f4"/>
@@ -11915,30 +11177,4 @@
     <ds:schemaRef ds:uri="http://www.w3.org/2001/XMLSchema"/>
   </ds:schemaRefs>
 </ds:datastoreItem>
-</file>
-
-<file path=customXml/itemProps2.xml><?xml version="1.0" encoding="utf-8"?>
-<ds:datastoreItem xmlns:ds="http://schemas.openxmlformats.org/officeDocument/2006/customXml" ds:itemID="{06B4C708-AA43-4CE7-BE2D-F9D9A02F4940}">
-  <ds:schemaRefs>
-    <ds:schemaRef ds:uri="http://schemas.microsoft.com/sharepoint/v3/contenttype/forms"/>
-  </ds:schemaRefs>
-</ds:datastoreItem>
-</file>
-
-<file path=customXml/itemProps3.xml><?xml version="1.0" encoding="utf-8"?>
-<ds:datastoreItem xmlns:ds="http://schemas.openxmlformats.org/officeDocument/2006/customXml" ds:itemID="{4AB02FF4-25A1-49FE-9DF7-DD19F525B7FA}">
-  <ds:schemaRefs>
-    <ds:schemaRef ds:uri="7e49f7d3-8802-46ca-9604-495ce27f67f4"/>
-    <ds:schemaRef ds:uri="92c16b9d-8c83-445e-a4f4-1fe3d2f43f13"/>
-    <ds:schemaRef ds:uri="a1519f9a-9d6a-41c1-afc9-552e4069f82f"/>
-    <ds:schemaRef ds:uri="http://purl.org/dc/dcmitype/"/>
-    <ds:schemaRef ds:uri="http://purl.org/dc/elements/1.1/"/>
-    <ds:schemaRef ds:uri="http://purl.org/dc/terms/"/>
-    <ds:schemaRef ds:uri="http://schemas.microsoft.com/office/2006/documentManagement/types"/>
-    <ds:schemaRef ds:uri="http://schemas.microsoft.com/office/2006/metadata/properties"/>
-    <ds:schemaRef ds:uri="http://schemas.microsoft.com/office/infopath/2007/PartnerControls"/>
-    <ds:schemaRef ds:uri="http://schemas.openxmlformats.org/package/2006/metadata/core-properties"/>
-    <ds:schemaRef ds:uri="http://www.w3.org/XML/1998/namespace"/>
-  </ds:schemaRefs>
-</ds:datastoreItem>
 </file>
</xml_diff>